<commit_message>
tutorial & intro_back key block & main back key 2
</commit_message>
<xml_diff>
--- a/icon.pptx
+++ b/icon.pptx
@@ -5,7 +5,7 @@
     <p:sldMasterId id="2147483648" r:id="rId1"/>
   </p:sldMasterIdLst>
   <p:notesMasterIdLst>
-    <p:notesMasterId r:id="rId10"/>
+    <p:notesMasterId r:id="rId11"/>
   </p:notesMasterIdLst>
   <p:sldIdLst>
     <p:sldId id="256" r:id="rId2"/>
@@ -16,6 +16,7 @@
     <p:sldId id="261" r:id="rId7"/>
     <p:sldId id="262" r:id="rId8"/>
     <p:sldId id="263" r:id="rId9"/>
+    <p:sldId id="264" r:id="rId10"/>
   </p:sldIdLst>
   <p:sldSz cx="12192000" cy="6858000"/>
   <p:notesSz cx="6858000" cy="9144000"/>
@@ -204,7 +205,7 @@
           <a:p>
             <a:fld id="{C286FE0E-AE70-4079-8761-52C42E2F42E6}" type="datetimeFigureOut">
               <a:rPr lang="ko-KR" altLang="en-US" smtClean="0"/>
-              <a:t>2015-01-21</a:t>
+              <a:t>2015-01-26</a:t>
             </a:fld>
             <a:endParaRPr lang="ko-KR" altLang="en-US"/>
           </a:p>
@@ -1100,6 +1101,98 @@
 </p:notes>
 </file>
 
+<file path=ppt/notesSlides/notesSlide8.xml><?xml version="1.0" encoding="utf-8"?>
+<p:notes xmlns:a="http://schemas.openxmlformats.org/drawingml/2006/main" xmlns:r="http://schemas.openxmlformats.org/officeDocument/2006/relationships" xmlns:p="http://schemas.openxmlformats.org/presentationml/2006/main">
+  <p:cSld>
+    <p:spTree>
+      <p:nvGrpSpPr>
+        <p:cNvPr id="1" name=""/>
+        <p:cNvGrpSpPr/>
+        <p:nvPr/>
+      </p:nvGrpSpPr>
+      <p:grpSpPr>
+        <a:xfrm>
+          <a:off x="0" y="0"/>
+          <a:ext cx="0" cy="0"/>
+          <a:chOff x="0" y="0"/>
+          <a:chExt cx="0" cy="0"/>
+        </a:xfrm>
+      </p:grpSpPr>
+      <p:sp>
+        <p:nvSpPr>
+          <p:cNvPr id="2" name="슬라이드 이미지 개체 틀 1"/>
+          <p:cNvSpPr>
+            <a:spLocks noGrp="1" noRot="1" noChangeAspect="1"/>
+          </p:cNvSpPr>
+          <p:nvPr>
+            <p:ph type="sldImg"/>
+          </p:nvPr>
+        </p:nvSpPr>
+        <p:spPr/>
+      </p:sp>
+      <p:sp>
+        <p:nvSpPr>
+          <p:cNvPr id="3" name="슬라이드 노트 개체 틀 2"/>
+          <p:cNvSpPr>
+            <a:spLocks noGrp="1"/>
+          </p:cNvSpPr>
+          <p:nvPr>
+            <p:ph type="body" idx="1"/>
+          </p:nvPr>
+        </p:nvSpPr>
+        <p:spPr/>
+        <p:txBody>
+          <a:bodyPr/>
+          <a:lstStyle/>
+          <a:p>
+            <a:r>
+              <a:rPr lang="ko-KR" altLang="en-US" dirty="0" err="1" smtClean="0"/>
+              <a:t>싱글튜토리얼</a:t>
+            </a:r>
+            <a:r>
+              <a:rPr lang="en-US" altLang="ko-KR" dirty="0" smtClean="0"/>
+              <a:t>_1</a:t>
+            </a:r>
+            <a:endParaRPr lang="ko-KR" altLang="en-US" dirty="0"/>
+          </a:p>
+        </p:txBody>
+      </p:sp>
+      <p:sp>
+        <p:nvSpPr>
+          <p:cNvPr id="4" name="슬라이드 번호 개체 틀 3"/>
+          <p:cNvSpPr>
+            <a:spLocks noGrp="1"/>
+          </p:cNvSpPr>
+          <p:nvPr>
+            <p:ph type="sldNum" sz="quarter" idx="10"/>
+          </p:nvPr>
+        </p:nvSpPr>
+        <p:spPr/>
+        <p:txBody>
+          <a:bodyPr/>
+          <a:lstStyle/>
+          <a:p>
+            <a:fld id="{8B50D7E7-3AE0-4223-AB1C-BF7CA8C4FBE4}" type="slidenum">
+              <a:rPr lang="ko-KR" altLang="en-US" smtClean="0"/>
+              <a:t>9</a:t>
+            </a:fld>
+            <a:endParaRPr lang="ko-KR" altLang="en-US"/>
+          </a:p>
+        </p:txBody>
+      </p:sp>
+    </p:spTree>
+    <p:extLst>
+      <p:ext uri="{BB962C8B-B14F-4D97-AF65-F5344CB8AC3E}">
+        <p14:creationId xmlns:p14="http://schemas.microsoft.com/office/powerpoint/2010/main" val="1446765059"/>
+      </p:ext>
+    </p:extLst>
+  </p:cSld>
+  <p:clrMapOvr>
+    <a:masterClrMapping/>
+  </p:clrMapOvr>
+</p:notes>
+</file>
+
 <file path=ppt/slideLayouts/slideLayout1.xml><?xml version="1.0" encoding="utf-8"?>
 <p:sldLayout xmlns:a="http://schemas.openxmlformats.org/drawingml/2006/main" xmlns:r="http://schemas.openxmlformats.org/officeDocument/2006/relationships" xmlns:p="http://schemas.openxmlformats.org/presentationml/2006/main" type="title" preserve="1">
   <p:cSld name="제목 슬라이드">
@@ -1231,7 +1324,7 @@
           <a:p>
             <a:fld id="{F1050141-54FF-464A-81F0-F345D58890D6}" type="datetimeFigureOut">
               <a:rPr lang="ko-KR" altLang="en-US" smtClean="0"/>
-              <a:t>2015-01-21</a:t>
+              <a:t>2015-01-26</a:t>
             </a:fld>
             <a:endParaRPr lang="ko-KR" altLang="en-US"/>
           </a:p>
@@ -1401,7 +1494,7 @@
           <a:p>
             <a:fld id="{F1050141-54FF-464A-81F0-F345D58890D6}" type="datetimeFigureOut">
               <a:rPr lang="ko-KR" altLang="en-US" smtClean="0"/>
-              <a:t>2015-01-21</a:t>
+              <a:t>2015-01-26</a:t>
             </a:fld>
             <a:endParaRPr lang="ko-KR" altLang="en-US"/>
           </a:p>
@@ -1581,7 +1674,7 @@
           <a:p>
             <a:fld id="{F1050141-54FF-464A-81F0-F345D58890D6}" type="datetimeFigureOut">
               <a:rPr lang="ko-KR" altLang="en-US" smtClean="0"/>
-              <a:t>2015-01-21</a:t>
+              <a:t>2015-01-26</a:t>
             </a:fld>
             <a:endParaRPr lang="ko-KR" altLang="en-US"/>
           </a:p>
@@ -1751,7 +1844,7 @@
           <a:p>
             <a:fld id="{F1050141-54FF-464A-81F0-F345D58890D6}" type="datetimeFigureOut">
               <a:rPr lang="ko-KR" altLang="en-US" smtClean="0"/>
-              <a:t>2015-01-21</a:t>
+              <a:t>2015-01-26</a:t>
             </a:fld>
             <a:endParaRPr lang="ko-KR" altLang="en-US"/>
           </a:p>
@@ -1997,7 +2090,7 @@
           <a:p>
             <a:fld id="{F1050141-54FF-464A-81F0-F345D58890D6}" type="datetimeFigureOut">
               <a:rPr lang="ko-KR" altLang="en-US" smtClean="0"/>
-              <a:t>2015-01-21</a:t>
+              <a:t>2015-01-26</a:t>
             </a:fld>
             <a:endParaRPr lang="ko-KR" altLang="en-US"/>
           </a:p>
@@ -2229,7 +2322,7 @@
           <a:p>
             <a:fld id="{F1050141-54FF-464A-81F0-F345D58890D6}" type="datetimeFigureOut">
               <a:rPr lang="ko-KR" altLang="en-US" smtClean="0"/>
-              <a:t>2015-01-21</a:t>
+              <a:t>2015-01-26</a:t>
             </a:fld>
             <a:endParaRPr lang="ko-KR" altLang="en-US"/>
           </a:p>
@@ -2596,7 +2689,7 @@
           <a:p>
             <a:fld id="{F1050141-54FF-464A-81F0-F345D58890D6}" type="datetimeFigureOut">
               <a:rPr lang="ko-KR" altLang="en-US" smtClean="0"/>
-              <a:t>2015-01-21</a:t>
+              <a:t>2015-01-26</a:t>
             </a:fld>
             <a:endParaRPr lang="ko-KR" altLang="en-US"/>
           </a:p>
@@ -2714,7 +2807,7 @@
           <a:p>
             <a:fld id="{F1050141-54FF-464A-81F0-F345D58890D6}" type="datetimeFigureOut">
               <a:rPr lang="ko-KR" altLang="en-US" smtClean="0"/>
-              <a:t>2015-01-21</a:t>
+              <a:t>2015-01-26</a:t>
             </a:fld>
             <a:endParaRPr lang="ko-KR" altLang="en-US"/>
           </a:p>
@@ -2809,7 +2902,7 @@
           <a:p>
             <a:fld id="{F1050141-54FF-464A-81F0-F345D58890D6}" type="datetimeFigureOut">
               <a:rPr lang="ko-KR" altLang="en-US" smtClean="0"/>
-              <a:t>2015-01-21</a:t>
+              <a:t>2015-01-26</a:t>
             </a:fld>
             <a:endParaRPr lang="ko-KR" altLang="en-US"/>
           </a:p>
@@ -3086,7 +3179,7 @@
           <a:p>
             <a:fld id="{F1050141-54FF-464A-81F0-F345D58890D6}" type="datetimeFigureOut">
               <a:rPr lang="ko-KR" altLang="en-US" smtClean="0"/>
-              <a:t>2015-01-21</a:t>
+              <a:t>2015-01-26</a:t>
             </a:fld>
             <a:endParaRPr lang="ko-KR" altLang="en-US"/>
           </a:p>
@@ -3339,7 +3432,7 @@
           <a:p>
             <a:fld id="{F1050141-54FF-464A-81F0-F345D58890D6}" type="datetimeFigureOut">
               <a:rPr lang="ko-KR" altLang="en-US" smtClean="0"/>
-              <a:t>2015-01-21</a:t>
+              <a:t>2015-01-26</a:t>
             </a:fld>
             <a:endParaRPr lang="ko-KR" altLang="en-US"/>
           </a:p>
@@ -3552,7 +3645,7 @@
           <a:p>
             <a:fld id="{F1050141-54FF-464A-81F0-F345D58890D6}" type="datetimeFigureOut">
               <a:rPr lang="ko-KR" altLang="en-US" smtClean="0"/>
-              <a:t>2015-01-21</a:t>
+              <a:t>2015-01-26</a:t>
             </a:fld>
             <a:endParaRPr lang="ko-KR" altLang="en-US"/>
           </a:p>
@@ -6156,6 +6249,233 @@
     <p:extLst>
       <p:ext uri="{BB962C8B-B14F-4D97-AF65-F5344CB8AC3E}">
         <p14:creationId xmlns:p14="http://schemas.microsoft.com/office/powerpoint/2010/main" val="1276182355"/>
+      </p:ext>
+    </p:extLst>
+  </p:cSld>
+  <p:clrMapOvr>
+    <a:masterClrMapping/>
+  </p:clrMapOvr>
+  <p:timing>
+    <p:tnLst>
+      <p:par>
+        <p:cTn id="1" dur="indefinite" restart="never" nodeType="tmRoot"/>
+      </p:par>
+    </p:tnLst>
+  </p:timing>
+</p:sld>
+</file>
+
+<file path=ppt/slides/slide9.xml><?xml version="1.0" encoding="utf-8"?>
+<p:sld xmlns:a="http://schemas.openxmlformats.org/drawingml/2006/main" xmlns:r="http://schemas.openxmlformats.org/officeDocument/2006/relationships" xmlns:p="http://schemas.openxmlformats.org/presentationml/2006/main">
+  <p:cSld>
+    <p:spTree>
+      <p:nvGrpSpPr>
+        <p:cNvPr id="1" name=""/>
+        <p:cNvGrpSpPr/>
+        <p:nvPr/>
+      </p:nvGrpSpPr>
+      <p:grpSpPr>
+        <a:xfrm>
+          <a:off x="0" y="0"/>
+          <a:ext cx="0" cy="0"/>
+          <a:chOff x="0" y="0"/>
+          <a:chExt cx="0" cy="0"/>
+        </a:xfrm>
+      </p:grpSpPr>
+      <p:sp>
+        <p:nvSpPr>
+          <p:cNvPr id="2" name="모서리가 둥근 직사각형 1"/>
+          <p:cNvSpPr/>
+          <p:nvPr/>
+        </p:nvSpPr>
+        <p:spPr>
+          <a:xfrm>
+            <a:off x="4508627" y="1982711"/>
+            <a:ext cx="1575302" cy="1575302"/>
+          </a:xfrm>
+          <a:prstGeom prst="roundRect">
+            <a:avLst/>
+          </a:prstGeom>
+          <a:noFill/>
+          <a:ln w="38100">
+            <a:solidFill>
+              <a:srgbClr val="FF0000"/>
+            </a:solidFill>
+          </a:ln>
+        </p:spPr>
+        <p:style>
+          <a:lnRef idx="2">
+            <a:schemeClr val="accent1">
+              <a:shade val="50000"/>
+            </a:schemeClr>
+          </a:lnRef>
+          <a:fillRef idx="1">
+            <a:schemeClr val="accent1"/>
+          </a:fillRef>
+          <a:effectRef idx="0">
+            <a:schemeClr val="accent1"/>
+          </a:effectRef>
+          <a:fontRef idx="minor">
+            <a:schemeClr val="lt1"/>
+          </a:fontRef>
+        </p:style>
+        <p:txBody>
+          <a:bodyPr rtlCol="0" anchor="ctr"/>
+          <a:lstStyle/>
+          <a:p>
+            <a:pPr algn="ctr"/>
+            <a:endParaRPr lang="ko-KR" altLang="en-US"/>
+          </a:p>
+        </p:txBody>
+      </p:sp>
+      <p:sp>
+        <p:nvSpPr>
+          <p:cNvPr id="7" name="구름 6"/>
+          <p:cNvSpPr/>
+          <p:nvPr/>
+        </p:nvSpPr>
+        <p:spPr>
+          <a:xfrm>
+            <a:off x="4659703" y="2108703"/>
+            <a:ext cx="1195104" cy="928262"/>
+          </a:xfrm>
+          <a:prstGeom prst="cloud">
+            <a:avLst/>
+          </a:prstGeom>
+          <a:solidFill>
+            <a:srgbClr val="6DA6D9"/>
+          </a:solidFill>
+          <a:ln>
+            <a:noFill/>
+          </a:ln>
+        </p:spPr>
+        <p:style>
+          <a:lnRef idx="2">
+            <a:schemeClr val="accent1">
+              <a:shade val="50000"/>
+            </a:schemeClr>
+          </a:lnRef>
+          <a:fillRef idx="1">
+            <a:schemeClr val="accent1"/>
+          </a:fillRef>
+          <a:effectRef idx="0">
+            <a:schemeClr val="accent1"/>
+          </a:effectRef>
+          <a:fontRef idx="minor">
+            <a:schemeClr val="lt1"/>
+          </a:fontRef>
+        </p:style>
+        <p:txBody>
+          <a:bodyPr rtlCol="0" anchor="ctr"/>
+          <a:lstStyle/>
+          <a:p>
+            <a:pPr algn="ctr"/>
+            <a:endParaRPr lang="ko-KR" altLang="en-US" dirty="0"/>
+          </a:p>
+        </p:txBody>
+      </p:sp>
+      <p:sp>
+        <p:nvSpPr>
+          <p:cNvPr id="8" name="구름 7"/>
+          <p:cNvSpPr/>
+          <p:nvPr/>
+        </p:nvSpPr>
+        <p:spPr>
+          <a:xfrm>
+            <a:off x="5730841" y="3340729"/>
+            <a:ext cx="108642" cy="108642"/>
+          </a:xfrm>
+          <a:prstGeom prst="cloud">
+            <a:avLst/>
+          </a:prstGeom>
+          <a:solidFill>
+            <a:schemeClr val="accent1">
+              <a:lumMod val="40000"/>
+              <a:lumOff val="60000"/>
+            </a:schemeClr>
+          </a:solidFill>
+          <a:ln>
+            <a:noFill/>
+          </a:ln>
+        </p:spPr>
+        <p:style>
+          <a:lnRef idx="2">
+            <a:schemeClr val="accent1">
+              <a:shade val="50000"/>
+            </a:schemeClr>
+          </a:lnRef>
+          <a:fillRef idx="1">
+            <a:schemeClr val="accent1"/>
+          </a:fillRef>
+          <a:effectRef idx="0">
+            <a:schemeClr val="accent1"/>
+          </a:effectRef>
+          <a:fontRef idx="minor">
+            <a:schemeClr val="lt1"/>
+          </a:fontRef>
+        </p:style>
+        <p:txBody>
+          <a:bodyPr rtlCol="0" anchor="ctr"/>
+          <a:lstStyle/>
+          <a:p>
+            <a:pPr algn="ctr"/>
+            <a:endParaRPr lang="ko-KR" altLang="en-US"/>
+          </a:p>
+        </p:txBody>
+      </p:sp>
+      <p:sp>
+        <p:nvSpPr>
+          <p:cNvPr id="9" name="구름 8"/>
+          <p:cNvSpPr/>
+          <p:nvPr/>
+        </p:nvSpPr>
+        <p:spPr>
+          <a:xfrm>
+            <a:off x="5477344" y="3069644"/>
+            <a:ext cx="307818" cy="238406"/>
+          </a:xfrm>
+          <a:prstGeom prst="cloud">
+            <a:avLst/>
+          </a:prstGeom>
+          <a:solidFill>
+            <a:schemeClr val="accent1">
+              <a:lumMod val="60000"/>
+              <a:lumOff val="40000"/>
+            </a:schemeClr>
+          </a:solidFill>
+          <a:ln>
+            <a:noFill/>
+          </a:ln>
+        </p:spPr>
+        <p:style>
+          <a:lnRef idx="2">
+            <a:schemeClr val="accent1">
+              <a:shade val="50000"/>
+            </a:schemeClr>
+          </a:lnRef>
+          <a:fillRef idx="1">
+            <a:schemeClr val="accent1"/>
+          </a:fillRef>
+          <a:effectRef idx="0">
+            <a:schemeClr val="accent1"/>
+          </a:effectRef>
+          <a:fontRef idx="minor">
+            <a:schemeClr val="lt1"/>
+          </a:fontRef>
+        </p:style>
+        <p:txBody>
+          <a:bodyPr rtlCol="0" anchor="ctr"/>
+          <a:lstStyle/>
+          <a:p>
+            <a:pPr algn="ctr"/>
+            <a:endParaRPr lang="ko-KR" altLang="en-US"/>
+          </a:p>
+        </p:txBody>
+      </p:sp>
+    </p:spTree>
+    <p:extLst>
+      <p:ext uri="{BB962C8B-B14F-4D97-AF65-F5344CB8AC3E}">
+        <p14:creationId xmlns:p14="http://schemas.microsoft.com/office/powerpoint/2010/main" val="2371314192"/>
       </p:ext>
     </p:extLst>
   </p:cSld>

</xml_diff>

<commit_message>
logo & single game btn impriment
</commit_message>
<xml_diff>
--- a/icon.pptx
+++ b/icon.pptx
@@ -5,18 +5,19 @@
     <p:sldMasterId id="2147483648" r:id="rId1"/>
   </p:sldMasterIdLst>
   <p:notesMasterIdLst>
-    <p:notesMasterId r:id="rId11"/>
+    <p:notesMasterId r:id="rId12"/>
   </p:notesMasterIdLst>
   <p:sldIdLst>
     <p:sldId id="256" r:id="rId2"/>
-    <p:sldId id="257" r:id="rId3"/>
-    <p:sldId id="258" r:id="rId4"/>
-    <p:sldId id="259" r:id="rId5"/>
-    <p:sldId id="260" r:id="rId6"/>
-    <p:sldId id="261" r:id="rId7"/>
-    <p:sldId id="262" r:id="rId8"/>
-    <p:sldId id="263" r:id="rId9"/>
-    <p:sldId id="264" r:id="rId10"/>
+    <p:sldId id="265" r:id="rId3"/>
+    <p:sldId id="257" r:id="rId4"/>
+    <p:sldId id="258" r:id="rId5"/>
+    <p:sldId id="259" r:id="rId6"/>
+    <p:sldId id="260" r:id="rId7"/>
+    <p:sldId id="261" r:id="rId8"/>
+    <p:sldId id="262" r:id="rId9"/>
+    <p:sldId id="263" r:id="rId10"/>
+    <p:sldId id="264" r:id="rId11"/>
   </p:sldIdLst>
   <p:sldSz cx="12192000" cy="6858000"/>
   <p:notesSz cx="6858000" cy="9144000"/>
@@ -205,7 +206,7 @@
           <a:p>
             <a:fld id="{C286FE0E-AE70-4079-8761-52C42E2F42E6}" type="datetimeFigureOut">
               <a:rPr lang="ko-KR" altLang="en-US" smtClean="0"/>
-              <a:t>2015-01-26</a:t>
+              <a:t>2015-02-02</a:t>
             </a:fld>
             <a:endParaRPr lang="ko-KR" altLang="en-US"/>
           </a:p>
@@ -542,7 +543,7 @@
           <a:p>
             <a:fld id="{8B50D7E7-3AE0-4223-AB1C-BF7CA8C4FBE4}" type="slidenum">
               <a:rPr lang="ko-KR" altLang="en-US" smtClean="0"/>
-              <a:t>2</a:t>
+              <a:t>3</a:t>
             </a:fld>
             <a:endParaRPr lang="ko-KR" altLang="en-US"/>
           </a:p>
@@ -634,7 +635,7 @@
           <a:p>
             <a:fld id="{8B50D7E7-3AE0-4223-AB1C-BF7CA8C4FBE4}" type="slidenum">
               <a:rPr lang="ko-KR" altLang="en-US" smtClean="0"/>
-              <a:t>3</a:t>
+              <a:t>4</a:t>
             </a:fld>
             <a:endParaRPr lang="ko-KR" altLang="en-US"/>
           </a:p>
@@ -726,7 +727,7 @@
           <a:p>
             <a:fld id="{8B50D7E7-3AE0-4223-AB1C-BF7CA8C4FBE4}" type="slidenum">
               <a:rPr lang="ko-KR" altLang="en-US" smtClean="0"/>
-              <a:t>4</a:t>
+              <a:t>5</a:t>
             </a:fld>
             <a:endParaRPr lang="ko-KR" altLang="en-US"/>
           </a:p>
@@ -814,7 +815,7 @@
           <a:p>
             <a:fld id="{8B50D7E7-3AE0-4223-AB1C-BF7CA8C4FBE4}" type="slidenum">
               <a:rPr lang="ko-KR" altLang="en-US" smtClean="0"/>
-              <a:t>5</a:t>
+              <a:t>6</a:t>
             </a:fld>
             <a:endParaRPr lang="ko-KR" altLang="en-US"/>
           </a:p>
@@ -906,7 +907,7 @@
           <a:p>
             <a:fld id="{8B50D7E7-3AE0-4223-AB1C-BF7CA8C4FBE4}" type="slidenum">
               <a:rPr lang="ko-KR" altLang="en-US" smtClean="0"/>
-              <a:t>6</a:t>
+              <a:t>7</a:t>
             </a:fld>
             <a:endParaRPr lang="ko-KR" altLang="en-US"/>
           </a:p>
@@ -994,7 +995,7 @@
           <a:p>
             <a:fld id="{8B50D7E7-3AE0-4223-AB1C-BF7CA8C4FBE4}" type="slidenum">
               <a:rPr lang="ko-KR" altLang="en-US" smtClean="0"/>
-              <a:t>7</a:t>
+              <a:t>8</a:t>
             </a:fld>
             <a:endParaRPr lang="ko-KR" altLang="en-US"/>
           </a:p>
@@ -1082,7 +1083,7 @@
           <a:p>
             <a:fld id="{8B50D7E7-3AE0-4223-AB1C-BF7CA8C4FBE4}" type="slidenum">
               <a:rPr lang="ko-KR" altLang="en-US" smtClean="0"/>
-              <a:t>8</a:t>
+              <a:t>9</a:t>
             </a:fld>
             <a:endParaRPr lang="ko-KR" altLang="en-US"/>
           </a:p>
@@ -1174,7 +1175,7 @@
           <a:p>
             <a:fld id="{8B50D7E7-3AE0-4223-AB1C-BF7CA8C4FBE4}" type="slidenum">
               <a:rPr lang="ko-KR" altLang="en-US" smtClean="0"/>
-              <a:t>9</a:t>
+              <a:t>10</a:t>
             </a:fld>
             <a:endParaRPr lang="ko-KR" altLang="en-US"/>
           </a:p>
@@ -1324,7 +1325,7 @@
           <a:p>
             <a:fld id="{F1050141-54FF-464A-81F0-F345D58890D6}" type="datetimeFigureOut">
               <a:rPr lang="ko-KR" altLang="en-US" smtClean="0"/>
-              <a:t>2015-01-26</a:t>
+              <a:t>2015-02-02</a:t>
             </a:fld>
             <a:endParaRPr lang="ko-KR" altLang="en-US"/>
           </a:p>
@@ -1494,7 +1495,7 @@
           <a:p>
             <a:fld id="{F1050141-54FF-464A-81F0-F345D58890D6}" type="datetimeFigureOut">
               <a:rPr lang="ko-KR" altLang="en-US" smtClean="0"/>
-              <a:t>2015-01-26</a:t>
+              <a:t>2015-02-02</a:t>
             </a:fld>
             <a:endParaRPr lang="ko-KR" altLang="en-US"/>
           </a:p>
@@ -1674,7 +1675,7 @@
           <a:p>
             <a:fld id="{F1050141-54FF-464A-81F0-F345D58890D6}" type="datetimeFigureOut">
               <a:rPr lang="ko-KR" altLang="en-US" smtClean="0"/>
-              <a:t>2015-01-26</a:t>
+              <a:t>2015-02-02</a:t>
             </a:fld>
             <a:endParaRPr lang="ko-KR" altLang="en-US"/>
           </a:p>
@@ -1844,7 +1845,7 @@
           <a:p>
             <a:fld id="{F1050141-54FF-464A-81F0-F345D58890D6}" type="datetimeFigureOut">
               <a:rPr lang="ko-KR" altLang="en-US" smtClean="0"/>
-              <a:t>2015-01-26</a:t>
+              <a:t>2015-02-02</a:t>
             </a:fld>
             <a:endParaRPr lang="ko-KR" altLang="en-US"/>
           </a:p>
@@ -2090,7 +2091,7 @@
           <a:p>
             <a:fld id="{F1050141-54FF-464A-81F0-F345D58890D6}" type="datetimeFigureOut">
               <a:rPr lang="ko-KR" altLang="en-US" smtClean="0"/>
-              <a:t>2015-01-26</a:t>
+              <a:t>2015-02-02</a:t>
             </a:fld>
             <a:endParaRPr lang="ko-KR" altLang="en-US"/>
           </a:p>
@@ -2322,7 +2323,7 @@
           <a:p>
             <a:fld id="{F1050141-54FF-464A-81F0-F345D58890D6}" type="datetimeFigureOut">
               <a:rPr lang="ko-KR" altLang="en-US" smtClean="0"/>
-              <a:t>2015-01-26</a:t>
+              <a:t>2015-02-02</a:t>
             </a:fld>
             <a:endParaRPr lang="ko-KR" altLang="en-US"/>
           </a:p>
@@ -2689,7 +2690,7 @@
           <a:p>
             <a:fld id="{F1050141-54FF-464A-81F0-F345D58890D6}" type="datetimeFigureOut">
               <a:rPr lang="ko-KR" altLang="en-US" smtClean="0"/>
-              <a:t>2015-01-26</a:t>
+              <a:t>2015-02-02</a:t>
             </a:fld>
             <a:endParaRPr lang="ko-KR" altLang="en-US"/>
           </a:p>
@@ -2807,7 +2808,7 @@
           <a:p>
             <a:fld id="{F1050141-54FF-464A-81F0-F345D58890D6}" type="datetimeFigureOut">
               <a:rPr lang="ko-KR" altLang="en-US" smtClean="0"/>
-              <a:t>2015-01-26</a:t>
+              <a:t>2015-02-02</a:t>
             </a:fld>
             <a:endParaRPr lang="ko-KR" altLang="en-US"/>
           </a:p>
@@ -2902,7 +2903,7 @@
           <a:p>
             <a:fld id="{F1050141-54FF-464A-81F0-F345D58890D6}" type="datetimeFigureOut">
               <a:rPr lang="ko-KR" altLang="en-US" smtClean="0"/>
-              <a:t>2015-01-26</a:t>
+              <a:t>2015-02-02</a:t>
             </a:fld>
             <a:endParaRPr lang="ko-KR" altLang="en-US"/>
           </a:p>
@@ -3179,7 +3180,7 @@
           <a:p>
             <a:fld id="{F1050141-54FF-464A-81F0-F345D58890D6}" type="datetimeFigureOut">
               <a:rPr lang="ko-KR" altLang="en-US" smtClean="0"/>
-              <a:t>2015-01-26</a:t>
+              <a:t>2015-02-02</a:t>
             </a:fld>
             <a:endParaRPr lang="ko-KR" altLang="en-US"/>
           </a:p>
@@ -3432,7 +3433,7 @@
           <a:p>
             <a:fld id="{F1050141-54FF-464A-81F0-F345D58890D6}" type="datetimeFigureOut">
               <a:rPr lang="ko-KR" altLang="en-US" smtClean="0"/>
-              <a:t>2015-01-26</a:t>
+              <a:t>2015-02-02</a:t>
             </a:fld>
             <a:endParaRPr lang="ko-KR" altLang="en-US"/>
           </a:p>
@@ -3645,7 +3646,7 @@
           <a:p>
             <a:fld id="{F1050141-54FF-464A-81F0-F345D58890D6}" type="datetimeFigureOut">
               <a:rPr lang="ko-KR" altLang="en-US" smtClean="0"/>
-              <a:t>2015-01-26</a:t>
+              <a:t>2015-02-02</a:t>
             </a:fld>
             <a:endParaRPr lang="ko-KR" altLang="en-US"/>
           </a:p>
@@ -4052,57 +4053,13 @@
       </p:grpSpPr>
       <p:sp>
         <p:nvSpPr>
-          <p:cNvPr id="4" name="모서리가 둥근 직사각형 3"/>
-          <p:cNvSpPr/>
-          <p:nvPr/>
-        </p:nvSpPr>
-        <p:spPr>
-          <a:xfrm>
-            <a:off x="3234266" y="956733"/>
-            <a:ext cx="5281084" cy="5281084"/>
-          </a:xfrm>
-          <a:prstGeom prst="roundRect">
-            <a:avLst/>
-          </a:prstGeom>
-          <a:noFill/>
-        </p:spPr>
-        <p:style>
-          <a:lnRef idx="2">
-            <a:schemeClr val="accent1">
-              <a:shade val="50000"/>
-            </a:schemeClr>
-          </a:lnRef>
-          <a:fillRef idx="1">
-            <a:schemeClr val="accent1"/>
-          </a:fillRef>
-          <a:effectRef idx="0">
-            <a:schemeClr val="accent1"/>
-          </a:effectRef>
-          <a:fontRef idx="minor">
-            <a:schemeClr val="lt1"/>
-          </a:fontRef>
-        </p:style>
-        <p:txBody>
-          <a:bodyPr wrap="square" lIns="0" tIns="0" rIns="0" bIns="0" rtlCol="0" anchor="ctr"/>
-          <a:lstStyle/>
-          <a:p>
-            <a:endParaRPr lang="ko-KR" altLang="en-US" sz="7200" b="1" dirty="0">
-              <a:solidFill>
-                <a:schemeClr val="tx1"/>
-              </a:solidFill>
-            </a:endParaRPr>
-          </a:p>
-        </p:txBody>
-      </p:sp>
-      <p:sp>
-        <p:nvSpPr>
           <p:cNvPr id="5" name="TextBox 4"/>
           <p:cNvSpPr txBox="1"/>
           <p:nvPr/>
         </p:nvSpPr>
         <p:spPr>
           <a:xfrm>
-            <a:off x="3579550" y="1335117"/>
+            <a:off x="2221530" y="1271742"/>
             <a:ext cx="7755200" cy="4524315"/>
           </a:xfrm>
           <a:prstGeom prst="rect">
@@ -4116,6 +4073,7 @@
           </a:bodyPr>
           <a:lstStyle/>
           <a:p>
+            <a:pPr algn="ctr"/>
             <a:r>
               <a:rPr lang="en-US" altLang="ko-KR" sz="9600" b="1" dirty="0" smtClean="0">
                 <a:solidFill>
@@ -4200,7 +4158,311 @@
 </p:sld>
 </file>
 
+<file path=ppt/slides/slide10.xml><?xml version="1.0" encoding="utf-8"?>
+<p:sld xmlns:a="http://schemas.openxmlformats.org/drawingml/2006/main" xmlns:r="http://schemas.openxmlformats.org/officeDocument/2006/relationships" xmlns:p="http://schemas.openxmlformats.org/presentationml/2006/main">
+  <p:cSld>
+    <p:spTree>
+      <p:nvGrpSpPr>
+        <p:cNvPr id="1" name=""/>
+        <p:cNvGrpSpPr/>
+        <p:nvPr/>
+      </p:nvGrpSpPr>
+      <p:grpSpPr>
+        <a:xfrm>
+          <a:off x="0" y="0"/>
+          <a:ext cx="0" cy="0"/>
+          <a:chOff x="0" y="0"/>
+          <a:chExt cx="0" cy="0"/>
+        </a:xfrm>
+      </p:grpSpPr>
+      <p:sp>
+        <p:nvSpPr>
+          <p:cNvPr id="2" name="모서리가 둥근 직사각형 1"/>
+          <p:cNvSpPr/>
+          <p:nvPr/>
+        </p:nvSpPr>
+        <p:spPr>
+          <a:xfrm>
+            <a:off x="4508627" y="1982711"/>
+            <a:ext cx="1575302" cy="1575302"/>
+          </a:xfrm>
+          <a:prstGeom prst="roundRect">
+            <a:avLst/>
+          </a:prstGeom>
+          <a:noFill/>
+          <a:ln w="38100">
+            <a:solidFill>
+              <a:srgbClr val="FF0000"/>
+            </a:solidFill>
+          </a:ln>
+        </p:spPr>
+        <p:style>
+          <a:lnRef idx="2">
+            <a:schemeClr val="accent1">
+              <a:shade val="50000"/>
+            </a:schemeClr>
+          </a:lnRef>
+          <a:fillRef idx="1">
+            <a:schemeClr val="accent1"/>
+          </a:fillRef>
+          <a:effectRef idx="0">
+            <a:schemeClr val="accent1"/>
+          </a:effectRef>
+          <a:fontRef idx="minor">
+            <a:schemeClr val="lt1"/>
+          </a:fontRef>
+        </p:style>
+        <p:txBody>
+          <a:bodyPr rtlCol="0" anchor="ctr"/>
+          <a:lstStyle/>
+          <a:p>
+            <a:pPr algn="ctr"/>
+            <a:endParaRPr lang="ko-KR" altLang="en-US"/>
+          </a:p>
+        </p:txBody>
+      </p:sp>
+      <p:sp>
+        <p:nvSpPr>
+          <p:cNvPr id="7" name="구름 6"/>
+          <p:cNvSpPr/>
+          <p:nvPr/>
+        </p:nvSpPr>
+        <p:spPr>
+          <a:xfrm>
+            <a:off x="4659703" y="2108703"/>
+            <a:ext cx="1195104" cy="928262"/>
+          </a:xfrm>
+          <a:prstGeom prst="cloud">
+            <a:avLst/>
+          </a:prstGeom>
+          <a:solidFill>
+            <a:srgbClr val="6DA6D9"/>
+          </a:solidFill>
+          <a:ln>
+            <a:noFill/>
+          </a:ln>
+        </p:spPr>
+        <p:style>
+          <a:lnRef idx="2">
+            <a:schemeClr val="accent1">
+              <a:shade val="50000"/>
+            </a:schemeClr>
+          </a:lnRef>
+          <a:fillRef idx="1">
+            <a:schemeClr val="accent1"/>
+          </a:fillRef>
+          <a:effectRef idx="0">
+            <a:schemeClr val="accent1"/>
+          </a:effectRef>
+          <a:fontRef idx="minor">
+            <a:schemeClr val="lt1"/>
+          </a:fontRef>
+        </p:style>
+        <p:txBody>
+          <a:bodyPr rtlCol="0" anchor="ctr"/>
+          <a:lstStyle/>
+          <a:p>
+            <a:pPr algn="ctr"/>
+            <a:endParaRPr lang="ko-KR" altLang="en-US" dirty="0"/>
+          </a:p>
+        </p:txBody>
+      </p:sp>
+      <p:sp>
+        <p:nvSpPr>
+          <p:cNvPr id="8" name="구름 7"/>
+          <p:cNvSpPr/>
+          <p:nvPr/>
+        </p:nvSpPr>
+        <p:spPr>
+          <a:xfrm>
+            <a:off x="5730841" y="3340729"/>
+            <a:ext cx="108642" cy="108642"/>
+          </a:xfrm>
+          <a:prstGeom prst="cloud">
+            <a:avLst/>
+          </a:prstGeom>
+          <a:solidFill>
+            <a:schemeClr val="accent1">
+              <a:lumMod val="40000"/>
+              <a:lumOff val="60000"/>
+            </a:schemeClr>
+          </a:solidFill>
+          <a:ln>
+            <a:noFill/>
+          </a:ln>
+        </p:spPr>
+        <p:style>
+          <a:lnRef idx="2">
+            <a:schemeClr val="accent1">
+              <a:shade val="50000"/>
+            </a:schemeClr>
+          </a:lnRef>
+          <a:fillRef idx="1">
+            <a:schemeClr val="accent1"/>
+          </a:fillRef>
+          <a:effectRef idx="0">
+            <a:schemeClr val="accent1"/>
+          </a:effectRef>
+          <a:fontRef idx="minor">
+            <a:schemeClr val="lt1"/>
+          </a:fontRef>
+        </p:style>
+        <p:txBody>
+          <a:bodyPr rtlCol="0" anchor="ctr"/>
+          <a:lstStyle/>
+          <a:p>
+            <a:pPr algn="ctr"/>
+            <a:endParaRPr lang="ko-KR" altLang="en-US"/>
+          </a:p>
+        </p:txBody>
+      </p:sp>
+      <p:sp>
+        <p:nvSpPr>
+          <p:cNvPr id="9" name="구름 8"/>
+          <p:cNvSpPr/>
+          <p:nvPr/>
+        </p:nvSpPr>
+        <p:spPr>
+          <a:xfrm>
+            <a:off x="5477344" y="3069644"/>
+            <a:ext cx="307818" cy="238406"/>
+          </a:xfrm>
+          <a:prstGeom prst="cloud">
+            <a:avLst/>
+          </a:prstGeom>
+          <a:solidFill>
+            <a:schemeClr val="accent1">
+              <a:lumMod val="60000"/>
+              <a:lumOff val="40000"/>
+            </a:schemeClr>
+          </a:solidFill>
+          <a:ln>
+            <a:noFill/>
+          </a:ln>
+        </p:spPr>
+        <p:style>
+          <a:lnRef idx="2">
+            <a:schemeClr val="accent1">
+              <a:shade val="50000"/>
+            </a:schemeClr>
+          </a:lnRef>
+          <a:fillRef idx="1">
+            <a:schemeClr val="accent1"/>
+          </a:fillRef>
+          <a:effectRef idx="0">
+            <a:schemeClr val="accent1"/>
+          </a:effectRef>
+          <a:fontRef idx="minor">
+            <a:schemeClr val="lt1"/>
+          </a:fontRef>
+        </p:style>
+        <p:txBody>
+          <a:bodyPr rtlCol="0" anchor="ctr"/>
+          <a:lstStyle/>
+          <a:p>
+            <a:pPr algn="ctr"/>
+            <a:endParaRPr lang="ko-KR" altLang="en-US"/>
+          </a:p>
+        </p:txBody>
+      </p:sp>
+    </p:spTree>
+    <p:extLst>
+      <p:ext uri="{BB962C8B-B14F-4D97-AF65-F5344CB8AC3E}">
+        <p14:creationId xmlns:p14="http://schemas.microsoft.com/office/powerpoint/2010/main" val="2371314192"/>
+      </p:ext>
+    </p:extLst>
+  </p:cSld>
+  <p:clrMapOvr>
+    <a:masterClrMapping/>
+  </p:clrMapOvr>
+  <p:timing>
+    <p:tnLst>
+      <p:par>
+        <p:cTn id="1" dur="indefinite" restart="never" nodeType="tmRoot"/>
+      </p:par>
+    </p:tnLst>
+  </p:timing>
+</p:sld>
+</file>
+
 <file path=ppt/slides/slide2.xml><?xml version="1.0" encoding="utf-8"?>
+<p:sld xmlns:a="http://schemas.openxmlformats.org/drawingml/2006/main" xmlns:r="http://schemas.openxmlformats.org/officeDocument/2006/relationships" xmlns:p="http://schemas.openxmlformats.org/presentationml/2006/main">
+  <p:cSld>
+    <p:spTree>
+      <p:nvGrpSpPr>
+        <p:cNvPr id="1" name=""/>
+        <p:cNvGrpSpPr/>
+        <p:nvPr/>
+      </p:nvGrpSpPr>
+      <p:grpSpPr>
+        <a:xfrm>
+          <a:off x="0" y="0"/>
+          <a:ext cx="0" cy="0"/>
+          <a:chOff x="0" y="0"/>
+          <a:chExt cx="0" cy="0"/>
+        </a:xfrm>
+      </p:grpSpPr>
+      <p:sp>
+        <p:nvSpPr>
+          <p:cNvPr id="2" name="TextBox 1"/>
+          <p:cNvSpPr txBox="1"/>
+          <p:nvPr/>
+        </p:nvSpPr>
+        <p:spPr>
+          <a:xfrm>
+            <a:off x="3639494" y="2462543"/>
+            <a:ext cx="4182700" cy="1569660"/>
+          </a:xfrm>
+          <a:prstGeom prst="rect">
+            <a:avLst/>
+          </a:prstGeom>
+          <a:noFill/>
+        </p:spPr>
+        <p:txBody>
+          <a:bodyPr wrap="square" rtlCol="0">
+            <a:spAutoFit/>
+          </a:bodyPr>
+          <a:lstStyle/>
+          <a:p>
+            <a:r>
+              <a:rPr lang="en-US" altLang="ko-KR" sz="4800" b="1" dirty="0" smtClean="0"/>
+              <a:t>S &amp; Y </a:t>
+            </a:r>
+          </a:p>
+          <a:p>
+            <a:r>
+              <a:rPr lang="en-US" altLang="ko-KR" sz="4800" b="1" dirty="0"/>
+              <a:t> </a:t>
+            </a:r>
+            <a:r>
+              <a:rPr lang="en-US" altLang="ko-KR" sz="4800" b="1" dirty="0" smtClean="0"/>
+              <a:t>    Memories</a:t>
+            </a:r>
+            <a:endParaRPr lang="ko-KR" altLang="en-US" sz="4800" b="1" dirty="0"/>
+          </a:p>
+        </p:txBody>
+      </p:sp>
+    </p:spTree>
+    <p:extLst>
+      <p:ext uri="{BB962C8B-B14F-4D97-AF65-F5344CB8AC3E}">
+        <p14:creationId xmlns:p14="http://schemas.microsoft.com/office/powerpoint/2010/main" val="3078360136"/>
+      </p:ext>
+    </p:extLst>
+  </p:cSld>
+  <p:clrMapOvr>
+    <a:masterClrMapping/>
+  </p:clrMapOvr>
+  <p:timing>
+    <p:tnLst>
+      <p:par>
+        <p:cTn id="1" dur="indefinite" restart="never" nodeType="tmRoot"/>
+      </p:par>
+    </p:tnLst>
+  </p:timing>
+</p:sld>
+</file>
+
+<file path=ppt/slides/slide3.xml><?xml version="1.0" encoding="utf-8"?>
 <p:sld xmlns:a="http://schemas.openxmlformats.org/drawingml/2006/main" xmlns:r="http://schemas.openxmlformats.org/officeDocument/2006/relationships" xmlns:p="http://schemas.openxmlformats.org/presentationml/2006/main">
   <p:cSld>
     <p:spTree>
@@ -4652,6 +4914,11 @@
             <a:avLst/>
           </a:prstGeom>
           <a:noFill/>
+          <a:ln>
+            <a:solidFill>
+              <a:schemeClr val="bg1"/>
+            </a:solidFill>
+          </a:ln>
         </p:spPr>
         <p:style>
           <a:lnRef idx="2">
@@ -4701,7 +4968,7 @@
 </p:sld>
 </file>
 
-<file path=ppt/slides/slide3.xml><?xml version="1.0" encoding="utf-8"?>
+<file path=ppt/slides/slide4.xml><?xml version="1.0" encoding="utf-8"?>
 <p:sld xmlns:a="http://schemas.openxmlformats.org/drawingml/2006/main" xmlns:r="http://schemas.openxmlformats.org/officeDocument/2006/relationships" xmlns:p="http://schemas.openxmlformats.org/presentationml/2006/main">
   <p:cSld>
     <p:spTree>
@@ -5234,7 +5501,7 @@
 </p:sld>
 </file>
 
-<file path=ppt/slides/slide4.xml><?xml version="1.0" encoding="utf-8"?>
+<file path=ppt/slides/slide5.xml><?xml version="1.0" encoding="utf-8"?>
 <p:sld xmlns:a="http://schemas.openxmlformats.org/drawingml/2006/main" xmlns:r="http://schemas.openxmlformats.org/officeDocument/2006/relationships" xmlns:p="http://schemas.openxmlformats.org/presentationml/2006/main">
   <p:cSld>
     <p:spTree>
@@ -5421,7 +5688,7 @@
 </p:sld>
 </file>
 
-<file path=ppt/slides/slide5.xml><?xml version="1.0" encoding="utf-8"?>
+<file path=ppt/slides/slide6.xml><?xml version="1.0" encoding="utf-8"?>
 <p:sld xmlns:a="http://schemas.openxmlformats.org/drawingml/2006/main" xmlns:r="http://schemas.openxmlformats.org/officeDocument/2006/relationships" xmlns:p="http://schemas.openxmlformats.org/presentationml/2006/main">
   <p:cSld>
     <p:spTree>
@@ -5506,7 +5773,7 @@
 </p:sld>
 </file>
 
-<file path=ppt/slides/slide6.xml><?xml version="1.0" encoding="utf-8"?>
+<file path=ppt/slides/slide7.xml><?xml version="1.0" encoding="utf-8"?>
 <p:sld xmlns:a="http://schemas.openxmlformats.org/drawingml/2006/main" xmlns:r="http://schemas.openxmlformats.org/officeDocument/2006/relationships" xmlns:p="http://schemas.openxmlformats.org/presentationml/2006/main">
   <p:cSld>
     <p:spTree>
@@ -5686,7 +5953,7 @@
 </p:sld>
 </file>
 
-<file path=ppt/slides/slide7.xml><?xml version="1.0" encoding="utf-8"?>
+<file path=ppt/slides/slide8.xml><?xml version="1.0" encoding="utf-8"?>
 <p:sld xmlns:a="http://schemas.openxmlformats.org/drawingml/2006/main" xmlns:r="http://schemas.openxmlformats.org/officeDocument/2006/relationships" xmlns:p="http://schemas.openxmlformats.org/presentationml/2006/main">
   <p:cSld>
     <p:spTree>
@@ -6155,7 +6422,7 @@
 </p:sld>
 </file>
 
-<file path=ppt/slides/slide8.xml><?xml version="1.0" encoding="utf-8"?>
+<file path=ppt/slides/slide9.xml><?xml version="1.0" encoding="utf-8"?>
 <p:sld xmlns:a="http://schemas.openxmlformats.org/drawingml/2006/main" xmlns:r="http://schemas.openxmlformats.org/officeDocument/2006/relationships" xmlns:p="http://schemas.openxmlformats.org/presentationml/2006/main">
   <p:cSld>
     <p:spTree>
@@ -6249,233 +6516,6 @@
     <p:extLst>
       <p:ext uri="{BB962C8B-B14F-4D97-AF65-F5344CB8AC3E}">
         <p14:creationId xmlns:p14="http://schemas.microsoft.com/office/powerpoint/2010/main" val="1276182355"/>
-      </p:ext>
-    </p:extLst>
-  </p:cSld>
-  <p:clrMapOvr>
-    <a:masterClrMapping/>
-  </p:clrMapOvr>
-  <p:timing>
-    <p:tnLst>
-      <p:par>
-        <p:cTn id="1" dur="indefinite" restart="never" nodeType="tmRoot"/>
-      </p:par>
-    </p:tnLst>
-  </p:timing>
-</p:sld>
-</file>
-
-<file path=ppt/slides/slide9.xml><?xml version="1.0" encoding="utf-8"?>
-<p:sld xmlns:a="http://schemas.openxmlformats.org/drawingml/2006/main" xmlns:r="http://schemas.openxmlformats.org/officeDocument/2006/relationships" xmlns:p="http://schemas.openxmlformats.org/presentationml/2006/main">
-  <p:cSld>
-    <p:spTree>
-      <p:nvGrpSpPr>
-        <p:cNvPr id="1" name=""/>
-        <p:cNvGrpSpPr/>
-        <p:nvPr/>
-      </p:nvGrpSpPr>
-      <p:grpSpPr>
-        <a:xfrm>
-          <a:off x="0" y="0"/>
-          <a:ext cx="0" cy="0"/>
-          <a:chOff x="0" y="0"/>
-          <a:chExt cx="0" cy="0"/>
-        </a:xfrm>
-      </p:grpSpPr>
-      <p:sp>
-        <p:nvSpPr>
-          <p:cNvPr id="2" name="모서리가 둥근 직사각형 1"/>
-          <p:cNvSpPr/>
-          <p:nvPr/>
-        </p:nvSpPr>
-        <p:spPr>
-          <a:xfrm>
-            <a:off x="4508627" y="1982711"/>
-            <a:ext cx="1575302" cy="1575302"/>
-          </a:xfrm>
-          <a:prstGeom prst="roundRect">
-            <a:avLst/>
-          </a:prstGeom>
-          <a:noFill/>
-          <a:ln w="38100">
-            <a:solidFill>
-              <a:srgbClr val="FF0000"/>
-            </a:solidFill>
-          </a:ln>
-        </p:spPr>
-        <p:style>
-          <a:lnRef idx="2">
-            <a:schemeClr val="accent1">
-              <a:shade val="50000"/>
-            </a:schemeClr>
-          </a:lnRef>
-          <a:fillRef idx="1">
-            <a:schemeClr val="accent1"/>
-          </a:fillRef>
-          <a:effectRef idx="0">
-            <a:schemeClr val="accent1"/>
-          </a:effectRef>
-          <a:fontRef idx="minor">
-            <a:schemeClr val="lt1"/>
-          </a:fontRef>
-        </p:style>
-        <p:txBody>
-          <a:bodyPr rtlCol="0" anchor="ctr"/>
-          <a:lstStyle/>
-          <a:p>
-            <a:pPr algn="ctr"/>
-            <a:endParaRPr lang="ko-KR" altLang="en-US"/>
-          </a:p>
-        </p:txBody>
-      </p:sp>
-      <p:sp>
-        <p:nvSpPr>
-          <p:cNvPr id="7" name="구름 6"/>
-          <p:cNvSpPr/>
-          <p:nvPr/>
-        </p:nvSpPr>
-        <p:spPr>
-          <a:xfrm>
-            <a:off x="4659703" y="2108703"/>
-            <a:ext cx="1195104" cy="928262"/>
-          </a:xfrm>
-          <a:prstGeom prst="cloud">
-            <a:avLst/>
-          </a:prstGeom>
-          <a:solidFill>
-            <a:srgbClr val="6DA6D9"/>
-          </a:solidFill>
-          <a:ln>
-            <a:noFill/>
-          </a:ln>
-        </p:spPr>
-        <p:style>
-          <a:lnRef idx="2">
-            <a:schemeClr val="accent1">
-              <a:shade val="50000"/>
-            </a:schemeClr>
-          </a:lnRef>
-          <a:fillRef idx="1">
-            <a:schemeClr val="accent1"/>
-          </a:fillRef>
-          <a:effectRef idx="0">
-            <a:schemeClr val="accent1"/>
-          </a:effectRef>
-          <a:fontRef idx="minor">
-            <a:schemeClr val="lt1"/>
-          </a:fontRef>
-        </p:style>
-        <p:txBody>
-          <a:bodyPr rtlCol="0" anchor="ctr"/>
-          <a:lstStyle/>
-          <a:p>
-            <a:pPr algn="ctr"/>
-            <a:endParaRPr lang="ko-KR" altLang="en-US" dirty="0"/>
-          </a:p>
-        </p:txBody>
-      </p:sp>
-      <p:sp>
-        <p:nvSpPr>
-          <p:cNvPr id="8" name="구름 7"/>
-          <p:cNvSpPr/>
-          <p:nvPr/>
-        </p:nvSpPr>
-        <p:spPr>
-          <a:xfrm>
-            <a:off x="5730841" y="3340729"/>
-            <a:ext cx="108642" cy="108642"/>
-          </a:xfrm>
-          <a:prstGeom prst="cloud">
-            <a:avLst/>
-          </a:prstGeom>
-          <a:solidFill>
-            <a:schemeClr val="accent1">
-              <a:lumMod val="40000"/>
-              <a:lumOff val="60000"/>
-            </a:schemeClr>
-          </a:solidFill>
-          <a:ln>
-            <a:noFill/>
-          </a:ln>
-        </p:spPr>
-        <p:style>
-          <a:lnRef idx="2">
-            <a:schemeClr val="accent1">
-              <a:shade val="50000"/>
-            </a:schemeClr>
-          </a:lnRef>
-          <a:fillRef idx="1">
-            <a:schemeClr val="accent1"/>
-          </a:fillRef>
-          <a:effectRef idx="0">
-            <a:schemeClr val="accent1"/>
-          </a:effectRef>
-          <a:fontRef idx="minor">
-            <a:schemeClr val="lt1"/>
-          </a:fontRef>
-        </p:style>
-        <p:txBody>
-          <a:bodyPr rtlCol="0" anchor="ctr"/>
-          <a:lstStyle/>
-          <a:p>
-            <a:pPr algn="ctr"/>
-            <a:endParaRPr lang="ko-KR" altLang="en-US"/>
-          </a:p>
-        </p:txBody>
-      </p:sp>
-      <p:sp>
-        <p:nvSpPr>
-          <p:cNvPr id="9" name="구름 8"/>
-          <p:cNvSpPr/>
-          <p:nvPr/>
-        </p:nvSpPr>
-        <p:spPr>
-          <a:xfrm>
-            <a:off x="5477344" y="3069644"/>
-            <a:ext cx="307818" cy="238406"/>
-          </a:xfrm>
-          <a:prstGeom prst="cloud">
-            <a:avLst/>
-          </a:prstGeom>
-          <a:solidFill>
-            <a:schemeClr val="accent1">
-              <a:lumMod val="60000"/>
-              <a:lumOff val="40000"/>
-            </a:schemeClr>
-          </a:solidFill>
-          <a:ln>
-            <a:noFill/>
-          </a:ln>
-        </p:spPr>
-        <p:style>
-          <a:lnRef idx="2">
-            <a:schemeClr val="accent1">
-              <a:shade val="50000"/>
-            </a:schemeClr>
-          </a:lnRef>
-          <a:fillRef idx="1">
-            <a:schemeClr val="accent1"/>
-          </a:fillRef>
-          <a:effectRef idx="0">
-            <a:schemeClr val="accent1"/>
-          </a:effectRef>
-          <a:fontRef idx="minor">
-            <a:schemeClr val="lt1"/>
-          </a:fontRef>
-        </p:style>
-        <p:txBody>
-          <a:bodyPr rtlCol="0" anchor="ctr"/>
-          <a:lstStyle/>
-          <a:p>
-            <a:pPr algn="ctr"/>
-            <a:endParaRPr lang="ko-KR" altLang="en-US"/>
-          </a:p>
-        </p:txBody>
-      </p:sp>
-    </p:spTree>
-    <p:extLst>
-      <p:ext uri="{BB962C8B-B14F-4D97-AF65-F5344CB8AC3E}">
-        <p14:creationId xmlns:p14="http://schemas.microsoft.com/office/powerpoint/2010/main" val="2371314192"/>
       </p:ext>
     </p:extLst>
   </p:cSld>

</xml_diff>

<commit_message>
btn_sound image & merge
</commit_message>
<xml_diff>
--- a/icon.pptx
+++ b/icon.pptx
@@ -5,7 +5,7 @@
     <p:sldMasterId id="2147483648" r:id="rId1"/>
   </p:sldMasterIdLst>
   <p:notesMasterIdLst>
-    <p:notesMasterId r:id="rId15"/>
+    <p:notesMasterId r:id="rId16"/>
   </p:notesMasterIdLst>
   <p:sldIdLst>
     <p:sldId id="256" r:id="rId2"/>
@@ -21,6 +21,7 @@
     <p:sldId id="263" r:id="rId12"/>
     <p:sldId id="264" r:id="rId13"/>
     <p:sldId id="266" r:id="rId14"/>
+    <p:sldId id="269" r:id="rId15"/>
   </p:sldIdLst>
   <p:sldSz cx="12192000" cy="6858000"/>
   <p:notesSz cx="6858000" cy="9144000"/>
@@ -209,7 +210,7 @@
           <a:p>
             <a:fld id="{C286FE0E-AE70-4079-8761-52C42E2F42E6}" type="datetimeFigureOut">
               <a:rPr lang="ko-KR" altLang="en-US" smtClean="0"/>
-              <a:t>2015-02-17</a:t>
+              <a:t>2015-02-20</a:t>
             </a:fld>
             <a:endParaRPr lang="ko-KR" altLang="en-US"/>
           </a:p>
@@ -741,6 +742,90 @@
 </p:notes>
 </file>
 
+<file path=ppt/notesSlides/notesSlide12.xml><?xml version="1.0" encoding="utf-8"?>
+<p:notes xmlns:a="http://schemas.openxmlformats.org/drawingml/2006/main" xmlns:r="http://schemas.openxmlformats.org/officeDocument/2006/relationships" xmlns:p="http://schemas.openxmlformats.org/presentationml/2006/main">
+  <p:cSld>
+    <p:spTree>
+      <p:nvGrpSpPr>
+        <p:cNvPr id="1" name=""/>
+        <p:cNvGrpSpPr/>
+        <p:nvPr/>
+      </p:nvGrpSpPr>
+      <p:grpSpPr>
+        <a:xfrm>
+          <a:off x="0" y="0"/>
+          <a:ext cx="0" cy="0"/>
+          <a:chOff x="0" y="0"/>
+          <a:chExt cx="0" cy="0"/>
+        </a:xfrm>
+      </p:grpSpPr>
+      <p:sp>
+        <p:nvSpPr>
+          <p:cNvPr id="2" name="슬라이드 이미지 개체 틀 1"/>
+          <p:cNvSpPr>
+            <a:spLocks noGrp="1" noRot="1" noChangeAspect="1"/>
+          </p:cNvSpPr>
+          <p:nvPr>
+            <p:ph type="sldImg"/>
+          </p:nvPr>
+        </p:nvSpPr>
+        <p:spPr/>
+      </p:sp>
+      <p:sp>
+        <p:nvSpPr>
+          <p:cNvPr id="3" name="슬라이드 노트 개체 틀 2"/>
+          <p:cNvSpPr>
+            <a:spLocks noGrp="1"/>
+          </p:cNvSpPr>
+          <p:nvPr>
+            <p:ph type="body" idx="1"/>
+          </p:nvPr>
+        </p:nvSpPr>
+        <p:spPr/>
+        <p:txBody>
+          <a:bodyPr/>
+          <a:lstStyle/>
+          <a:p>
+            <a:endParaRPr lang="ko-KR" altLang="en-US" dirty="0"/>
+          </a:p>
+        </p:txBody>
+      </p:sp>
+      <p:sp>
+        <p:nvSpPr>
+          <p:cNvPr id="4" name="슬라이드 번호 개체 틀 3"/>
+          <p:cNvSpPr>
+            <a:spLocks noGrp="1"/>
+          </p:cNvSpPr>
+          <p:nvPr>
+            <p:ph type="sldNum" sz="quarter" idx="10"/>
+          </p:nvPr>
+        </p:nvSpPr>
+        <p:spPr/>
+        <p:txBody>
+          <a:bodyPr/>
+          <a:lstStyle/>
+          <a:p>
+            <a:fld id="{8B50D7E7-3AE0-4223-AB1C-BF7CA8C4FBE4}" type="slidenum">
+              <a:rPr lang="ko-KR" altLang="en-US" smtClean="0"/>
+              <a:t>14</a:t>
+            </a:fld>
+            <a:endParaRPr lang="ko-KR" altLang="en-US"/>
+          </a:p>
+        </p:txBody>
+      </p:sp>
+    </p:spTree>
+    <p:extLst>
+      <p:ext uri="{BB962C8B-B14F-4D97-AF65-F5344CB8AC3E}">
+        <p14:creationId xmlns:p14="http://schemas.microsoft.com/office/powerpoint/2010/main" val="2632451310"/>
+      </p:ext>
+    </p:extLst>
+  </p:cSld>
+  <p:clrMapOvr>
+    <a:masterClrMapping/>
+  </p:clrMapOvr>
+</p:notes>
+</file>
+
 <file path=ppt/notesSlides/notesSlide2.xml><?xml version="1.0" encoding="utf-8"?>
 <p:notes xmlns:a="http://schemas.openxmlformats.org/drawingml/2006/main" xmlns:r="http://schemas.openxmlformats.org/officeDocument/2006/relationships" xmlns:p="http://schemas.openxmlformats.org/presentationml/2006/main">
   <p:cSld>
@@ -1596,7 +1681,7 @@
           <a:p>
             <a:fld id="{F1050141-54FF-464A-81F0-F345D58890D6}" type="datetimeFigureOut">
               <a:rPr lang="ko-KR" altLang="en-US" smtClean="0"/>
-              <a:t>2015-02-17</a:t>
+              <a:t>2015-02-20</a:t>
             </a:fld>
             <a:endParaRPr lang="ko-KR" altLang="en-US"/>
           </a:p>
@@ -1766,7 +1851,7 @@
           <a:p>
             <a:fld id="{F1050141-54FF-464A-81F0-F345D58890D6}" type="datetimeFigureOut">
               <a:rPr lang="ko-KR" altLang="en-US" smtClean="0"/>
-              <a:t>2015-02-17</a:t>
+              <a:t>2015-02-20</a:t>
             </a:fld>
             <a:endParaRPr lang="ko-KR" altLang="en-US"/>
           </a:p>
@@ -1946,7 +2031,7 @@
           <a:p>
             <a:fld id="{F1050141-54FF-464A-81F0-F345D58890D6}" type="datetimeFigureOut">
               <a:rPr lang="ko-KR" altLang="en-US" smtClean="0"/>
-              <a:t>2015-02-17</a:t>
+              <a:t>2015-02-20</a:t>
             </a:fld>
             <a:endParaRPr lang="ko-KR" altLang="en-US"/>
           </a:p>
@@ -2116,7 +2201,7 @@
           <a:p>
             <a:fld id="{F1050141-54FF-464A-81F0-F345D58890D6}" type="datetimeFigureOut">
               <a:rPr lang="ko-KR" altLang="en-US" smtClean="0"/>
-              <a:t>2015-02-17</a:t>
+              <a:t>2015-02-20</a:t>
             </a:fld>
             <a:endParaRPr lang="ko-KR" altLang="en-US"/>
           </a:p>
@@ -2362,7 +2447,7 @@
           <a:p>
             <a:fld id="{F1050141-54FF-464A-81F0-F345D58890D6}" type="datetimeFigureOut">
               <a:rPr lang="ko-KR" altLang="en-US" smtClean="0"/>
-              <a:t>2015-02-17</a:t>
+              <a:t>2015-02-20</a:t>
             </a:fld>
             <a:endParaRPr lang="ko-KR" altLang="en-US"/>
           </a:p>
@@ -2594,7 +2679,7 @@
           <a:p>
             <a:fld id="{F1050141-54FF-464A-81F0-F345D58890D6}" type="datetimeFigureOut">
               <a:rPr lang="ko-KR" altLang="en-US" smtClean="0"/>
-              <a:t>2015-02-17</a:t>
+              <a:t>2015-02-20</a:t>
             </a:fld>
             <a:endParaRPr lang="ko-KR" altLang="en-US"/>
           </a:p>
@@ -2961,7 +3046,7 @@
           <a:p>
             <a:fld id="{F1050141-54FF-464A-81F0-F345D58890D6}" type="datetimeFigureOut">
               <a:rPr lang="ko-KR" altLang="en-US" smtClean="0"/>
-              <a:t>2015-02-17</a:t>
+              <a:t>2015-02-20</a:t>
             </a:fld>
             <a:endParaRPr lang="ko-KR" altLang="en-US"/>
           </a:p>
@@ -3079,7 +3164,7 @@
           <a:p>
             <a:fld id="{F1050141-54FF-464A-81F0-F345D58890D6}" type="datetimeFigureOut">
               <a:rPr lang="ko-KR" altLang="en-US" smtClean="0"/>
-              <a:t>2015-02-17</a:t>
+              <a:t>2015-02-20</a:t>
             </a:fld>
             <a:endParaRPr lang="ko-KR" altLang="en-US"/>
           </a:p>
@@ -3174,7 +3259,7 @@
           <a:p>
             <a:fld id="{F1050141-54FF-464A-81F0-F345D58890D6}" type="datetimeFigureOut">
               <a:rPr lang="ko-KR" altLang="en-US" smtClean="0"/>
-              <a:t>2015-02-17</a:t>
+              <a:t>2015-02-20</a:t>
             </a:fld>
             <a:endParaRPr lang="ko-KR" altLang="en-US"/>
           </a:p>
@@ -3451,7 +3536,7 @@
           <a:p>
             <a:fld id="{F1050141-54FF-464A-81F0-F345D58890D6}" type="datetimeFigureOut">
               <a:rPr lang="ko-KR" altLang="en-US" smtClean="0"/>
-              <a:t>2015-02-17</a:t>
+              <a:t>2015-02-20</a:t>
             </a:fld>
             <a:endParaRPr lang="ko-KR" altLang="en-US"/>
           </a:p>
@@ -3704,7 +3789,7 @@
           <a:p>
             <a:fld id="{F1050141-54FF-464A-81F0-F345D58890D6}" type="datetimeFigureOut">
               <a:rPr lang="ko-KR" altLang="en-US" smtClean="0"/>
-              <a:t>2015-02-17</a:t>
+              <a:t>2015-02-20</a:t>
             </a:fld>
             <a:endParaRPr lang="ko-KR" altLang="en-US"/>
           </a:p>
@@ -3917,7 +4002,7 @@
           <a:p>
             <a:fld id="{F1050141-54FF-464A-81F0-F345D58890D6}" type="datetimeFigureOut">
               <a:rPr lang="ko-KR" altLang="en-US" smtClean="0"/>
-              <a:t>2015-02-17</a:t>
+              <a:t>2015-02-20</a:t>
             </a:fld>
             <a:endParaRPr lang="ko-KR" altLang="en-US"/>
           </a:p>
@@ -5682,6 +5767,119 @@
     <p:extLst>
       <p:ext uri="{BB962C8B-B14F-4D97-AF65-F5344CB8AC3E}">
         <p14:creationId xmlns:p14="http://schemas.microsoft.com/office/powerpoint/2010/main" val="493949996"/>
+      </p:ext>
+    </p:extLst>
+  </p:cSld>
+  <p:clrMapOvr>
+    <a:masterClrMapping/>
+  </p:clrMapOvr>
+  <p:timing>
+    <p:tnLst>
+      <p:par>
+        <p:cTn id="1" dur="indefinite" restart="never" nodeType="tmRoot"/>
+      </p:par>
+    </p:tnLst>
+  </p:timing>
+</p:sld>
+</file>
+
+<file path=ppt/slides/slide14.xml><?xml version="1.0" encoding="utf-8"?>
+<p:sld xmlns:a="http://schemas.openxmlformats.org/drawingml/2006/main" xmlns:r="http://schemas.openxmlformats.org/officeDocument/2006/relationships" xmlns:p="http://schemas.openxmlformats.org/presentationml/2006/main">
+  <p:cSld>
+    <p:spTree>
+      <p:nvGrpSpPr>
+        <p:cNvPr id="1" name=""/>
+        <p:cNvGrpSpPr/>
+        <p:nvPr/>
+      </p:nvGrpSpPr>
+      <p:grpSpPr>
+        <a:xfrm>
+          <a:off x="0" y="0"/>
+          <a:ext cx="0" cy="0"/>
+          <a:chOff x="0" y="0"/>
+          <a:chExt cx="0" cy="0"/>
+        </a:xfrm>
+      </p:grpSpPr>
+      <p:pic>
+        <p:nvPicPr>
+          <p:cNvPr id="2" name="그림 1"/>
+          <p:cNvPicPr>
+            <a:picLocks noChangeAspect="1"/>
+          </p:cNvPicPr>
+          <p:nvPr/>
+        </p:nvPicPr>
+        <p:blipFill>
+          <a:blip r:embed="rId3">
+            <a:extLst>
+              <a:ext uri="{28A0092B-C50C-407E-A947-70E740481C1C}">
+                <a14:useLocalDpi xmlns:a14="http://schemas.microsoft.com/office/drawing/2010/main" val="0"/>
+              </a:ext>
+            </a:extLst>
+          </a:blip>
+          <a:stretch>
+            <a:fillRect/>
+          </a:stretch>
+        </p:blipFill>
+        <p:spPr>
+          <a:xfrm>
+            <a:off x="5562600" y="2773680"/>
+            <a:ext cx="1219200" cy="1219200"/>
+          </a:xfrm>
+          <a:prstGeom prst="rect">
+            <a:avLst/>
+          </a:prstGeom>
+        </p:spPr>
+      </p:pic>
+      <p:sp>
+        <p:nvSpPr>
+          <p:cNvPr id="6" name="타원 5"/>
+          <p:cNvSpPr/>
+          <p:nvPr/>
+        </p:nvSpPr>
+        <p:spPr>
+          <a:xfrm>
+            <a:off x="5379720" y="2590800"/>
+            <a:ext cx="1584960" cy="1584960"/>
+          </a:xfrm>
+          <a:prstGeom prst="ellipse">
+            <a:avLst/>
+          </a:prstGeom>
+          <a:noFill/>
+          <a:ln w="38100">
+            <a:solidFill>
+              <a:srgbClr val="FF0000"/>
+            </a:solidFill>
+          </a:ln>
+        </p:spPr>
+        <p:style>
+          <a:lnRef idx="2">
+            <a:schemeClr val="accent1">
+              <a:shade val="50000"/>
+            </a:schemeClr>
+          </a:lnRef>
+          <a:fillRef idx="1">
+            <a:schemeClr val="accent1"/>
+          </a:fillRef>
+          <a:effectRef idx="0">
+            <a:schemeClr val="accent1"/>
+          </a:effectRef>
+          <a:fontRef idx="minor">
+            <a:schemeClr val="lt1"/>
+          </a:fontRef>
+        </p:style>
+        <p:txBody>
+          <a:bodyPr rtlCol="0" anchor="ctr"/>
+          <a:lstStyle/>
+          <a:p>
+            <a:pPr algn="ctr"/>
+            <a:endParaRPr lang="ko-KR" altLang="en-US"/>
+          </a:p>
+        </p:txBody>
+      </p:sp>
+    </p:spTree>
+    <p:extLst>
+      <p:ext uri="{BB962C8B-B14F-4D97-AF65-F5344CB8AC3E}">
+        <p14:creationId xmlns:p14="http://schemas.microsoft.com/office/powerpoint/2010/main" val="4263305915"/>
       </p:ext>
     </p:extLst>
   </p:cSld>

</xml_diff>

<commit_message>
image icon change & sound save
</commit_message>
<xml_diff>
--- a/icon.pptx
+++ b/icon.pptx
@@ -5,7 +5,7 @@
     <p:sldMasterId id="2147483648" r:id="rId1"/>
   </p:sldMasterIdLst>
   <p:notesMasterIdLst>
-    <p:notesMasterId r:id="rId16"/>
+    <p:notesMasterId r:id="rId19"/>
   </p:notesMasterIdLst>
   <p:sldIdLst>
     <p:sldId id="256" r:id="rId2"/>
@@ -22,6 +22,9 @@
     <p:sldId id="264" r:id="rId13"/>
     <p:sldId id="266" r:id="rId14"/>
     <p:sldId id="269" r:id="rId15"/>
+    <p:sldId id="271" r:id="rId16"/>
+    <p:sldId id="272" r:id="rId17"/>
+    <p:sldId id="273" r:id="rId18"/>
   </p:sldIdLst>
   <p:sldSz cx="12192000" cy="6858000"/>
   <p:notesSz cx="6858000" cy="9144000"/>
@@ -210,7 +213,7 @@
           <a:p>
             <a:fld id="{C286FE0E-AE70-4079-8761-52C42E2F42E6}" type="datetimeFigureOut">
               <a:rPr lang="ko-KR" altLang="en-US" smtClean="0"/>
-              <a:t>2015-02-20</a:t>
+              <a:t>2015-02-23</a:t>
             </a:fld>
             <a:endParaRPr lang="ko-KR" altLang="en-US"/>
           </a:p>
@@ -1681,7 +1684,7 @@
           <a:p>
             <a:fld id="{F1050141-54FF-464A-81F0-F345D58890D6}" type="datetimeFigureOut">
               <a:rPr lang="ko-KR" altLang="en-US" smtClean="0"/>
-              <a:t>2015-02-20</a:t>
+              <a:t>2015-02-23</a:t>
             </a:fld>
             <a:endParaRPr lang="ko-KR" altLang="en-US"/>
           </a:p>
@@ -1851,7 +1854,7 @@
           <a:p>
             <a:fld id="{F1050141-54FF-464A-81F0-F345D58890D6}" type="datetimeFigureOut">
               <a:rPr lang="ko-KR" altLang="en-US" smtClean="0"/>
-              <a:t>2015-02-20</a:t>
+              <a:t>2015-02-23</a:t>
             </a:fld>
             <a:endParaRPr lang="ko-KR" altLang="en-US"/>
           </a:p>
@@ -2031,7 +2034,7 @@
           <a:p>
             <a:fld id="{F1050141-54FF-464A-81F0-F345D58890D6}" type="datetimeFigureOut">
               <a:rPr lang="ko-KR" altLang="en-US" smtClean="0"/>
-              <a:t>2015-02-20</a:t>
+              <a:t>2015-02-23</a:t>
             </a:fld>
             <a:endParaRPr lang="ko-KR" altLang="en-US"/>
           </a:p>
@@ -2201,7 +2204,7 @@
           <a:p>
             <a:fld id="{F1050141-54FF-464A-81F0-F345D58890D6}" type="datetimeFigureOut">
               <a:rPr lang="ko-KR" altLang="en-US" smtClean="0"/>
-              <a:t>2015-02-20</a:t>
+              <a:t>2015-02-23</a:t>
             </a:fld>
             <a:endParaRPr lang="ko-KR" altLang="en-US"/>
           </a:p>
@@ -2447,7 +2450,7 @@
           <a:p>
             <a:fld id="{F1050141-54FF-464A-81F0-F345D58890D6}" type="datetimeFigureOut">
               <a:rPr lang="ko-KR" altLang="en-US" smtClean="0"/>
-              <a:t>2015-02-20</a:t>
+              <a:t>2015-02-23</a:t>
             </a:fld>
             <a:endParaRPr lang="ko-KR" altLang="en-US"/>
           </a:p>
@@ -2679,7 +2682,7 @@
           <a:p>
             <a:fld id="{F1050141-54FF-464A-81F0-F345D58890D6}" type="datetimeFigureOut">
               <a:rPr lang="ko-KR" altLang="en-US" smtClean="0"/>
-              <a:t>2015-02-20</a:t>
+              <a:t>2015-02-23</a:t>
             </a:fld>
             <a:endParaRPr lang="ko-KR" altLang="en-US"/>
           </a:p>
@@ -3046,7 +3049,7 @@
           <a:p>
             <a:fld id="{F1050141-54FF-464A-81F0-F345D58890D6}" type="datetimeFigureOut">
               <a:rPr lang="ko-KR" altLang="en-US" smtClean="0"/>
-              <a:t>2015-02-20</a:t>
+              <a:t>2015-02-23</a:t>
             </a:fld>
             <a:endParaRPr lang="ko-KR" altLang="en-US"/>
           </a:p>
@@ -3164,7 +3167,7 @@
           <a:p>
             <a:fld id="{F1050141-54FF-464A-81F0-F345D58890D6}" type="datetimeFigureOut">
               <a:rPr lang="ko-KR" altLang="en-US" smtClean="0"/>
-              <a:t>2015-02-20</a:t>
+              <a:t>2015-02-23</a:t>
             </a:fld>
             <a:endParaRPr lang="ko-KR" altLang="en-US"/>
           </a:p>
@@ -3259,7 +3262,7 @@
           <a:p>
             <a:fld id="{F1050141-54FF-464A-81F0-F345D58890D6}" type="datetimeFigureOut">
               <a:rPr lang="ko-KR" altLang="en-US" smtClean="0"/>
-              <a:t>2015-02-20</a:t>
+              <a:t>2015-02-23</a:t>
             </a:fld>
             <a:endParaRPr lang="ko-KR" altLang="en-US"/>
           </a:p>
@@ -3536,7 +3539,7 @@
           <a:p>
             <a:fld id="{F1050141-54FF-464A-81F0-F345D58890D6}" type="datetimeFigureOut">
               <a:rPr lang="ko-KR" altLang="en-US" smtClean="0"/>
-              <a:t>2015-02-20</a:t>
+              <a:t>2015-02-23</a:t>
             </a:fld>
             <a:endParaRPr lang="ko-KR" altLang="en-US"/>
           </a:p>
@@ -3789,7 +3792,7 @@
           <a:p>
             <a:fld id="{F1050141-54FF-464A-81F0-F345D58890D6}" type="datetimeFigureOut">
               <a:rPr lang="ko-KR" altLang="en-US" smtClean="0"/>
-              <a:t>2015-02-20</a:t>
+              <a:t>2015-02-23</a:t>
             </a:fld>
             <a:endParaRPr lang="ko-KR" altLang="en-US"/>
           </a:p>
@@ -4002,7 +4005,7 @@
           <a:p>
             <a:fld id="{F1050141-54FF-464A-81F0-F345D58890D6}" type="datetimeFigureOut">
               <a:rPr lang="ko-KR" altLang="en-US" smtClean="0"/>
-              <a:t>2015-02-20</a:t>
+              <a:t>2015-02-23</a:t>
             </a:fld>
             <a:endParaRPr lang="ko-KR" altLang="en-US"/>
           </a:p>
@@ -5880,6 +5883,567 @@
     <p:extLst>
       <p:ext uri="{BB962C8B-B14F-4D97-AF65-F5344CB8AC3E}">
         <p14:creationId xmlns:p14="http://schemas.microsoft.com/office/powerpoint/2010/main" val="4263305915"/>
+      </p:ext>
+    </p:extLst>
+  </p:cSld>
+  <p:clrMapOvr>
+    <a:masterClrMapping/>
+  </p:clrMapOvr>
+  <p:timing>
+    <p:tnLst>
+      <p:par>
+        <p:cTn id="1" dur="indefinite" restart="never" nodeType="tmRoot"/>
+      </p:par>
+    </p:tnLst>
+  </p:timing>
+</p:sld>
+</file>
+
+<file path=ppt/slides/slide15.xml><?xml version="1.0" encoding="utf-8"?>
+<p:sld xmlns:a="http://schemas.openxmlformats.org/drawingml/2006/main" xmlns:r="http://schemas.openxmlformats.org/officeDocument/2006/relationships" xmlns:p="http://schemas.openxmlformats.org/presentationml/2006/main">
+  <p:cSld>
+    <p:spTree>
+      <p:nvGrpSpPr>
+        <p:cNvPr id="1" name=""/>
+        <p:cNvGrpSpPr/>
+        <p:nvPr/>
+      </p:nvGrpSpPr>
+      <p:grpSpPr>
+        <a:xfrm>
+          <a:off x="0" y="0"/>
+          <a:ext cx="0" cy="0"/>
+          <a:chOff x="0" y="0"/>
+          <a:chExt cx="0" cy="0"/>
+        </a:xfrm>
+      </p:grpSpPr>
+      <p:pic>
+        <p:nvPicPr>
+          <p:cNvPr id="4" name="그림 3"/>
+          <p:cNvPicPr>
+            <a:picLocks noChangeAspect="1"/>
+          </p:cNvPicPr>
+          <p:nvPr/>
+        </p:nvPicPr>
+        <p:blipFill>
+          <a:blip r:embed="rId2">
+            <a:extLst>
+              <a:ext uri="{28A0092B-C50C-407E-A947-70E740481C1C}">
+                <a14:useLocalDpi xmlns:a14="http://schemas.microsoft.com/office/drawing/2010/main" val="0"/>
+              </a:ext>
+            </a:extLst>
+          </a:blip>
+          <a:stretch>
+            <a:fillRect/>
+          </a:stretch>
+        </p:blipFill>
+        <p:spPr>
+          <a:xfrm>
+            <a:off x="5610226" y="2949575"/>
+            <a:ext cx="965200" cy="965200"/>
+          </a:xfrm>
+          <a:prstGeom prst="rect">
+            <a:avLst/>
+          </a:prstGeom>
+        </p:spPr>
+      </p:pic>
+      <p:sp>
+        <p:nvSpPr>
+          <p:cNvPr id="5" name="타원 4"/>
+          <p:cNvSpPr/>
+          <p:nvPr/>
+        </p:nvSpPr>
+        <p:spPr>
+          <a:xfrm>
+            <a:off x="5397501" y="2736850"/>
+            <a:ext cx="1390650" cy="1390650"/>
+          </a:xfrm>
+          <a:prstGeom prst="ellipse">
+            <a:avLst/>
+          </a:prstGeom>
+          <a:noFill/>
+          <a:ln w="57150">
+            <a:solidFill>
+              <a:srgbClr val="FF0000"/>
+            </a:solidFill>
+          </a:ln>
+        </p:spPr>
+        <p:style>
+          <a:lnRef idx="2">
+            <a:schemeClr val="accent1">
+              <a:shade val="50000"/>
+            </a:schemeClr>
+          </a:lnRef>
+          <a:fillRef idx="1">
+            <a:schemeClr val="accent1"/>
+          </a:fillRef>
+          <a:effectRef idx="0">
+            <a:schemeClr val="accent1"/>
+          </a:effectRef>
+          <a:fontRef idx="minor">
+            <a:schemeClr val="lt1"/>
+          </a:fontRef>
+        </p:style>
+        <p:txBody>
+          <a:bodyPr rtlCol="0" anchor="ctr"/>
+          <a:lstStyle/>
+          <a:p>
+            <a:pPr algn="ctr"/>
+            <a:endParaRPr lang="ko-KR" altLang="en-US"/>
+          </a:p>
+        </p:txBody>
+      </p:sp>
+    </p:spTree>
+    <p:extLst>
+      <p:ext uri="{BB962C8B-B14F-4D97-AF65-F5344CB8AC3E}">
+        <p14:creationId xmlns:p14="http://schemas.microsoft.com/office/powerpoint/2010/main" val="318227785"/>
+      </p:ext>
+    </p:extLst>
+  </p:cSld>
+  <p:clrMapOvr>
+    <a:masterClrMapping/>
+  </p:clrMapOvr>
+  <p:timing>
+    <p:tnLst>
+      <p:par>
+        <p:cTn id="1" dur="indefinite" restart="never" nodeType="tmRoot"/>
+      </p:par>
+    </p:tnLst>
+  </p:timing>
+</p:sld>
+</file>
+
+<file path=ppt/slides/slide16.xml><?xml version="1.0" encoding="utf-8"?>
+<p:sld xmlns:a="http://schemas.openxmlformats.org/drawingml/2006/main" xmlns:r="http://schemas.openxmlformats.org/officeDocument/2006/relationships" xmlns:p="http://schemas.openxmlformats.org/presentationml/2006/main">
+  <p:cSld>
+    <p:spTree>
+      <p:nvGrpSpPr>
+        <p:cNvPr id="1" name=""/>
+        <p:cNvGrpSpPr/>
+        <p:nvPr/>
+      </p:nvGrpSpPr>
+      <p:grpSpPr>
+        <a:xfrm>
+          <a:off x="0" y="0"/>
+          <a:ext cx="0" cy="0"/>
+          <a:chOff x="0" y="0"/>
+          <a:chExt cx="0" cy="0"/>
+        </a:xfrm>
+      </p:grpSpPr>
+      <p:sp>
+        <p:nvSpPr>
+          <p:cNvPr id="5" name="타원 4"/>
+          <p:cNvSpPr/>
+          <p:nvPr/>
+        </p:nvSpPr>
+        <p:spPr>
+          <a:xfrm>
+            <a:off x="5397501" y="2736850"/>
+            <a:ext cx="1390650" cy="1390650"/>
+          </a:xfrm>
+          <a:prstGeom prst="ellipse">
+            <a:avLst/>
+          </a:prstGeom>
+          <a:noFill/>
+          <a:ln w="57150">
+            <a:solidFill>
+              <a:srgbClr val="FF0000"/>
+            </a:solidFill>
+          </a:ln>
+        </p:spPr>
+        <p:style>
+          <a:lnRef idx="2">
+            <a:schemeClr val="accent1">
+              <a:shade val="50000"/>
+            </a:schemeClr>
+          </a:lnRef>
+          <a:fillRef idx="1">
+            <a:schemeClr val="accent1"/>
+          </a:fillRef>
+          <a:effectRef idx="0">
+            <a:schemeClr val="accent1"/>
+          </a:effectRef>
+          <a:fontRef idx="minor">
+            <a:schemeClr val="lt1"/>
+          </a:fontRef>
+        </p:style>
+        <p:txBody>
+          <a:bodyPr rtlCol="0" anchor="ctr"/>
+          <a:lstStyle/>
+          <a:p>
+            <a:pPr algn="ctr"/>
+            <a:endParaRPr lang="ko-KR" altLang="en-US"/>
+          </a:p>
+        </p:txBody>
+      </p:sp>
+      <p:pic>
+        <p:nvPicPr>
+          <p:cNvPr id="3" name="그림 2"/>
+          <p:cNvPicPr>
+            <a:picLocks noChangeAspect="1"/>
+          </p:cNvPicPr>
+          <p:nvPr/>
+        </p:nvPicPr>
+        <p:blipFill>
+          <a:blip r:embed="rId2">
+            <a:extLst>
+              <a:ext uri="{28A0092B-C50C-407E-A947-70E740481C1C}">
+                <a14:useLocalDpi xmlns:a14="http://schemas.microsoft.com/office/drawing/2010/main" val="0"/>
+              </a:ext>
+            </a:extLst>
+          </a:blip>
+          <a:stretch>
+            <a:fillRect/>
+          </a:stretch>
+        </p:blipFill>
+        <p:spPr>
+          <a:xfrm>
+            <a:off x="5641182" y="2980531"/>
+            <a:ext cx="903287" cy="903287"/>
+          </a:xfrm>
+          <a:prstGeom prst="rect">
+            <a:avLst/>
+          </a:prstGeom>
+        </p:spPr>
+      </p:pic>
+      <p:sp>
+        <p:nvSpPr>
+          <p:cNvPr id="7" name="타원 6"/>
+          <p:cNvSpPr/>
+          <p:nvPr/>
+        </p:nvSpPr>
+        <p:spPr>
+          <a:xfrm>
+            <a:off x="6988176" y="2736850"/>
+            <a:ext cx="1390650" cy="1390650"/>
+          </a:xfrm>
+          <a:prstGeom prst="ellipse">
+            <a:avLst/>
+          </a:prstGeom>
+          <a:noFill/>
+          <a:ln w="57150">
+            <a:solidFill>
+              <a:srgbClr val="FF0000"/>
+            </a:solidFill>
+          </a:ln>
+        </p:spPr>
+        <p:style>
+          <a:lnRef idx="2">
+            <a:schemeClr val="accent1">
+              <a:shade val="50000"/>
+            </a:schemeClr>
+          </a:lnRef>
+          <a:fillRef idx="1">
+            <a:schemeClr val="accent1"/>
+          </a:fillRef>
+          <a:effectRef idx="0">
+            <a:schemeClr val="accent1"/>
+          </a:effectRef>
+          <a:fontRef idx="minor">
+            <a:schemeClr val="lt1"/>
+          </a:fontRef>
+        </p:style>
+        <p:txBody>
+          <a:bodyPr rtlCol="0" anchor="ctr"/>
+          <a:lstStyle/>
+          <a:p>
+            <a:pPr algn="ctr"/>
+            <a:endParaRPr lang="ko-KR" altLang="en-US"/>
+          </a:p>
+        </p:txBody>
+      </p:sp>
+      <p:pic>
+        <p:nvPicPr>
+          <p:cNvPr id="8" name="그림 7"/>
+          <p:cNvPicPr>
+            <a:picLocks noChangeAspect="1"/>
+          </p:cNvPicPr>
+          <p:nvPr/>
+        </p:nvPicPr>
+        <p:blipFill>
+          <a:blip r:embed="rId2">
+            <a:extLst>
+              <a:ext uri="{28A0092B-C50C-407E-A947-70E740481C1C}">
+                <a14:useLocalDpi xmlns:a14="http://schemas.microsoft.com/office/drawing/2010/main" val="0"/>
+              </a:ext>
+            </a:extLst>
+          </a:blip>
+          <a:stretch>
+            <a:fillRect/>
+          </a:stretch>
+        </p:blipFill>
+        <p:spPr>
+          <a:xfrm>
+            <a:off x="7231857" y="2980531"/>
+            <a:ext cx="903287" cy="903287"/>
+          </a:xfrm>
+          <a:prstGeom prst="rect">
+            <a:avLst/>
+          </a:prstGeom>
+        </p:spPr>
+      </p:pic>
+      <p:cxnSp>
+        <p:nvCxnSpPr>
+          <p:cNvPr id="6" name="직선 연결선 5"/>
+          <p:cNvCxnSpPr/>
+          <p:nvPr/>
+        </p:nvCxnSpPr>
+        <p:spPr>
+          <a:xfrm>
+            <a:off x="7204532" y="2892881"/>
+            <a:ext cx="983338" cy="983338"/>
+          </a:xfrm>
+          <a:prstGeom prst="line">
+            <a:avLst/>
+          </a:prstGeom>
+          <a:ln w="57150">
+            <a:solidFill>
+              <a:srgbClr val="FF0000"/>
+            </a:solidFill>
+          </a:ln>
+        </p:spPr>
+        <p:style>
+          <a:lnRef idx="1">
+            <a:schemeClr val="accent1"/>
+          </a:lnRef>
+          <a:fillRef idx="0">
+            <a:schemeClr val="accent1"/>
+          </a:fillRef>
+          <a:effectRef idx="0">
+            <a:schemeClr val="accent1"/>
+          </a:effectRef>
+          <a:fontRef idx="minor">
+            <a:schemeClr val="tx1"/>
+          </a:fontRef>
+        </p:style>
+      </p:cxnSp>
+    </p:spTree>
+    <p:extLst>
+      <p:ext uri="{BB962C8B-B14F-4D97-AF65-F5344CB8AC3E}">
+        <p14:creationId xmlns:p14="http://schemas.microsoft.com/office/powerpoint/2010/main" val="2701931316"/>
+      </p:ext>
+    </p:extLst>
+  </p:cSld>
+  <p:clrMapOvr>
+    <a:masterClrMapping/>
+  </p:clrMapOvr>
+  <p:timing>
+    <p:tnLst>
+      <p:par>
+        <p:cTn id="1" dur="indefinite" restart="never" nodeType="tmRoot"/>
+      </p:par>
+    </p:tnLst>
+  </p:timing>
+</p:sld>
+</file>
+
+<file path=ppt/slides/slide17.xml><?xml version="1.0" encoding="utf-8"?>
+<p:sld xmlns:a="http://schemas.openxmlformats.org/drawingml/2006/main" xmlns:r="http://schemas.openxmlformats.org/officeDocument/2006/relationships" xmlns:p="http://schemas.openxmlformats.org/presentationml/2006/main">
+  <p:cSld>
+    <p:spTree>
+      <p:nvGrpSpPr>
+        <p:cNvPr id="1" name=""/>
+        <p:cNvGrpSpPr/>
+        <p:nvPr/>
+      </p:nvGrpSpPr>
+      <p:grpSpPr>
+        <a:xfrm>
+          <a:off x="0" y="0"/>
+          <a:ext cx="0" cy="0"/>
+          <a:chOff x="0" y="0"/>
+          <a:chExt cx="0" cy="0"/>
+        </a:xfrm>
+      </p:grpSpPr>
+      <p:sp>
+        <p:nvSpPr>
+          <p:cNvPr id="5" name="타원 4"/>
+          <p:cNvSpPr/>
+          <p:nvPr/>
+        </p:nvSpPr>
+        <p:spPr>
+          <a:xfrm>
+            <a:off x="5397501" y="2736850"/>
+            <a:ext cx="1390650" cy="1390650"/>
+          </a:xfrm>
+          <a:prstGeom prst="ellipse">
+            <a:avLst/>
+          </a:prstGeom>
+          <a:noFill/>
+          <a:ln w="57150">
+            <a:solidFill>
+              <a:srgbClr val="FF0000"/>
+            </a:solidFill>
+          </a:ln>
+        </p:spPr>
+        <p:style>
+          <a:lnRef idx="2">
+            <a:schemeClr val="accent1">
+              <a:shade val="50000"/>
+            </a:schemeClr>
+          </a:lnRef>
+          <a:fillRef idx="1">
+            <a:schemeClr val="accent1"/>
+          </a:fillRef>
+          <a:effectRef idx="0">
+            <a:schemeClr val="accent1"/>
+          </a:effectRef>
+          <a:fontRef idx="minor">
+            <a:schemeClr val="lt1"/>
+          </a:fontRef>
+        </p:style>
+        <p:txBody>
+          <a:bodyPr rtlCol="0" anchor="ctr"/>
+          <a:lstStyle/>
+          <a:p>
+            <a:pPr algn="ctr"/>
+            <a:endParaRPr lang="ko-KR" altLang="en-US"/>
+          </a:p>
+        </p:txBody>
+      </p:sp>
+      <p:pic>
+        <p:nvPicPr>
+          <p:cNvPr id="2" name="그림 1"/>
+          <p:cNvPicPr>
+            <a:picLocks noChangeAspect="1"/>
+          </p:cNvPicPr>
+          <p:nvPr/>
+        </p:nvPicPr>
+        <p:blipFill>
+          <a:blip r:embed="rId2">
+            <a:extLst>
+              <a:ext uri="{28A0092B-C50C-407E-A947-70E740481C1C}">
+                <a14:useLocalDpi xmlns:a14="http://schemas.microsoft.com/office/drawing/2010/main" val="0"/>
+              </a:ext>
+            </a:extLst>
+          </a:blip>
+          <a:stretch>
+            <a:fillRect/>
+          </a:stretch>
+        </p:blipFill>
+        <p:spPr>
+          <a:xfrm>
+            <a:off x="5524501" y="2924226"/>
+            <a:ext cx="1015898" cy="1015898"/>
+          </a:xfrm>
+          <a:prstGeom prst="rect">
+            <a:avLst/>
+          </a:prstGeom>
+        </p:spPr>
+      </p:pic>
+      <p:sp>
+        <p:nvSpPr>
+          <p:cNvPr id="7" name="타원 6"/>
+          <p:cNvSpPr/>
+          <p:nvPr/>
+        </p:nvSpPr>
+        <p:spPr>
+          <a:xfrm>
+            <a:off x="6972301" y="2689225"/>
+            <a:ext cx="1390650" cy="1390650"/>
+          </a:xfrm>
+          <a:prstGeom prst="ellipse">
+            <a:avLst/>
+          </a:prstGeom>
+          <a:noFill/>
+          <a:ln w="57150">
+            <a:solidFill>
+              <a:srgbClr val="FF0000"/>
+            </a:solidFill>
+          </a:ln>
+        </p:spPr>
+        <p:style>
+          <a:lnRef idx="2">
+            <a:schemeClr val="accent1">
+              <a:shade val="50000"/>
+            </a:schemeClr>
+          </a:lnRef>
+          <a:fillRef idx="1">
+            <a:schemeClr val="accent1"/>
+          </a:fillRef>
+          <a:effectRef idx="0">
+            <a:schemeClr val="accent1"/>
+          </a:effectRef>
+          <a:fontRef idx="minor">
+            <a:schemeClr val="lt1"/>
+          </a:fontRef>
+        </p:style>
+        <p:txBody>
+          <a:bodyPr rtlCol="0" anchor="ctr"/>
+          <a:lstStyle/>
+          <a:p>
+            <a:pPr algn="ctr"/>
+            <a:endParaRPr lang="ko-KR" altLang="en-US"/>
+          </a:p>
+        </p:txBody>
+      </p:sp>
+      <p:pic>
+        <p:nvPicPr>
+          <p:cNvPr id="8" name="그림 7"/>
+          <p:cNvPicPr>
+            <a:picLocks noChangeAspect="1"/>
+          </p:cNvPicPr>
+          <p:nvPr/>
+        </p:nvPicPr>
+        <p:blipFill>
+          <a:blip r:embed="rId2">
+            <a:extLst>
+              <a:ext uri="{28A0092B-C50C-407E-A947-70E740481C1C}">
+                <a14:useLocalDpi xmlns:a14="http://schemas.microsoft.com/office/drawing/2010/main" val="0"/>
+              </a:ext>
+            </a:extLst>
+          </a:blip>
+          <a:stretch>
+            <a:fillRect/>
+          </a:stretch>
+        </p:blipFill>
+        <p:spPr>
+          <a:xfrm>
+            <a:off x="7099301" y="2876601"/>
+            <a:ext cx="1015898" cy="1015898"/>
+          </a:xfrm>
+          <a:prstGeom prst="rect">
+            <a:avLst/>
+          </a:prstGeom>
+        </p:spPr>
+      </p:pic>
+      <p:cxnSp>
+        <p:nvCxnSpPr>
+          <p:cNvPr id="6" name="직선 연결선 5"/>
+          <p:cNvCxnSpPr/>
+          <p:nvPr/>
+        </p:nvCxnSpPr>
+        <p:spPr>
+          <a:xfrm>
+            <a:off x="7204532" y="2892881"/>
+            <a:ext cx="983338" cy="983338"/>
+          </a:xfrm>
+          <a:prstGeom prst="line">
+            <a:avLst/>
+          </a:prstGeom>
+          <a:ln w="57150">
+            <a:solidFill>
+              <a:srgbClr val="FF0000"/>
+            </a:solidFill>
+          </a:ln>
+        </p:spPr>
+        <p:style>
+          <a:lnRef idx="1">
+            <a:schemeClr val="accent1"/>
+          </a:lnRef>
+          <a:fillRef idx="0">
+            <a:schemeClr val="accent1"/>
+          </a:fillRef>
+          <a:effectRef idx="0">
+            <a:schemeClr val="accent1"/>
+          </a:effectRef>
+          <a:fontRef idx="minor">
+            <a:schemeClr val="tx1"/>
+          </a:fontRef>
+        </p:style>
+      </p:cxnSp>
+    </p:spTree>
+    <p:extLst>
+      <p:ext uri="{BB962C8B-B14F-4D97-AF65-F5344CB8AC3E}">
+        <p14:creationId xmlns:p14="http://schemas.microsoft.com/office/powerpoint/2010/main" val="1790260562"/>
       </p:ext>
     </p:extLst>
   </p:cSld>

</xml_diff>

<commit_message>
- singlesubpage.java change (bo.png -> f_number.png) - add application largeheap beacuse memory fault
</commit_message>
<xml_diff>
--- a/icon.pptx
+++ b/icon.pptx
@@ -5,7 +5,7 @@
     <p:sldMasterId id="2147483648" r:id="rId1"/>
   </p:sldMasterIdLst>
   <p:notesMasterIdLst>
-    <p:notesMasterId r:id="rId21"/>
+    <p:notesMasterId r:id="rId22"/>
   </p:notesMasterIdLst>
   <p:sldIdLst>
     <p:sldId id="256" r:id="rId2"/>
@@ -27,6 +27,7 @@
     <p:sldId id="271" r:id="rId18"/>
     <p:sldId id="272" r:id="rId19"/>
     <p:sldId id="273" r:id="rId20"/>
+    <p:sldId id="276" r:id="rId21"/>
   </p:sldIdLst>
   <p:sldSz cx="12192000" cy="6858000"/>
   <p:notesSz cx="6858000" cy="9144000"/>
@@ -215,7 +216,7 @@
           <a:p>
             <a:fld id="{C286FE0E-AE70-4079-8761-52C42E2F42E6}" type="datetimeFigureOut">
               <a:rPr lang="ko-KR" altLang="en-US" smtClean="0"/>
-              <a:t>2015-02-23</a:t>
+              <a:t>2015-08-16</a:t>
             </a:fld>
             <a:endParaRPr lang="ko-KR" altLang="en-US"/>
           </a:p>
@@ -1774,7 +1775,7 @@
           <a:p>
             <a:fld id="{F1050141-54FF-464A-81F0-F345D58890D6}" type="datetimeFigureOut">
               <a:rPr lang="ko-KR" altLang="en-US" smtClean="0"/>
-              <a:t>2015-02-23</a:t>
+              <a:t>2015-08-16</a:t>
             </a:fld>
             <a:endParaRPr lang="ko-KR" altLang="en-US"/>
           </a:p>
@@ -1944,7 +1945,7 @@
           <a:p>
             <a:fld id="{F1050141-54FF-464A-81F0-F345D58890D6}" type="datetimeFigureOut">
               <a:rPr lang="ko-KR" altLang="en-US" smtClean="0"/>
-              <a:t>2015-02-23</a:t>
+              <a:t>2015-08-16</a:t>
             </a:fld>
             <a:endParaRPr lang="ko-KR" altLang="en-US"/>
           </a:p>
@@ -2124,7 +2125,7 @@
           <a:p>
             <a:fld id="{F1050141-54FF-464A-81F0-F345D58890D6}" type="datetimeFigureOut">
               <a:rPr lang="ko-KR" altLang="en-US" smtClean="0"/>
-              <a:t>2015-02-23</a:t>
+              <a:t>2015-08-16</a:t>
             </a:fld>
             <a:endParaRPr lang="ko-KR" altLang="en-US"/>
           </a:p>
@@ -2294,7 +2295,7 @@
           <a:p>
             <a:fld id="{F1050141-54FF-464A-81F0-F345D58890D6}" type="datetimeFigureOut">
               <a:rPr lang="ko-KR" altLang="en-US" smtClean="0"/>
-              <a:t>2015-02-23</a:t>
+              <a:t>2015-08-16</a:t>
             </a:fld>
             <a:endParaRPr lang="ko-KR" altLang="en-US"/>
           </a:p>
@@ -2540,7 +2541,7 @@
           <a:p>
             <a:fld id="{F1050141-54FF-464A-81F0-F345D58890D6}" type="datetimeFigureOut">
               <a:rPr lang="ko-KR" altLang="en-US" smtClean="0"/>
-              <a:t>2015-02-23</a:t>
+              <a:t>2015-08-16</a:t>
             </a:fld>
             <a:endParaRPr lang="ko-KR" altLang="en-US"/>
           </a:p>
@@ -2772,7 +2773,7 @@
           <a:p>
             <a:fld id="{F1050141-54FF-464A-81F0-F345D58890D6}" type="datetimeFigureOut">
               <a:rPr lang="ko-KR" altLang="en-US" smtClean="0"/>
-              <a:t>2015-02-23</a:t>
+              <a:t>2015-08-16</a:t>
             </a:fld>
             <a:endParaRPr lang="ko-KR" altLang="en-US"/>
           </a:p>
@@ -3139,7 +3140,7 @@
           <a:p>
             <a:fld id="{F1050141-54FF-464A-81F0-F345D58890D6}" type="datetimeFigureOut">
               <a:rPr lang="ko-KR" altLang="en-US" smtClean="0"/>
-              <a:t>2015-02-23</a:t>
+              <a:t>2015-08-16</a:t>
             </a:fld>
             <a:endParaRPr lang="ko-KR" altLang="en-US"/>
           </a:p>
@@ -3257,7 +3258,7 @@
           <a:p>
             <a:fld id="{F1050141-54FF-464A-81F0-F345D58890D6}" type="datetimeFigureOut">
               <a:rPr lang="ko-KR" altLang="en-US" smtClean="0"/>
-              <a:t>2015-02-23</a:t>
+              <a:t>2015-08-16</a:t>
             </a:fld>
             <a:endParaRPr lang="ko-KR" altLang="en-US"/>
           </a:p>
@@ -3352,7 +3353,7 @@
           <a:p>
             <a:fld id="{F1050141-54FF-464A-81F0-F345D58890D6}" type="datetimeFigureOut">
               <a:rPr lang="ko-KR" altLang="en-US" smtClean="0"/>
-              <a:t>2015-02-23</a:t>
+              <a:t>2015-08-16</a:t>
             </a:fld>
             <a:endParaRPr lang="ko-KR" altLang="en-US"/>
           </a:p>
@@ -3629,7 +3630,7 @@
           <a:p>
             <a:fld id="{F1050141-54FF-464A-81F0-F345D58890D6}" type="datetimeFigureOut">
               <a:rPr lang="ko-KR" altLang="en-US" smtClean="0"/>
-              <a:t>2015-02-23</a:t>
+              <a:t>2015-08-16</a:t>
             </a:fld>
             <a:endParaRPr lang="ko-KR" altLang="en-US"/>
           </a:p>
@@ -3882,7 +3883,7 @@
           <a:p>
             <a:fld id="{F1050141-54FF-464A-81F0-F345D58890D6}" type="datetimeFigureOut">
               <a:rPr lang="ko-KR" altLang="en-US" smtClean="0"/>
-              <a:t>2015-02-23</a:t>
+              <a:t>2015-08-16</a:t>
             </a:fld>
             <a:endParaRPr lang="ko-KR" altLang="en-US"/>
           </a:p>
@@ -4095,7 +4096,7 @@
           <a:p>
             <a:fld id="{F1050141-54FF-464A-81F0-F345D58890D6}" type="datetimeFigureOut">
               <a:rPr lang="ko-KR" altLang="en-US" smtClean="0"/>
-              <a:t>2015-02-23</a:t>
+              <a:t>2015-08-16</a:t>
             </a:fld>
             <a:endParaRPr lang="ko-KR" altLang="en-US"/>
           </a:p>
@@ -6423,6 +6424,13 @@
   <p:clrMapOvr>
     <a:masterClrMapping/>
   </p:clrMapOvr>
+  <p:timing>
+    <p:tnLst>
+      <p:par>
+        <p:cTn id="1" dur="indefinite" restart="never" nodeType="tmRoot"/>
+      </p:par>
+    </p:tnLst>
+  </p:timing>
 </p:sld>
 </file>
 
@@ -7996,6 +8004,899 @@
     <p:extLst>
       <p:ext uri="{BB962C8B-B14F-4D97-AF65-F5344CB8AC3E}">
         <p14:creationId xmlns:p14="http://schemas.microsoft.com/office/powerpoint/2010/main" val="3078360136"/>
+      </p:ext>
+    </p:extLst>
+  </p:cSld>
+  <p:clrMapOvr>
+    <a:masterClrMapping/>
+  </p:clrMapOvr>
+  <p:timing>
+    <p:tnLst>
+      <p:par>
+        <p:cTn id="1" dur="indefinite" restart="never" nodeType="tmRoot"/>
+      </p:par>
+    </p:tnLst>
+  </p:timing>
+</p:sld>
+</file>
+
+<file path=ppt/slides/slide20.xml><?xml version="1.0" encoding="utf-8"?>
+<p:sld xmlns:a="http://schemas.openxmlformats.org/drawingml/2006/main" xmlns:r="http://schemas.openxmlformats.org/officeDocument/2006/relationships" xmlns:p="http://schemas.openxmlformats.org/presentationml/2006/main">
+  <p:cSld>
+    <p:spTree>
+      <p:nvGrpSpPr>
+        <p:cNvPr id="1" name=""/>
+        <p:cNvGrpSpPr/>
+        <p:nvPr/>
+      </p:nvGrpSpPr>
+      <p:grpSpPr>
+        <a:xfrm>
+          <a:off x="0" y="0"/>
+          <a:ext cx="0" cy="0"/>
+          <a:chOff x="0" y="0"/>
+          <a:chExt cx="0" cy="0"/>
+        </a:xfrm>
+      </p:grpSpPr>
+      <p:graphicFrame>
+        <p:nvGraphicFramePr>
+          <p:cNvPr id="3" name="표 2"/>
+          <p:cNvGraphicFramePr>
+            <a:graphicFrameLocks noGrp="1"/>
+          </p:cNvGraphicFramePr>
+          <p:nvPr>
+            <p:extLst>
+              <p:ext uri="{D42A27DB-BD31-4B8C-83A1-F6EECF244321}">
+                <p14:modId xmlns:p14="http://schemas.microsoft.com/office/powerpoint/2010/main" val="1022367242"/>
+              </p:ext>
+            </p:extLst>
+          </p:nvPr>
+        </p:nvGraphicFramePr>
+        <p:xfrm>
+          <a:off x="514284" y="587691"/>
+          <a:ext cx="10800000" cy="3240000"/>
+        </p:xfrm>
+        <a:graphic>
+          <a:graphicData uri="http://schemas.openxmlformats.org/drawingml/2006/table">
+            <a:tbl>
+              <a:tblPr>
+                <a:tableStyleId>{5C22544A-7EE6-4342-B048-85BDC9FD1C3A}</a:tableStyleId>
+              </a:tblPr>
+              <a:tblGrid>
+                <a:gridCol w="1080000"/>
+                <a:gridCol w="1080000"/>
+                <a:gridCol w="1080000"/>
+                <a:gridCol w="1080000"/>
+                <a:gridCol w="1080000"/>
+                <a:gridCol w="1080000"/>
+                <a:gridCol w="1080000"/>
+                <a:gridCol w="1080000"/>
+                <a:gridCol w="1080000"/>
+                <a:gridCol w="1080000"/>
+              </a:tblGrid>
+              <a:tr h="1080000">
+                <a:tc>
+                  <a:txBody>
+                    <a:bodyPr/>
+                    <a:lstStyle/>
+                    <a:p>
+                      <a:pPr algn="ctr" latinLnBrk="1"/>
+                      <a:r>
+                        <a:rPr lang="en-US" altLang="ko-KR" sz="4000" b="1" dirty="0" smtClean="0">
+                          <a:solidFill>
+                            <a:srgbClr val="FF0000"/>
+                          </a:solidFill>
+                        </a:rPr>
+                        <a:t>1</a:t>
+                      </a:r>
+                      <a:endParaRPr lang="ko-KR" altLang="en-US" sz="4000" b="1" dirty="0">
+                        <a:solidFill>
+                          <a:srgbClr val="FF0000"/>
+                        </a:solidFill>
+                      </a:endParaRPr>
+                    </a:p>
+                  </a:txBody>
+                  <a:tcPr anchor="ctr">
+                    <a:solidFill>
+                      <a:schemeClr val="bg1"/>
+                    </a:solidFill>
+                  </a:tcPr>
+                </a:tc>
+                <a:tc>
+                  <a:txBody>
+                    <a:bodyPr/>
+                    <a:lstStyle/>
+                    <a:p>
+                      <a:pPr algn="ctr" latinLnBrk="1"/>
+                      <a:r>
+                        <a:rPr lang="en-US" altLang="ko-KR" sz="4000" b="1" dirty="0" smtClean="0">
+                          <a:solidFill>
+                            <a:srgbClr val="FF0000"/>
+                          </a:solidFill>
+                        </a:rPr>
+                        <a:t>2</a:t>
+                      </a:r>
+                      <a:endParaRPr lang="ko-KR" altLang="en-US" sz="4000" b="1" dirty="0">
+                        <a:solidFill>
+                          <a:srgbClr val="FF0000"/>
+                        </a:solidFill>
+                      </a:endParaRPr>
+                    </a:p>
+                  </a:txBody>
+                  <a:tcPr anchor="ctr">
+                    <a:solidFill>
+                      <a:schemeClr val="bg1"/>
+                    </a:solidFill>
+                  </a:tcPr>
+                </a:tc>
+                <a:tc>
+                  <a:txBody>
+                    <a:bodyPr/>
+                    <a:lstStyle/>
+                    <a:p>
+                      <a:pPr algn="ctr" latinLnBrk="1"/>
+                      <a:r>
+                        <a:rPr lang="en-US" altLang="ko-KR" sz="4000" b="1" dirty="0" smtClean="0">
+                          <a:solidFill>
+                            <a:srgbClr val="FF0000"/>
+                          </a:solidFill>
+                        </a:rPr>
+                        <a:t>3</a:t>
+                      </a:r>
+                      <a:endParaRPr lang="ko-KR" altLang="en-US" sz="4000" b="1" dirty="0">
+                        <a:solidFill>
+                          <a:srgbClr val="FF0000"/>
+                        </a:solidFill>
+                      </a:endParaRPr>
+                    </a:p>
+                  </a:txBody>
+                  <a:tcPr anchor="ctr">
+                    <a:solidFill>
+                      <a:schemeClr val="bg1"/>
+                    </a:solidFill>
+                  </a:tcPr>
+                </a:tc>
+                <a:tc>
+                  <a:txBody>
+                    <a:bodyPr/>
+                    <a:lstStyle/>
+                    <a:p>
+                      <a:pPr algn="ctr" latinLnBrk="1"/>
+                      <a:r>
+                        <a:rPr lang="en-US" altLang="ko-KR" sz="4000" b="1" dirty="0" smtClean="0">
+                          <a:solidFill>
+                            <a:srgbClr val="FF0000"/>
+                          </a:solidFill>
+                        </a:rPr>
+                        <a:t>4</a:t>
+                      </a:r>
+                      <a:endParaRPr lang="ko-KR" altLang="en-US" sz="4000" b="1" dirty="0">
+                        <a:solidFill>
+                          <a:srgbClr val="FF0000"/>
+                        </a:solidFill>
+                      </a:endParaRPr>
+                    </a:p>
+                  </a:txBody>
+                  <a:tcPr anchor="ctr">
+                    <a:solidFill>
+                      <a:schemeClr val="bg1"/>
+                    </a:solidFill>
+                  </a:tcPr>
+                </a:tc>
+                <a:tc>
+                  <a:txBody>
+                    <a:bodyPr/>
+                    <a:lstStyle/>
+                    <a:p>
+                      <a:pPr algn="ctr" latinLnBrk="1"/>
+                      <a:r>
+                        <a:rPr lang="en-US" altLang="ko-KR" sz="4000" b="1" dirty="0" smtClean="0">
+                          <a:solidFill>
+                            <a:srgbClr val="FF0000"/>
+                          </a:solidFill>
+                        </a:rPr>
+                        <a:t>5</a:t>
+                      </a:r>
+                      <a:endParaRPr lang="ko-KR" altLang="en-US" sz="4000" b="1" dirty="0">
+                        <a:solidFill>
+                          <a:srgbClr val="FF0000"/>
+                        </a:solidFill>
+                      </a:endParaRPr>
+                    </a:p>
+                  </a:txBody>
+                  <a:tcPr anchor="ctr">
+                    <a:solidFill>
+                      <a:schemeClr val="bg1"/>
+                    </a:solidFill>
+                  </a:tcPr>
+                </a:tc>
+                <a:tc>
+                  <a:txBody>
+                    <a:bodyPr/>
+                    <a:lstStyle/>
+                    <a:p>
+                      <a:pPr algn="ctr" latinLnBrk="1"/>
+                      <a:r>
+                        <a:rPr lang="en-US" altLang="ko-KR" sz="4000" b="1" dirty="0" smtClean="0">
+                          <a:solidFill>
+                            <a:srgbClr val="FF0000"/>
+                          </a:solidFill>
+                        </a:rPr>
+                        <a:t>6</a:t>
+                      </a:r>
+                      <a:endParaRPr lang="ko-KR" altLang="en-US" sz="4000" b="1" dirty="0">
+                        <a:solidFill>
+                          <a:srgbClr val="FF0000"/>
+                        </a:solidFill>
+                      </a:endParaRPr>
+                    </a:p>
+                  </a:txBody>
+                  <a:tcPr anchor="ctr">
+                    <a:solidFill>
+                      <a:schemeClr val="bg1"/>
+                    </a:solidFill>
+                  </a:tcPr>
+                </a:tc>
+                <a:tc>
+                  <a:txBody>
+                    <a:bodyPr/>
+                    <a:lstStyle/>
+                    <a:p>
+                      <a:pPr algn="ctr" latinLnBrk="1"/>
+                      <a:r>
+                        <a:rPr lang="en-US" altLang="ko-KR" sz="4000" b="1" dirty="0" smtClean="0">
+                          <a:solidFill>
+                            <a:srgbClr val="FF0000"/>
+                          </a:solidFill>
+                        </a:rPr>
+                        <a:t>7</a:t>
+                      </a:r>
+                      <a:endParaRPr lang="ko-KR" altLang="en-US" sz="4000" b="1" dirty="0">
+                        <a:solidFill>
+                          <a:srgbClr val="FF0000"/>
+                        </a:solidFill>
+                      </a:endParaRPr>
+                    </a:p>
+                  </a:txBody>
+                  <a:tcPr anchor="ctr">
+                    <a:solidFill>
+                      <a:schemeClr val="bg1"/>
+                    </a:solidFill>
+                  </a:tcPr>
+                </a:tc>
+                <a:tc>
+                  <a:txBody>
+                    <a:bodyPr/>
+                    <a:lstStyle/>
+                    <a:p>
+                      <a:pPr algn="ctr" latinLnBrk="1"/>
+                      <a:r>
+                        <a:rPr lang="en-US" altLang="ko-KR" sz="4000" b="1" dirty="0" smtClean="0">
+                          <a:solidFill>
+                            <a:srgbClr val="FF0000"/>
+                          </a:solidFill>
+                        </a:rPr>
+                        <a:t>8</a:t>
+                      </a:r>
+                      <a:endParaRPr lang="ko-KR" altLang="en-US" sz="4000" b="1" dirty="0">
+                        <a:solidFill>
+                          <a:srgbClr val="FF0000"/>
+                        </a:solidFill>
+                      </a:endParaRPr>
+                    </a:p>
+                  </a:txBody>
+                  <a:tcPr anchor="ctr">
+                    <a:solidFill>
+                      <a:schemeClr val="bg1"/>
+                    </a:solidFill>
+                  </a:tcPr>
+                </a:tc>
+                <a:tc>
+                  <a:txBody>
+                    <a:bodyPr/>
+                    <a:lstStyle/>
+                    <a:p>
+                      <a:pPr algn="ctr" latinLnBrk="1"/>
+                      <a:r>
+                        <a:rPr lang="en-US" altLang="ko-KR" sz="4000" b="1" dirty="0" smtClean="0">
+                          <a:solidFill>
+                            <a:srgbClr val="FF0000"/>
+                          </a:solidFill>
+                        </a:rPr>
+                        <a:t>9</a:t>
+                      </a:r>
+                      <a:endParaRPr lang="ko-KR" altLang="en-US" sz="4000" b="1" dirty="0">
+                        <a:solidFill>
+                          <a:srgbClr val="FF0000"/>
+                        </a:solidFill>
+                      </a:endParaRPr>
+                    </a:p>
+                  </a:txBody>
+                  <a:tcPr anchor="ctr">
+                    <a:solidFill>
+                      <a:schemeClr val="bg1"/>
+                    </a:solidFill>
+                  </a:tcPr>
+                </a:tc>
+                <a:tc>
+                  <a:txBody>
+                    <a:bodyPr/>
+                    <a:lstStyle/>
+                    <a:p>
+                      <a:pPr algn="ctr" latinLnBrk="1"/>
+                      <a:r>
+                        <a:rPr lang="en-US" altLang="ko-KR" sz="4000" b="1" dirty="0" smtClean="0">
+                          <a:solidFill>
+                            <a:srgbClr val="FF0000"/>
+                          </a:solidFill>
+                        </a:rPr>
+                        <a:t>10</a:t>
+                      </a:r>
+                      <a:endParaRPr lang="ko-KR" altLang="en-US" sz="4000" b="1" dirty="0">
+                        <a:solidFill>
+                          <a:srgbClr val="FF0000"/>
+                        </a:solidFill>
+                      </a:endParaRPr>
+                    </a:p>
+                  </a:txBody>
+                  <a:tcPr anchor="ctr">
+                    <a:solidFill>
+                      <a:schemeClr val="bg1"/>
+                    </a:solidFill>
+                  </a:tcPr>
+                </a:tc>
+              </a:tr>
+              <a:tr h="1080000">
+                <a:tc>
+                  <a:txBody>
+                    <a:bodyPr/>
+                    <a:lstStyle/>
+                    <a:p>
+                      <a:pPr algn="ctr" latinLnBrk="1"/>
+                      <a:r>
+                        <a:rPr lang="en-US" altLang="ko-KR" sz="4000" b="1" dirty="0" smtClean="0">
+                          <a:solidFill>
+                            <a:srgbClr val="FF0000"/>
+                          </a:solidFill>
+                        </a:rPr>
+                        <a:t>11</a:t>
+                      </a:r>
+                      <a:endParaRPr lang="ko-KR" altLang="en-US" sz="4000" b="1" dirty="0">
+                        <a:solidFill>
+                          <a:srgbClr val="FF0000"/>
+                        </a:solidFill>
+                      </a:endParaRPr>
+                    </a:p>
+                  </a:txBody>
+                  <a:tcPr anchor="ctr">
+                    <a:solidFill>
+                      <a:schemeClr val="bg1"/>
+                    </a:solidFill>
+                  </a:tcPr>
+                </a:tc>
+                <a:tc>
+                  <a:txBody>
+                    <a:bodyPr/>
+                    <a:lstStyle/>
+                    <a:p>
+                      <a:pPr algn="ctr" latinLnBrk="1"/>
+                      <a:r>
+                        <a:rPr lang="en-US" altLang="ko-KR" sz="4000" b="1" dirty="0" smtClean="0">
+                          <a:solidFill>
+                            <a:srgbClr val="FF0000"/>
+                          </a:solidFill>
+                        </a:rPr>
+                        <a:t>12</a:t>
+                      </a:r>
+                      <a:endParaRPr lang="ko-KR" altLang="en-US" sz="4000" b="1" dirty="0">
+                        <a:solidFill>
+                          <a:srgbClr val="FF0000"/>
+                        </a:solidFill>
+                      </a:endParaRPr>
+                    </a:p>
+                  </a:txBody>
+                  <a:tcPr anchor="ctr">
+                    <a:solidFill>
+                      <a:schemeClr val="bg1"/>
+                    </a:solidFill>
+                  </a:tcPr>
+                </a:tc>
+                <a:tc>
+                  <a:txBody>
+                    <a:bodyPr/>
+                    <a:lstStyle/>
+                    <a:p>
+                      <a:pPr algn="ctr" latinLnBrk="1"/>
+                      <a:r>
+                        <a:rPr lang="en-US" altLang="ko-KR" sz="4000" b="1" dirty="0" smtClean="0">
+                          <a:solidFill>
+                            <a:srgbClr val="FF0000"/>
+                          </a:solidFill>
+                        </a:rPr>
+                        <a:t>13</a:t>
+                      </a:r>
+                      <a:endParaRPr lang="ko-KR" altLang="en-US" sz="4000" b="1" dirty="0">
+                        <a:solidFill>
+                          <a:srgbClr val="FF0000"/>
+                        </a:solidFill>
+                      </a:endParaRPr>
+                    </a:p>
+                  </a:txBody>
+                  <a:tcPr anchor="ctr">
+                    <a:solidFill>
+                      <a:schemeClr val="bg1"/>
+                    </a:solidFill>
+                  </a:tcPr>
+                </a:tc>
+                <a:tc>
+                  <a:txBody>
+                    <a:bodyPr/>
+                    <a:lstStyle/>
+                    <a:p>
+                      <a:pPr algn="ctr" latinLnBrk="1"/>
+                      <a:r>
+                        <a:rPr lang="en-US" altLang="ko-KR" sz="4000" b="1" dirty="0" smtClean="0">
+                          <a:solidFill>
+                            <a:srgbClr val="FF0000"/>
+                          </a:solidFill>
+                        </a:rPr>
+                        <a:t>14</a:t>
+                      </a:r>
+                      <a:endParaRPr lang="ko-KR" altLang="en-US" sz="4000" b="1" dirty="0">
+                        <a:solidFill>
+                          <a:srgbClr val="FF0000"/>
+                        </a:solidFill>
+                      </a:endParaRPr>
+                    </a:p>
+                  </a:txBody>
+                  <a:tcPr anchor="ctr">
+                    <a:solidFill>
+                      <a:schemeClr val="bg1"/>
+                    </a:solidFill>
+                  </a:tcPr>
+                </a:tc>
+                <a:tc>
+                  <a:txBody>
+                    <a:bodyPr/>
+                    <a:lstStyle/>
+                    <a:p>
+                      <a:pPr algn="ctr" latinLnBrk="1"/>
+                      <a:r>
+                        <a:rPr lang="en-US" altLang="ko-KR" sz="4000" b="1" dirty="0" smtClean="0">
+                          <a:solidFill>
+                            <a:srgbClr val="FF0000"/>
+                          </a:solidFill>
+                        </a:rPr>
+                        <a:t>15</a:t>
+                      </a:r>
+                      <a:endParaRPr lang="ko-KR" altLang="en-US" sz="4000" b="1" dirty="0">
+                        <a:solidFill>
+                          <a:srgbClr val="FF0000"/>
+                        </a:solidFill>
+                      </a:endParaRPr>
+                    </a:p>
+                  </a:txBody>
+                  <a:tcPr anchor="ctr">
+                    <a:solidFill>
+                      <a:schemeClr val="bg1"/>
+                    </a:solidFill>
+                  </a:tcPr>
+                </a:tc>
+                <a:tc>
+                  <a:txBody>
+                    <a:bodyPr/>
+                    <a:lstStyle/>
+                    <a:p>
+                      <a:pPr algn="ctr" latinLnBrk="1"/>
+                      <a:r>
+                        <a:rPr lang="en-US" altLang="ko-KR" sz="4000" b="1" dirty="0" smtClean="0">
+                          <a:solidFill>
+                            <a:srgbClr val="FF0000"/>
+                          </a:solidFill>
+                        </a:rPr>
+                        <a:t>16</a:t>
+                      </a:r>
+                      <a:endParaRPr lang="ko-KR" altLang="en-US" sz="4000" b="1" dirty="0">
+                        <a:solidFill>
+                          <a:srgbClr val="FF0000"/>
+                        </a:solidFill>
+                      </a:endParaRPr>
+                    </a:p>
+                  </a:txBody>
+                  <a:tcPr anchor="ctr">
+                    <a:solidFill>
+                      <a:schemeClr val="bg1"/>
+                    </a:solidFill>
+                  </a:tcPr>
+                </a:tc>
+                <a:tc>
+                  <a:txBody>
+                    <a:bodyPr/>
+                    <a:lstStyle/>
+                    <a:p>
+                      <a:pPr algn="ctr" latinLnBrk="1"/>
+                      <a:r>
+                        <a:rPr lang="en-US" altLang="ko-KR" sz="4000" b="1" dirty="0" smtClean="0">
+                          <a:solidFill>
+                            <a:srgbClr val="FF0000"/>
+                          </a:solidFill>
+                        </a:rPr>
+                        <a:t>17</a:t>
+                      </a:r>
+                      <a:endParaRPr lang="ko-KR" altLang="en-US" sz="4000" b="1" dirty="0">
+                        <a:solidFill>
+                          <a:srgbClr val="FF0000"/>
+                        </a:solidFill>
+                      </a:endParaRPr>
+                    </a:p>
+                  </a:txBody>
+                  <a:tcPr anchor="ctr">
+                    <a:solidFill>
+                      <a:schemeClr val="bg1"/>
+                    </a:solidFill>
+                  </a:tcPr>
+                </a:tc>
+                <a:tc>
+                  <a:txBody>
+                    <a:bodyPr/>
+                    <a:lstStyle/>
+                    <a:p>
+                      <a:pPr algn="ctr" latinLnBrk="1"/>
+                      <a:r>
+                        <a:rPr lang="en-US" altLang="ko-KR" sz="4000" b="1" dirty="0" smtClean="0">
+                          <a:solidFill>
+                            <a:srgbClr val="FF0000"/>
+                          </a:solidFill>
+                        </a:rPr>
+                        <a:t>18</a:t>
+                      </a:r>
+                      <a:endParaRPr lang="ko-KR" altLang="en-US" sz="4000" b="1" dirty="0">
+                        <a:solidFill>
+                          <a:srgbClr val="FF0000"/>
+                        </a:solidFill>
+                      </a:endParaRPr>
+                    </a:p>
+                  </a:txBody>
+                  <a:tcPr anchor="ctr">
+                    <a:solidFill>
+                      <a:schemeClr val="bg1"/>
+                    </a:solidFill>
+                  </a:tcPr>
+                </a:tc>
+                <a:tc>
+                  <a:txBody>
+                    <a:bodyPr/>
+                    <a:lstStyle/>
+                    <a:p>
+                      <a:pPr algn="ctr" latinLnBrk="1"/>
+                      <a:r>
+                        <a:rPr lang="en-US" altLang="ko-KR" sz="4000" b="1" dirty="0" smtClean="0">
+                          <a:solidFill>
+                            <a:srgbClr val="FF0000"/>
+                          </a:solidFill>
+                        </a:rPr>
+                        <a:t>19</a:t>
+                      </a:r>
+                      <a:endParaRPr lang="ko-KR" altLang="en-US" sz="4000" b="1" dirty="0">
+                        <a:solidFill>
+                          <a:srgbClr val="FF0000"/>
+                        </a:solidFill>
+                      </a:endParaRPr>
+                    </a:p>
+                  </a:txBody>
+                  <a:tcPr anchor="ctr">
+                    <a:solidFill>
+                      <a:schemeClr val="bg1"/>
+                    </a:solidFill>
+                  </a:tcPr>
+                </a:tc>
+                <a:tc>
+                  <a:txBody>
+                    <a:bodyPr/>
+                    <a:lstStyle/>
+                    <a:p>
+                      <a:pPr algn="ctr" latinLnBrk="1"/>
+                      <a:r>
+                        <a:rPr lang="en-US" altLang="ko-KR" sz="4000" b="1" dirty="0" smtClean="0">
+                          <a:solidFill>
+                            <a:srgbClr val="FF0000"/>
+                          </a:solidFill>
+                        </a:rPr>
+                        <a:t>20</a:t>
+                      </a:r>
+                      <a:endParaRPr lang="ko-KR" altLang="en-US" sz="4000" b="1" dirty="0">
+                        <a:solidFill>
+                          <a:srgbClr val="FF0000"/>
+                        </a:solidFill>
+                      </a:endParaRPr>
+                    </a:p>
+                  </a:txBody>
+                  <a:tcPr anchor="ctr">
+                    <a:solidFill>
+                      <a:schemeClr val="bg1"/>
+                    </a:solidFill>
+                  </a:tcPr>
+                </a:tc>
+              </a:tr>
+              <a:tr h="1080000">
+                <a:tc>
+                  <a:txBody>
+                    <a:bodyPr/>
+                    <a:lstStyle/>
+                    <a:p>
+                      <a:pPr algn="ctr" latinLnBrk="1"/>
+                      <a:r>
+                        <a:rPr lang="en-US" altLang="ko-KR" sz="4000" b="1" dirty="0" smtClean="0">
+                          <a:solidFill>
+                            <a:srgbClr val="FF0000"/>
+                          </a:solidFill>
+                        </a:rPr>
+                        <a:t>21</a:t>
+                      </a:r>
+                      <a:endParaRPr lang="ko-KR" altLang="en-US" sz="4000" b="1" dirty="0">
+                        <a:solidFill>
+                          <a:srgbClr val="FF0000"/>
+                        </a:solidFill>
+                      </a:endParaRPr>
+                    </a:p>
+                  </a:txBody>
+                  <a:tcPr anchor="ctr">
+                    <a:solidFill>
+                      <a:schemeClr val="bg1"/>
+                    </a:solidFill>
+                  </a:tcPr>
+                </a:tc>
+                <a:tc>
+                  <a:txBody>
+                    <a:bodyPr/>
+                    <a:lstStyle/>
+                    <a:p>
+                      <a:pPr algn="ctr" latinLnBrk="1"/>
+                      <a:r>
+                        <a:rPr lang="en-US" altLang="ko-KR" sz="4000" b="1" dirty="0" smtClean="0">
+                          <a:solidFill>
+                            <a:srgbClr val="FF0000"/>
+                          </a:solidFill>
+                        </a:rPr>
+                        <a:t>22</a:t>
+                      </a:r>
+                      <a:endParaRPr lang="ko-KR" altLang="en-US" sz="4000" b="1" dirty="0">
+                        <a:solidFill>
+                          <a:srgbClr val="FF0000"/>
+                        </a:solidFill>
+                      </a:endParaRPr>
+                    </a:p>
+                  </a:txBody>
+                  <a:tcPr anchor="ctr">
+                    <a:solidFill>
+                      <a:schemeClr val="bg1"/>
+                    </a:solidFill>
+                  </a:tcPr>
+                </a:tc>
+                <a:tc>
+                  <a:txBody>
+                    <a:bodyPr/>
+                    <a:lstStyle/>
+                    <a:p>
+                      <a:pPr algn="ctr" latinLnBrk="1"/>
+                      <a:r>
+                        <a:rPr lang="en-US" altLang="ko-KR" sz="4000" b="1" dirty="0" smtClean="0">
+                          <a:solidFill>
+                            <a:srgbClr val="FF0000"/>
+                          </a:solidFill>
+                        </a:rPr>
+                        <a:t>23</a:t>
+                      </a:r>
+                      <a:endParaRPr lang="ko-KR" altLang="en-US" sz="4000" b="1" dirty="0">
+                        <a:solidFill>
+                          <a:srgbClr val="FF0000"/>
+                        </a:solidFill>
+                      </a:endParaRPr>
+                    </a:p>
+                  </a:txBody>
+                  <a:tcPr anchor="ctr">
+                    <a:solidFill>
+                      <a:schemeClr val="bg1"/>
+                    </a:solidFill>
+                  </a:tcPr>
+                </a:tc>
+                <a:tc>
+                  <a:txBody>
+                    <a:bodyPr/>
+                    <a:lstStyle/>
+                    <a:p>
+                      <a:pPr algn="ctr" latinLnBrk="1"/>
+                      <a:r>
+                        <a:rPr lang="en-US" altLang="ko-KR" sz="4000" b="1" dirty="0" smtClean="0">
+                          <a:solidFill>
+                            <a:srgbClr val="FF0000"/>
+                          </a:solidFill>
+                        </a:rPr>
+                        <a:t>24</a:t>
+                      </a:r>
+                      <a:endParaRPr lang="ko-KR" altLang="en-US" sz="4000" b="1" dirty="0">
+                        <a:solidFill>
+                          <a:srgbClr val="FF0000"/>
+                        </a:solidFill>
+                      </a:endParaRPr>
+                    </a:p>
+                  </a:txBody>
+                  <a:tcPr anchor="ctr">
+                    <a:solidFill>
+                      <a:schemeClr val="bg1"/>
+                    </a:solidFill>
+                  </a:tcPr>
+                </a:tc>
+                <a:tc>
+                  <a:txBody>
+                    <a:bodyPr/>
+                    <a:lstStyle/>
+                    <a:p>
+                      <a:pPr algn="ctr" latinLnBrk="1"/>
+                      <a:r>
+                        <a:rPr lang="en-US" altLang="ko-KR" sz="4000" b="1" dirty="0" smtClean="0">
+                          <a:solidFill>
+                            <a:srgbClr val="FF0000"/>
+                          </a:solidFill>
+                        </a:rPr>
+                        <a:t>25</a:t>
+                      </a:r>
+                      <a:endParaRPr lang="ko-KR" altLang="en-US" sz="4000" b="1" dirty="0">
+                        <a:solidFill>
+                          <a:srgbClr val="FF0000"/>
+                        </a:solidFill>
+                      </a:endParaRPr>
+                    </a:p>
+                  </a:txBody>
+                  <a:tcPr anchor="ctr">
+                    <a:solidFill>
+                      <a:schemeClr val="bg1"/>
+                    </a:solidFill>
+                  </a:tcPr>
+                </a:tc>
+                <a:tc>
+                  <a:txBody>
+                    <a:bodyPr/>
+                    <a:lstStyle/>
+                    <a:p>
+                      <a:pPr algn="ctr" latinLnBrk="1"/>
+                      <a:r>
+                        <a:rPr lang="en-US" altLang="ko-KR" sz="4000" b="1" dirty="0" smtClean="0">
+                          <a:solidFill>
+                            <a:srgbClr val="FF0000"/>
+                          </a:solidFill>
+                        </a:rPr>
+                        <a:t>26</a:t>
+                      </a:r>
+                      <a:endParaRPr lang="ko-KR" altLang="en-US" sz="4000" b="1" dirty="0">
+                        <a:solidFill>
+                          <a:srgbClr val="FF0000"/>
+                        </a:solidFill>
+                      </a:endParaRPr>
+                    </a:p>
+                  </a:txBody>
+                  <a:tcPr anchor="ctr">
+                    <a:solidFill>
+                      <a:schemeClr val="bg1"/>
+                    </a:solidFill>
+                  </a:tcPr>
+                </a:tc>
+                <a:tc>
+                  <a:txBody>
+                    <a:bodyPr/>
+                    <a:lstStyle/>
+                    <a:p>
+                      <a:pPr algn="ctr" latinLnBrk="1"/>
+                      <a:r>
+                        <a:rPr lang="en-US" altLang="ko-KR" sz="4000" b="1" dirty="0" smtClean="0">
+                          <a:solidFill>
+                            <a:srgbClr val="FF0000"/>
+                          </a:solidFill>
+                        </a:rPr>
+                        <a:t>27</a:t>
+                      </a:r>
+                      <a:endParaRPr lang="ko-KR" altLang="en-US" sz="4000" b="1" dirty="0">
+                        <a:solidFill>
+                          <a:srgbClr val="FF0000"/>
+                        </a:solidFill>
+                      </a:endParaRPr>
+                    </a:p>
+                  </a:txBody>
+                  <a:tcPr anchor="ctr">
+                    <a:solidFill>
+                      <a:schemeClr val="bg1"/>
+                    </a:solidFill>
+                  </a:tcPr>
+                </a:tc>
+                <a:tc>
+                  <a:txBody>
+                    <a:bodyPr/>
+                    <a:lstStyle/>
+                    <a:p>
+                      <a:pPr algn="ctr" latinLnBrk="1"/>
+                      <a:r>
+                        <a:rPr lang="en-US" altLang="ko-KR" sz="4000" b="1" dirty="0" smtClean="0">
+                          <a:solidFill>
+                            <a:srgbClr val="FF0000"/>
+                          </a:solidFill>
+                        </a:rPr>
+                        <a:t>28</a:t>
+                      </a:r>
+                      <a:endParaRPr lang="ko-KR" altLang="en-US" sz="4000" b="1" dirty="0">
+                        <a:solidFill>
+                          <a:srgbClr val="FF0000"/>
+                        </a:solidFill>
+                      </a:endParaRPr>
+                    </a:p>
+                  </a:txBody>
+                  <a:tcPr anchor="ctr">
+                    <a:solidFill>
+                      <a:schemeClr val="bg1"/>
+                    </a:solidFill>
+                  </a:tcPr>
+                </a:tc>
+                <a:tc>
+                  <a:txBody>
+                    <a:bodyPr/>
+                    <a:lstStyle/>
+                    <a:p>
+                      <a:pPr algn="ctr" latinLnBrk="1"/>
+                      <a:r>
+                        <a:rPr lang="en-US" altLang="ko-KR" sz="4000" b="1" dirty="0" smtClean="0">
+                          <a:solidFill>
+                            <a:srgbClr val="FF0000"/>
+                          </a:solidFill>
+                        </a:rPr>
+                        <a:t>29</a:t>
+                      </a:r>
+                      <a:endParaRPr lang="ko-KR" altLang="en-US" sz="4000" b="1" dirty="0">
+                        <a:solidFill>
+                          <a:srgbClr val="FF0000"/>
+                        </a:solidFill>
+                      </a:endParaRPr>
+                    </a:p>
+                  </a:txBody>
+                  <a:tcPr anchor="ctr">
+                    <a:solidFill>
+                      <a:schemeClr val="bg1"/>
+                    </a:solidFill>
+                  </a:tcPr>
+                </a:tc>
+                <a:tc>
+                  <a:txBody>
+                    <a:bodyPr/>
+                    <a:lstStyle/>
+                    <a:p>
+                      <a:pPr algn="ctr" latinLnBrk="1"/>
+                      <a:r>
+                        <a:rPr lang="en-US" altLang="ko-KR" sz="4000" b="1" dirty="0" smtClean="0">
+                          <a:solidFill>
+                            <a:srgbClr val="FF0000"/>
+                          </a:solidFill>
+                        </a:rPr>
+                        <a:t>30</a:t>
+                      </a:r>
+                      <a:endParaRPr lang="ko-KR" altLang="en-US" sz="4000" b="1" dirty="0">
+                        <a:solidFill>
+                          <a:srgbClr val="FF0000"/>
+                        </a:solidFill>
+                      </a:endParaRPr>
+                    </a:p>
+                  </a:txBody>
+                  <a:tcPr anchor="ctr">
+                    <a:solidFill>
+                      <a:schemeClr val="bg1"/>
+                    </a:solidFill>
+                  </a:tcPr>
+                </a:tc>
+              </a:tr>
+            </a:tbl>
+          </a:graphicData>
+        </a:graphic>
+      </p:graphicFrame>
+    </p:spTree>
+    <p:extLst>
+      <p:ext uri="{BB962C8B-B14F-4D97-AF65-F5344CB8AC3E}">
+        <p14:creationId xmlns:p14="http://schemas.microsoft.com/office/powerpoint/2010/main" val="2158153011"/>
       </p:ext>
     </p:extLst>
   </p:cSld>

</xml_diff>

<commit_message>
- main -> add advertise, resize button, margin renewal - single -> add image of subpage, update query of Star_cnt - single_game -> update query of perfect_cnt
</commit_message>
<xml_diff>
--- a/icon.pptx
+++ b/icon.pptx
@@ -5,7 +5,7 @@
     <p:sldMasterId id="2147483648" r:id="rId1"/>
   </p:sldMasterIdLst>
   <p:notesMasterIdLst>
-    <p:notesMasterId r:id="rId22"/>
+    <p:notesMasterId r:id="rId24"/>
   </p:notesMasterIdLst>
   <p:sldIdLst>
     <p:sldId id="256" r:id="rId2"/>
@@ -28,6 +28,8 @@
     <p:sldId id="272" r:id="rId19"/>
     <p:sldId id="273" r:id="rId20"/>
     <p:sldId id="276" r:id="rId21"/>
+    <p:sldId id="277" r:id="rId22"/>
+    <p:sldId id="278" r:id="rId23"/>
   </p:sldIdLst>
   <p:sldSz cx="12192000" cy="6858000"/>
   <p:notesSz cx="6858000" cy="9144000"/>
@@ -216,7 +218,7 @@
           <a:p>
             <a:fld id="{C286FE0E-AE70-4079-8761-52C42E2F42E6}" type="datetimeFigureOut">
               <a:rPr lang="ko-KR" altLang="en-US" smtClean="0"/>
-              <a:t>2015-08-16</a:t>
+              <a:t>2015-08-23</a:t>
             </a:fld>
             <a:endParaRPr lang="ko-KR" altLang="en-US"/>
           </a:p>
@@ -1775,7 +1777,7 @@
           <a:p>
             <a:fld id="{F1050141-54FF-464A-81F0-F345D58890D6}" type="datetimeFigureOut">
               <a:rPr lang="ko-KR" altLang="en-US" smtClean="0"/>
-              <a:t>2015-08-16</a:t>
+              <a:t>2015-08-23</a:t>
             </a:fld>
             <a:endParaRPr lang="ko-KR" altLang="en-US"/>
           </a:p>
@@ -1945,7 +1947,7 @@
           <a:p>
             <a:fld id="{F1050141-54FF-464A-81F0-F345D58890D6}" type="datetimeFigureOut">
               <a:rPr lang="ko-KR" altLang="en-US" smtClean="0"/>
-              <a:t>2015-08-16</a:t>
+              <a:t>2015-08-23</a:t>
             </a:fld>
             <a:endParaRPr lang="ko-KR" altLang="en-US"/>
           </a:p>
@@ -2125,7 +2127,7 @@
           <a:p>
             <a:fld id="{F1050141-54FF-464A-81F0-F345D58890D6}" type="datetimeFigureOut">
               <a:rPr lang="ko-KR" altLang="en-US" smtClean="0"/>
-              <a:t>2015-08-16</a:t>
+              <a:t>2015-08-23</a:t>
             </a:fld>
             <a:endParaRPr lang="ko-KR" altLang="en-US"/>
           </a:p>
@@ -2295,7 +2297,7 @@
           <a:p>
             <a:fld id="{F1050141-54FF-464A-81F0-F345D58890D6}" type="datetimeFigureOut">
               <a:rPr lang="ko-KR" altLang="en-US" smtClean="0"/>
-              <a:t>2015-08-16</a:t>
+              <a:t>2015-08-23</a:t>
             </a:fld>
             <a:endParaRPr lang="ko-KR" altLang="en-US"/>
           </a:p>
@@ -2541,7 +2543,7 @@
           <a:p>
             <a:fld id="{F1050141-54FF-464A-81F0-F345D58890D6}" type="datetimeFigureOut">
               <a:rPr lang="ko-KR" altLang="en-US" smtClean="0"/>
-              <a:t>2015-08-16</a:t>
+              <a:t>2015-08-23</a:t>
             </a:fld>
             <a:endParaRPr lang="ko-KR" altLang="en-US"/>
           </a:p>
@@ -2773,7 +2775,7 @@
           <a:p>
             <a:fld id="{F1050141-54FF-464A-81F0-F345D58890D6}" type="datetimeFigureOut">
               <a:rPr lang="ko-KR" altLang="en-US" smtClean="0"/>
-              <a:t>2015-08-16</a:t>
+              <a:t>2015-08-23</a:t>
             </a:fld>
             <a:endParaRPr lang="ko-KR" altLang="en-US"/>
           </a:p>
@@ -3140,7 +3142,7 @@
           <a:p>
             <a:fld id="{F1050141-54FF-464A-81F0-F345D58890D6}" type="datetimeFigureOut">
               <a:rPr lang="ko-KR" altLang="en-US" smtClean="0"/>
-              <a:t>2015-08-16</a:t>
+              <a:t>2015-08-23</a:t>
             </a:fld>
             <a:endParaRPr lang="ko-KR" altLang="en-US"/>
           </a:p>
@@ -3258,7 +3260,7 @@
           <a:p>
             <a:fld id="{F1050141-54FF-464A-81F0-F345D58890D6}" type="datetimeFigureOut">
               <a:rPr lang="ko-KR" altLang="en-US" smtClean="0"/>
-              <a:t>2015-08-16</a:t>
+              <a:t>2015-08-23</a:t>
             </a:fld>
             <a:endParaRPr lang="ko-KR" altLang="en-US"/>
           </a:p>
@@ -3353,7 +3355,7 @@
           <a:p>
             <a:fld id="{F1050141-54FF-464A-81F0-F345D58890D6}" type="datetimeFigureOut">
               <a:rPr lang="ko-KR" altLang="en-US" smtClean="0"/>
-              <a:t>2015-08-16</a:t>
+              <a:t>2015-08-23</a:t>
             </a:fld>
             <a:endParaRPr lang="ko-KR" altLang="en-US"/>
           </a:p>
@@ -3630,7 +3632,7 @@
           <a:p>
             <a:fld id="{F1050141-54FF-464A-81F0-F345D58890D6}" type="datetimeFigureOut">
               <a:rPr lang="ko-KR" altLang="en-US" smtClean="0"/>
-              <a:t>2015-08-16</a:t>
+              <a:t>2015-08-23</a:t>
             </a:fld>
             <a:endParaRPr lang="ko-KR" altLang="en-US"/>
           </a:p>
@@ -3883,7 +3885,7 @@
           <a:p>
             <a:fld id="{F1050141-54FF-464A-81F0-F345D58890D6}" type="datetimeFigureOut">
               <a:rPr lang="ko-KR" altLang="en-US" smtClean="0"/>
-              <a:t>2015-08-16</a:t>
+              <a:t>2015-08-23</a:t>
             </a:fld>
             <a:endParaRPr lang="ko-KR" altLang="en-US"/>
           </a:p>
@@ -4096,7 +4098,7 @@
           <a:p>
             <a:fld id="{F1050141-54FF-464A-81F0-F345D58890D6}" type="datetimeFigureOut">
               <a:rPr lang="ko-KR" altLang="en-US" smtClean="0"/>
-              <a:t>2015-08-16</a:t>
+              <a:t>2015-08-23</a:t>
             </a:fld>
             <a:endParaRPr lang="ko-KR" altLang="en-US"/>
           </a:p>
@@ -8913,6 +8915,1792 @@
 </p:sld>
 </file>
 
+<file path=ppt/slides/slide21.xml><?xml version="1.0" encoding="utf-8"?>
+<p:sld xmlns:a="http://schemas.openxmlformats.org/drawingml/2006/main" xmlns:r="http://schemas.openxmlformats.org/officeDocument/2006/relationships" xmlns:p="http://schemas.openxmlformats.org/presentationml/2006/main">
+  <p:cSld>
+    <p:spTree>
+      <p:nvGrpSpPr>
+        <p:cNvPr id="1" name=""/>
+        <p:cNvGrpSpPr/>
+        <p:nvPr/>
+      </p:nvGrpSpPr>
+      <p:grpSpPr>
+        <a:xfrm>
+          <a:off x="0" y="0"/>
+          <a:ext cx="0" cy="0"/>
+          <a:chOff x="0" y="0"/>
+          <a:chExt cx="0" cy="0"/>
+        </a:xfrm>
+      </p:grpSpPr>
+      <p:graphicFrame>
+        <p:nvGraphicFramePr>
+          <p:cNvPr id="3" name="표 2"/>
+          <p:cNvGraphicFramePr>
+            <a:graphicFrameLocks noGrp="1"/>
+          </p:cNvGraphicFramePr>
+          <p:nvPr>
+            <p:extLst>
+              <p:ext uri="{D42A27DB-BD31-4B8C-83A1-F6EECF244321}">
+                <p14:modId xmlns:p14="http://schemas.microsoft.com/office/powerpoint/2010/main" val="4141803637"/>
+              </p:ext>
+            </p:extLst>
+          </p:nvPr>
+        </p:nvGraphicFramePr>
+        <p:xfrm>
+          <a:off x="514284" y="587691"/>
+          <a:ext cx="10800000" cy="3240000"/>
+        </p:xfrm>
+        <a:graphic>
+          <a:graphicData uri="http://schemas.openxmlformats.org/drawingml/2006/table">
+            <a:tbl>
+              <a:tblPr>
+                <a:tableStyleId>{5C22544A-7EE6-4342-B048-85BDC9FD1C3A}</a:tableStyleId>
+              </a:tblPr>
+              <a:tblGrid>
+                <a:gridCol w="1080000"/>
+                <a:gridCol w="1080000"/>
+                <a:gridCol w="1080000"/>
+                <a:gridCol w="1080000"/>
+                <a:gridCol w="1080000"/>
+                <a:gridCol w="1080000"/>
+                <a:gridCol w="1080000"/>
+                <a:gridCol w="1080000"/>
+                <a:gridCol w="1080000"/>
+                <a:gridCol w="1080000"/>
+              </a:tblGrid>
+              <a:tr h="1080000">
+                <a:tc>
+                  <a:txBody>
+                    <a:bodyPr/>
+                    <a:lstStyle/>
+                    <a:p>
+                      <a:pPr algn="ctr" latinLnBrk="1"/>
+                      <a:r>
+                        <a:rPr lang="en-US" altLang="ko-KR" sz="4000" b="1" dirty="0" smtClean="0">
+                          <a:solidFill>
+                            <a:srgbClr val="0066CC"/>
+                          </a:solidFill>
+                        </a:rPr>
+                        <a:t>1</a:t>
+                      </a:r>
+                      <a:endParaRPr lang="ko-KR" altLang="en-US" sz="4000" b="1" dirty="0">
+                        <a:solidFill>
+                          <a:srgbClr val="0066CC"/>
+                        </a:solidFill>
+                      </a:endParaRPr>
+                    </a:p>
+                  </a:txBody>
+                  <a:tcPr anchor="ctr">
+                    <a:solidFill>
+                      <a:schemeClr val="bg1"/>
+                    </a:solidFill>
+                  </a:tcPr>
+                </a:tc>
+                <a:tc>
+                  <a:txBody>
+                    <a:bodyPr/>
+                    <a:lstStyle/>
+                    <a:p>
+                      <a:pPr algn="ctr" latinLnBrk="1"/>
+                      <a:r>
+                        <a:rPr lang="en-US" altLang="ko-KR" sz="4000" b="1" dirty="0" smtClean="0">
+                          <a:solidFill>
+                            <a:srgbClr val="0066CC"/>
+                          </a:solidFill>
+                        </a:rPr>
+                        <a:t>2</a:t>
+                      </a:r>
+                      <a:endParaRPr lang="ko-KR" altLang="en-US" sz="4000" b="1" dirty="0">
+                        <a:solidFill>
+                          <a:srgbClr val="0066CC"/>
+                        </a:solidFill>
+                      </a:endParaRPr>
+                    </a:p>
+                  </a:txBody>
+                  <a:tcPr anchor="ctr">
+                    <a:solidFill>
+                      <a:schemeClr val="bg1"/>
+                    </a:solidFill>
+                  </a:tcPr>
+                </a:tc>
+                <a:tc>
+                  <a:txBody>
+                    <a:bodyPr/>
+                    <a:lstStyle/>
+                    <a:p>
+                      <a:pPr algn="ctr" latinLnBrk="1"/>
+                      <a:r>
+                        <a:rPr lang="en-US" altLang="ko-KR" sz="4000" b="1" dirty="0" smtClean="0">
+                          <a:solidFill>
+                            <a:srgbClr val="0066CC"/>
+                          </a:solidFill>
+                        </a:rPr>
+                        <a:t>3</a:t>
+                      </a:r>
+                      <a:endParaRPr lang="ko-KR" altLang="en-US" sz="4000" b="1" dirty="0">
+                        <a:solidFill>
+                          <a:srgbClr val="0066CC"/>
+                        </a:solidFill>
+                      </a:endParaRPr>
+                    </a:p>
+                  </a:txBody>
+                  <a:tcPr anchor="ctr">
+                    <a:solidFill>
+                      <a:schemeClr val="bg1"/>
+                    </a:solidFill>
+                  </a:tcPr>
+                </a:tc>
+                <a:tc>
+                  <a:txBody>
+                    <a:bodyPr/>
+                    <a:lstStyle/>
+                    <a:p>
+                      <a:pPr algn="ctr" latinLnBrk="1"/>
+                      <a:r>
+                        <a:rPr lang="en-US" altLang="ko-KR" sz="4000" b="1" dirty="0" smtClean="0">
+                          <a:solidFill>
+                            <a:srgbClr val="0066CC"/>
+                          </a:solidFill>
+                        </a:rPr>
+                        <a:t>4</a:t>
+                      </a:r>
+                      <a:endParaRPr lang="ko-KR" altLang="en-US" sz="4000" b="1" dirty="0">
+                        <a:solidFill>
+                          <a:srgbClr val="0066CC"/>
+                        </a:solidFill>
+                      </a:endParaRPr>
+                    </a:p>
+                  </a:txBody>
+                  <a:tcPr anchor="ctr">
+                    <a:solidFill>
+                      <a:schemeClr val="bg1"/>
+                    </a:solidFill>
+                  </a:tcPr>
+                </a:tc>
+                <a:tc>
+                  <a:txBody>
+                    <a:bodyPr/>
+                    <a:lstStyle/>
+                    <a:p>
+                      <a:pPr algn="ctr" latinLnBrk="1"/>
+                      <a:r>
+                        <a:rPr lang="en-US" altLang="ko-KR" sz="4000" b="1" dirty="0" smtClean="0">
+                          <a:solidFill>
+                            <a:srgbClr val="0066CC"/>
+                          </a:solidFill>
+                        </a:rPr>
+                        <a:t>5</a:t>
+                      </a:r>
+                      <a:endParaRPr lang="ko-KR" altLang="en-US" sz="4000" b="1" dirty="0">
+                        <a:solidFill>
+                          <a:srgbClr val="0066CC"/>
+                        </a:solidFill>
+                      </a:endParaRPr>
+                    </a:p>
+                  </a:txBody>
+                  <a:tcPr anchor="ctr">
+                    <a:solidFill>
+                      <a:schemeClr val="bg1"/>
+                    </a:solidFill>
+                  </a:tcPr>
+                </a:tc>
+                <a:tc>
+                  <a:txBody>
+                    <a:bodyPr/>
+                    <a:lstStyle/>
+                    <a:p>
+                      <a:pPr algn="ctr" latinLnBrk="1"/>
+                      <a:r>
+                        <a:rPr lang="en-US" altLang="ko-KR" sz="4000" b="1" dirty="0" smtClean="0">
+                          <a:solidFill>
+                            <a:srgbClr val="0066CC"/>
+                          </a:solidFill>
+                        </a:rPr>
+                        <a:t>6</a:t>
+                      </a:r>
+                      <a:endParaRPr lang="ko-KR" altLang="en-US" sz="4000" b="1" dirty="0">
+                        <a:solidFill>
+                          <a:srgbClr val="0066CC"/>
+                        </a:solidFill>
+                      </a:endParaRPr>
+                    </a:p>
+                  </a:txBody>
+                  <a:tcPr anchor="ctr">
+                    <a:solidFill>
+                      <a:schemeClr val="bg1"/>
+                    </a:solidFill>
+                  </a:tcPr>
+                </a:tc>
+                <a:tc>
+                  <a:txBody>
+                    <a:bodyPr/>
+                    <a:lstStyle/>
+                    <a:p>
+                      <a:pPr algn="ctr" latinLnBrk="1"/>
+                      <a:r>
+                        <a:rPr lang="en-US" altLang="ko-KR" sz="4000" b="1" dirty="0" smtClean="0">
+                          <a:solidFill>
+                            <a:srgbClr val="0066CC"/>
+                          </a:solidFill>
+                        </a:rPr>
+                        <a:t>7</a:t>
+                      </a:r>
+                      <a:endParaRPr lang="ko-KR" altLang="en-US" sz="4000" b="1" dirty="0">
+                        <a:solidFill>
+                          <a:srgbClr val="0066CC"/>
+                        </a:solidFill>
+                      </a:endParaRPr>
+                    </a:p>
+                  </a:txBody>
+                  <a:tcPr anchor="ctr">
+                    <a:solidFill>
+                      <a:schemeClr val="bg1"/>
+                    </a:solidFill>
+                  </a:tcPr>
+                </a:tc>
+                <a:tc>
+                  <a:txBody>
+                    <a:bodyPr/>
+                    <a:lstStyle/>
+                    <a:p>
+                      <a:pPr algn="ctr" latinLnBrk="1"/>
+                      <a:r>
+                        <a:rPr lang="en-US" altLang="ko-KR" sz="4000" b="1" dirty="0" smtClean="0">
+                          <a:solidFill>
+                            <a:srgbClr val="0066CC"/>
+                          </a:solidFill>
+                        </a:rPr>
+                        <a:t>8</a:t>
+                      </a:r>
+                      <a:endParaRPr lang="ko-KR" altLang="en-US" sz="4000" b="1" dirty="0">
+                        <a:solidFill>
+                          <a:srgbClr val="0066CC"/>
+                        </a:solidFill>
+                      </a:endParaRPr>
+                    </a:p>
+                  </a:txBody>
+                  <a:tcPr anchor="ctr">
+                    <a:solidFill>
+                      <a:schemeClr val="bg1"/>
+                    </a:solidFill>
+                  </a:tcPr>
+                </a:tc>
+                <a:tc>
+                  <a:txBody>
+                    <a:bodyPr/>
+                    <a:lstStyle/>
+                    <a:p>
+                      <a:pPr algn="ctr" latinLnBrk="1"/>
+                      <a:r>
+                        <a:rPr lang="en-US" altLang="ko-KR" sz="4000" b="1" dirty="0" smtClean="0">
+                          <a:solidFill>
+                            <a:srgbClr val="0066CC"/>
+                          </a:solidFill>
+                        </a:rPr>
+                        <a:t>9</a:t>
+                      </a:r>
+                      <a:endParaRPr lang="ko-KR" altLang="en-US" sz="4000" b="1" dirty="0">
+                        <a:solidFill>
+                          <a:srgbClr val="0066CC"/>
+                        </a:solidFill>
+                      </a:endParaRPr>
+                    </a:p>
+                  </a:txBody>
+                  <a:tcPr anchor="ctr">
+                    <a:solidFill>
+                      <a:schemeClr val="bg1"/>
+                    </a:solidFill>
+                  </a:tcPr>
+                </a:tc>
+                <a:tc>
+                  <a:txBody>
+                    <a:bodyPr/>
+                    <a:lstStyle/>
+                    <a:p>
+                      <a:pPr algn="ctr" latinLnBrk="1"/>
+                      <a:r>
+                        <a:rPr lang="en-US" altLang="ko-KR" sz="4000" b="1" dirty="0" smtClean="0">
+                          <a:solidFill>
+                            <a:srgbClr val="0066CC"/>
+                          </a:solidFill>
+                        </a:rPr>
+                        <a:t>10</a:t>
+                      </a:r>
+                      <a:endParaRPr lang="ko-KR" altLang="en-US" sz="4000" b="1" dirty="0">
+                        <a:solidFill>
+                          <a:srgbClr val="0066CC"/>
+                        </a:solidFill>
+                      </a:endParaRPr>
+                    </a:p>
+                  </a:txBody>
+                  <a:tcPr anchor="ctr">
+                    <a:solidFill>
+                      <a:schemeClr val="bg1"/>
+                    </a:solidFill>
+                  </a:tcPr>
+                </a:tc>
+              </a:tr>
+              <a:tr h="1080000">
+                <a:tc>
+                  <a:txBody>
+                    <a:bodyPr/>
+                    <a:lstStyle/>
+                    <a:p>
+                      <a:pPr algn="ctr" latinLnBrk="1"/>
+                      <a:r>
+                        <a:rPr lang="en-US" altLang="ko-KR" sz="4000" b="1" dirty="0" smtClean="0">
+                          <a:solidFill>
+                            <a:srgbClr val="0066CC"/>
+                          </a:solidFill>
+                        </a:rPr>
+                        <a:t>11</a:t>
+                      </a:r>
+                      <a:endParaRPr lang="ko-KR" altLang="en-US" sz="4000" b="1" dirty="0">
+                        <a:solidFill>
+                          <a:srgbClr val="0066CC"/>
+                        </a:solidFill>
+                      </a:endParaRPr>
+                    </a:p>
+                  </a:txBody>
+                  <a:tcPr anchor="ctr">
+                    <a:solidFill>
+                      <a:schemeClr val="bg1"/>
+                    </a:solidFill>
+                  </a:tcPr>
+                </a:tc>
+                <a:tc>
+                  <a:txBody>
+                    <a:bodyPr/>
+                    <a:lstStyle/>
+                    <a:p>
+                      <a:pPr algn="ctr" latinLnBrk="1"/>
+                      <a:r>
+                        <a:rPr lang="en-US" altLang="ko-KR" sz="4000" b="1" dirty="0" smtClean="0">
+                          <a:solidFill>
+                            <a:srgbClr val="0066CC"/>
+                          </a:solidFill>
+                        </a:rPr>
+                        <a:t>12</a:t>
+                      </a:r>
+                      <a:endParaRPr lang="ko-KR" altLang="en-US" sz="4000" b="1" dirty="0">
+                        <a:solidFill>
+                          <a:srgbClr val="0066CC"/>
+                        </a:solidFill>
+                      </a:endParaRPr>
+                    </a:p>
+                  </a:txBody>
+                  <a:tcPr anchor="ctr">
+                    <a:solidFill>
+                      <a:schemeClr val="bg1"/>
+                    </a:solidFill>
+                  </a:tcPr>
+                </a:tc>
+                <a:tc>
+                  <a:txBody>
+                    <a:bodyPr/>
+                    <a:lstStyle/>
+                    <a:p>
+                      <a:pPr algn="ctr" latinLnBrk="1"/>
+                      <a:r>
+                        <a:rPr lang="en-US" altLang="ko-KR" sz="4000" b="1" dirty="0" smtClean="0">
+                          <a:solidFill>
+                            <a:srgbClr val="0066CC"/>
+                          </a:solidFill>
+                        </a:rPr>
+                        <a:t>13</a:t>
+                      </a:r>
+                      <a:endParaRPr lang="ko-KR" altLang="en-US" sz="4000" b="1" dirty="0">
+                        <a:solidFill>
+                          <a:srgbClr val="0066CC"/>
+                        </a:solidFill>
+                      </a:endParaRPr>
+                    </a:p>
+                  </a:txBody>
+                  <a:tcPr anchor="ctr">
+                    <a:solidFill>
+                      <a:schemeClr val="bg1"/>
+                    </a:solidFill>
+                  </a:tcPr>
+                </a:tc>
+                <a:tc>
+                  <a:txBody>
+                    <a:bodyPr/>
+                    <a:lstStyle/>
+                    <a:p>
+                      <a:pPr algn="ctr" latinLnBrk="1"/>
+                      <a:r>
+                        <a:rPr lang="en-US" altLang="ko-KR" sz="4000" b="1" dirty="0" smtClean="0">
+                          <a:solidFill>
+                            <a:srgbClr val="0066CC"/>
+                          </a:solidFill>
+                        </a:rPr>
+                        <a:t>14</a:t>
+                      </a:r>
+                      <a:endParaRPr lang="ko-KR" altLang="en-US" sz="4000" b="1" dirty="0">
+                        <a:solidFill>
+                          <a:srgbClr val="0066CC"/>
+                        </a:solidFill>
+                      </a:endParaRPr>
+                    </a:p>
+                  </a:txBody>
+                  <a:tcPr anchor="ctr">
+                    <a:solidFill>
+                      <a:schemeClr val="bg1"/>
+                    </a:solidFill>
+                  </a:tcPr>
+                </a:tc>
+                <a:tc>
+                  <a:txBody>
+                    <a:bodyPr/>
+                    <a:lstStyle/>
+                    <a:p>
+                      <a:pPr algn="ctr" latinLnBrk="1"/>
+                      <a:r>
+                        <a:rPr lang="en-US" altLang="ko-KR" sz="4000" b="1" dirty="0" smtClean="0">
+                          <a:solidFill>
+                            <a:srgbClr val="0066CC"/>
+                          </a:solidFill>
+                        </a:rPr>
+                        <a:t>15</a:t>
+                      </a:r>
+                      <a:endParaRPr lang="ko-KR" altLang="en-US" sz="4000" b="1" dirty="0">
+                        <a:solidFill>
+                          <a:srgbClr val="0066CC"/>
+                        </a:solidFill>
+                      </a:endParaRPr>
+                    </a:p>
+                  </a:txBody>
+                  <a:tcPr anchor="ctr">
+                    <a:solidFill>
+                      <a:schemeClr val="bg1"/>
+                    </a:solidFill>
+                  </a:tcPr>
+                </a:tc>
+                <a:tc>
+                  <a:txBody>
+                    <a:bodyPr/>
+                    <a:lstStyle/>
+                    <a:p>
+                      <a:pPr algn="ctr" latinLnBrk="1"/>
+                      <a:r>
+                        <a:rPr lang="en-US" altLang="ko-KR" sz="4000" b="1" dirty="0" smtClean="0">
+                          <a:solidFill>
+                            <a:srgbClr val="0066CC"/>
+                          </a:solidFill>
+                        </a:rPr>
+                        <a:t>16</a:t>
+                      </a:r>
+                      <a:endParaRPr lang="ko-KR" altLang="en-US" sz="4000" b="1" dirty="0">
+                        <a:solidFill>
+                          <a:srgbClr val="0066CC"/>
+                        </a:solidFill>
+                      </a:endParaRPr>
+                    </a:p>
+                  </a:txBody>
+                  <a:tcPr anchor="ctr">
+                    <a:solidFill>
+                      <a:schemeClr val="bg1"/>
+                    </a:solidFill>
+                  </a:tcPr>
+                </a:tc>
+                <a:tc>
+                  <a:txBody>
+                    <a:bodyPr/>
+                    <a:lstStyle/>
+                    <a:p>
+                      <a:pPr algn="ctr" latinLnBrk="1"/>
+                      <a:r>
+                        <a:rPr lang="en-US" altLang="ko-KR" sz="4000" b="1" dirty="0" smtClean="0">
+                          <a:solidFill>
+                            <a:srgbClr val="0066CC"/>
+                          </a:solidFill>
+                        </a:rPr>
+                        <a:t>17</a:t>
+                      </a:r>
+                      <a:endParaRPr lang="ko-KR" altLang="en-US" sz="4000" b="1" dirty="0">
+                        <a:solidFill>
+                          <a:srgbClr val="0066CC"/>
+                        </a:solidFill>
+                      </a:endParaRPr>
+                    </a:p>
+                  </a:txBody>
+                  <a:tcPr anchor="ctr">
+                    <a:solidFill>
+                      <a:schemeClr val="bg1"/>
+                    </a:solidFill>
+                  </a:tcPr>
+                </a:tc>
+                <a:tc>
+                  <a:txBody>
+                    <a:bodyPr/>
+                    <a:lstStyle/>
+                    <a:p>
+                      <a:pPr algn="ctr" latinLnBrk="1"/>
+                      <a:r>
+                        <a:rPr lang="en-US" altLang="ko-KR" sz="4000" b="1" dirty="0" smtClean="0">
+                          <a:solidFill>
+                            <a:srgbClr val="0066CC"/>
+                          </a:solidFill>
+                        </a:rPr>
+                        <a:t>18</a:t>
+                      </a:r>
+                      <a:endParaRPr lang="ko-KR" altLang="en-US" sz="4000" b="1" dirty="0">
+                        <a:solidFill>
+                          <a:srgbClr val="0066CC"/>
+                        </a:solidFill>
+                      </a:endParaRPr>
+                    </a:p>
+                  </a:txBody>
+                  <a:tcPr anchor="ctr">
+                    <a:solidFill>
+                      <a:schemeClr val="bg1"/>
+                    </a:solidFill>
+                  </a:tcPr>
+                </a:tc>
+                <a:tc>
+                  <a:txBody>
+                    <a:bodyPr/>
+                    <a:lstStyle/>
+                    <a:p>
+                      <a:pPr algn="ctr" latinLnBrk="1"/>
+                      <a:r>
+                        <a:rPr lang="en-US" altLang="ko-KR" sz="4000" b="1" dirty="0" smtClean="0">
+                          <a:solidFill>
+                            <a:srgbClr val="0066CC"/>
+                          </a:solidFill>
+                        </a:rPr>
+                        <a:t>19</a:t>
+                      </a:r>
+                      <a:endParaRPr lang="ko-KR" altLang="en-US" sz="4000" b="1" dirty="0">
+                        <a:solidFill>
+                          <a:srgbClr val="0066CC"/>
+                        </a:solidFill>
+                      </a:endParaRPr>
+                    </a:p>
+                  </a:txBody>
+                  <a:tcPr anchor="ctr">
+                    <a:solidFill>
+                      <a:schemeClr val="bg1"/>
+                    </a:solidFill>
+                  </a:tcPr>
+                </a:tc>
+                <a:tc>
+                  <a:txBody>
+                    <a:bodyPr/>
+                    <a:lstStyle/>
+                    <a:p>
+                      <a:pPr algn="ctr" latinLnBrk="1"/>
+                      <a:r>
+                        <a:rPr lang="en-US" altLang="ko-KR" sz="4000" b="1" dirty="0" smtClean="0">
+                          <a:solidFill>
+                            <a:srgbClr val="0066CC"/>
+                          </a:solidFill>
+                        </a:rPr>
+                        <a:t>20</a:t>
+                      </a:r>
+                      <a:endParaRPr lang="ko-KR" altLang="en-US" sz="4000" b="1" dirty="0">
+                        <a:solidFill>
+                          <a:srgbClr val="0066CC"/>
+                        </a:solidFill>
+                      </a:endParaRPr>
+                    </a:p>
+                  </a:txBody>
+                  <a:tcPr anchor="ctr">
+                    <a:solidFill>
+                      <a:schemeClr val="bg1"/>
+                    </a:solidFill>
+                  </a:tcPr>
+                </a:tc>
+              </a:tr>
+              <a:tr h="1080000">
+                <a:tc>
+                  <a:txBody>
+                    <a:bodyPr/>
+                    <a:lstStyle/>
+                    <a:p>
+                      <a:pPr algn="ctr" latinLnBrk="1"/>
+                      <a:r>
+                        <a:rPr lang="en-US" altLang="ko-KR" sz="4000" b="1" dirty="0" smtClean="0">
+                          <a:solidFill>
+                            <a:srgbClr val="0066CC"/>
+                          </a:solidFill>
+                        </a:rPr>
+                        <a:t>21</a:t>
+                      </a:r>
+                      <a:endParaRPr lang="ko-KR" altLang="en-US" sz="4000" b="1" dirty="0">
+                        <a:solidFill>
+                          <a:srgbClr val="0066CC"/>
+                        </a:solidFill>
+                      </a:endParaRPr>
+                    </a:p>
+                  </a:txBody>
+                  <a:tcPr anchor="ctr">
+                    <a:solidFill>
+                      <a:schemeClr val="bg1"/>
+                    </a:solidFill>
+                  </a:tcPr>
+                </a:tc>
+                <a:tc>
+                  <a:txBody>
+                    <a:bodyPr/>
+                    <a:lstStyle/>
+                    <a:p>
+                      <a:pPr algn="ctr" latinLnBrk="1"/>
+                      <a:r>
+                        <a:rPr lang="en-US" altLang="ko-KR" sz="4000" b="1" dirty="0" smtClean="0">
+                          <a:solidFill>
+                            <a:srgbClr val="0066CC"/>
+                          </a:solidFill>
+                        </a:rPr>
+                        <a:t>22</a:t>
+                      </a:r>
+                      <a:endParaRPr lang="ko-KR" altLang="en-US" sz="4000" b="1" dirty="0">
+                        <a:solidFill>
+                          <a:srgbClr val="0066CC"/>
+                        </a:solidFill>
+                      </a:endParaRPr>
+                    </a:p>
+                  </a:txBody>
+                  <a:tcPr anchor="ctr">
+                    <a:solidFill>
+                      <a:schemeClr val="bg1"/>
+                    </a:solidFill>
+                  </a:tcPr>
+                </a:tc>
+                <a:tc>
+                  <a:txBody>
+                    <a:bodyPr/>
+                    <a:lstStyle/>
+                    <a:p>
+                      <a:pPr algn="ctr" latinLnBrk="1"/>
+                      <a:r>
+                        <a:rPr lang="en-US" altLang="ko-KR" sz="4000" b="1" dirty="0" smtClean="0">
+                          <a:solidFill>
+                            <a:srgbClr val="0066CC"/>
+                          </a:solidFill>
+                        </a:rPr>
+                        <a:t>23</a:t>
+                      </a:r>
+                      <a:endParaRPr lang="ko-KR" altLang="en-US" sz="4000" b="1" dirty="0">
+                        <a:solidFill>
+                          <a:srgbClr val="0066CC"/>
+                        </a:solidFill>
+                      </a:endParaRPr>
+                    </a:p>
+                  </a:txBody>
+                  <a:tcPr anchor="ctr">
+                    <a:solidFill>
+                      <a:schemeClr val="bg1"/>
+                    </a:solidFill>
+                  </a:tcPr>
+                </a:tc>
+                <a:tc>
+                  <a:txBody>
+                    <a:bodyPr/>
+                    <a:lstStyle/>
+                    <a:p>
+                      <a:pPr algn="ctr" latinLnBrk="1"/>
+                      <a:r>
+                        <a:rPr lang="en-US" altLang="ko-KR" sz="4000" b="1" dirty="0" smtClean="0">
+                          <a:solidFill>
+                            <a:srgbClr val="0066CC"/>
+                          </a:solidFill>
+                        </a:rPr>
+                        <a:t>24</a:t>
+                      </a:r>
+                      <a:endParaRPr lang="ko-KR" altLang="en-US" sz="4000" b="1" dirty="0">
+                        <a:solidFill>
+                          <a:srgbClr val="0066CC"/>
+                        </a:solidFill>
+                      </a:endParaRPr>
+                    </a:p>
+                  </a:txBody>
+                  <a:tcPr anchor="ctr">
+                    <a:solidFill>
+                      <a:schemeClr val="bg1"/>
+                    </a:solidFill>
+                  </a:tcPr>
+                </a:tc>
+                <a:tc>
+                  <a:txBody>
+                    <a:bodyPr/>
+                    <a:lstStyle/>
+                    <a:p>
+                      <a:pPr algn="ctr" latinLnBrk="1"/>
+                      <a:r>
+                        <a:rPr lang="en-US" altLang="ko-KR" sz="4000" b="1" dirty="0" smtClean="0">
+                          <a:solidFill>
+                            <a:srgbClr val="0066CC"/>
+                          </a:solidFill>
+                        </a:rPr>
+                        <a:t>25</a:t>
+                      </a:r>
+                      <a:endParaRPr lang="ko-KR" altLang="en-US" sz="4000" b="1" dirty="0">
+                        <a:solidFill>
+                          <a:srgbClr val="0066CC"/>
+                        </a:solidFill>
+                      </a:endParaRPr>
+                    </a:p>
+                  </a:txBody>
+                  <a:tcPr anchor="ctr">
+                    <a:solidFill>
+                      <a:schemeClr val="bg1"/>
+                    </a:solidFill>
+                  </a:tcPr>
+                </a:tc>
+                <a:tc>
+                  <a:txBody>
+                    <a:bodyPr/>
+                    <a:lstStyle/>
+                    <a:p>
+                      <a:pPr algn="ctr" latinLnBrk="1"/>
+                      <a:r>
+                        <a:rPr lang="en-US" altLang="ko-KR" sz="4000" b="1" dirty="0" smtClean="0">
+                          <a:solidFill>
+                            <a:srgbClr val="0066CC"/>
+                          </a:solidFill>
+                        </a:rPr>
+                        <a:t>26</a:t>
+                      </a:r>
+                      <a:endParaRPr lang="ko-KR" altLang="en-US" sz="4000" b="1" dirty="0">
+                        <a:solidFill>
+                          <a:srgbClr val="0066CC"/>
+                        </a:solidFill>
+                      </a:endParaRPr>
+                    </a:p>
+                  </a:txBody>
+                  <a:tcPr anchor="ctr">
+                    <a:solidFill>
+                      <a:schemeClr val="bg1"/>
+                    </a:solidFill>
+                  </a:tcPr>
+                </a:tc>
+                <a:tc>
+                  <a:txBody>
+                    <a:bodyPr/>
+                    <a:lstStyle/>
+                    <a:p>
+                      <a:pPr algn="ctr" latinLnBrk="1"/>
+                      <a:r>
+                        <a:rPr lang="en-US" altLang="ko-KR" sz="4000" b="1" dirty="0" smtClean="0">
+                          <a:solidFill>
+                            <a:srgbClr val="0066CC"/>
+                          </a:solidFill>
+                        </a:rPr>
+                        <a:t>27</a:t>
+                      </a:r>
+                      <a:endParaRPr lang="ko-KR" altLang="en-US" sz="4000" b="1" dirty="0">
+                        <a:solidFill>
+                          <a:srgbClr val="0066CC"/>
+                        </a:solidFill>
+                      </a:endParaRPr>
+                    </a:p>
+                  </a:txBody>
+                  <a:tcPr anchor="ctr">
+                    <a:solidFill>
+                      <a:schemeClr val="bg1"/>
+                    </a:solidFill>
+                  </a:tcPr>
+                </a:tc>
+                <a:tc>
+                  <a:txBody>
+                    <a:bodyPr/>
+                    <a:lstStyle/>
+                    <a:p>
+                      <a:pPr algn="ctr" latinLnBrk="1"/>
+                      <a:r>
+                        <a:rPr lang="en-US" altLang="ko-KR" sz="4000" b="1" dirty="0" smtClean="0">
+                          <a:solidFill>
+                            <a:srgbClr val="0066CC"/>
+                          </a:solidFill>
+                        </a:rPr>
+                        <a:t>28</a:t>
+                      </a:r>
+                      <a:endParaRPr lang="ko-KR" altLang="en-US" sz="4000" b="1" dirty="0">
+                        <a:solidFill>
+                          <a:srgbClr val="0066CC"/>
+                        </a:solidFill>
+                      </a:endParaRPr>
+                    </a:p>
+                  </a:txBody>
+                  <a:tcPr anchor="ctr">
+                    <a:solidFill>
+                      <a:schemeClr val="bg1"/>
+                    </a:solidFill>
+                  </a:tcPr>
+                </a:tc>
+                <a:tc>
+                  <a:txBody>
+                    <a:bodyPr/>
+                    <a:lstStyle/>
+                    <a:p>
+                      <a:pPr algn="ctr" latinLnBrk="1"/>
+                      <a:r>
+                        <a:rPr lang="en-US" altLang="ko-KR" sz="4000" b="1" dirty="0" smtClean="0">
+                          <a:solidFill>
+                            <a:srgbClr val="0066CC"/>
+                          </a:solidFill>
+                        </a:rPr>
+                        <a:t>29</a:t>
+                      </a:r>
+                      <a:endParaRPr lang="ko-KR" altLang="en-US" sz="4000" b="1" dirty="0">
+                        <a:solidFill>
+                          <a:srgbClr val="0066CC"/>
+                        </a:solidFill>
+                      </a:endParaRPr>
+                    </a:p>
+                  </a:txBody>
+                  <a:tcPr anchor="ctr">
+                    <a:solidFill>
+                      <a:schemeClr val="bg1"/>
+                    </a:solidFill>
+                  </a:tcPr>
+                </a:tc>
+                <a:tc>
+                  <a:txBody>
+                    <a:bodyPr/>
+                    <a:lstStyle/>
+                    <a:p>
+                      <a:pPr algn="ctr" latinLnBrk="1"/>
+                      <a:r>
+                        <a:rPr lang="en-US" altLang="ko-KR" sz="4000" b="1" dirty="0" smtClean="0">
+                          <a:solidFill>
+                            <a:srgbClr val="0066CC"/>
+                          </a:solidFill>
+                        </a:rPr>
+                        <a:t>30</a:t>
+                      </a:r>
+                      <a:endParaRPr lang="ko-KR" altLang="en-US" sz="4000" b="1" dirty="0">
+                        <a:solidFill>
+                          <a:srgbClr val="0066CC"/>
+                        </a:solidFill>
+                      </a:endParaRPr>
+                    </a:p>
+                  </a:txBody>
+                  <a:tcPr anchor="ctr">
+                    <a:solidFill>
+                      <a:schemeClr val="bg1"/>
+                    </a:solidFill>
+                  </a:tcPr>
+                </a:tc>
+              </a:tr>
+            </a:tbl>
+          </a:graphicData>
+        </a:graphic>
+      </p:graphicFrame>
+    </p:spTree>
+    <p:extLst>
+      <p:ext uri="{BB962C8B-B14F-4D97-AF65-F5344CB8AC3E}">
+        <p14:creationId xmlns:p14="http://schemas.microsoft.com/office/powerpoint/2010/main" val="2896532137"/>
+      </p:ext>
+    </p:extLst>
+  </p:cSld>
+  <p:clrMapOvr>
+    <a:masterClrMapping/>
+  </p:clrMapOvr>
+  <p:timing>
+    <p:tnLst>
+      <p:par>
+        <p:cTn id="1" dur="indefinite" restart="never" nodeType="tmRoot"/>
+      </p:par>
+    </p:tnLst>
+  </p:timing>
+</p:sld>
+</file>
+
+<file path=ppt/slides/slide22.xml><?xml version="1.0" encoding="utf-8"?>
+<p:sld xmlns:a="http://schemas.openxmlformats.org/drawingml/2006/main" xmlns:r="http://schemas.openxmlformats.org/officeDocument/2006/relationships" xmlns:p="http://schemas.openxmlformats.org/presentationml/2006/main">
+  <p:cSld>
+    <p:spTree>
+      <p:nvGrpSpPr>
+        <p:cNvPr id="1" name=""/>
+        <p:cNvGrpSpPr/>
+        <p:nvPr/>
+      </p:nvGrpSpPr>
+      <p:grpSpPr>
+        <a:xfrm>
+          <a:off x="0" y="0"/>
+          <a:ext cx="0" cy="0"/>
+          <a:chOff x="0" y="0"/>
+          <a:chExt cx="0" cy="0"/>
+        </a:xfrm>
+      </p:grpSpPr>
+      <p:graphicFrame>
+        <p:nvGraphicFramePr>
+          <p:cNvPr id="3" name="표 2"/>
+          <p:cNvGraphicFramePr>
+            <a:graphicFrameLocks noGrp="1"/>
+          </p:cNvGraphicFramePr>
+          <p:nvPr>
+            <p:extLst>
+              <p:ext uri="{D42A27DB-BD31-4B8C-83A1-F6EECF244321}">
+                <p14:modId xmlns:p14="http://schemas.microsoft.com/office/powerpoint/2010/main" val="4131511834"/>
+              </p:ext>
+            </p:extLst>
+          </p:nvPr>
+        </p:nvGraphicFramePr>
+        <p:xfrm>
+          <a:off x="514284" y="587691"/>
+          <a:ext cx="10800000" cy="3240000"/>
+        </p:xfrm>
+        <a:graphic>
+          <a:graphicData uri="http://schemas.openxmlformats.org/drawingml/2006/table">
+            <a:tbl>
+              <a:tblPr>
+                <a:tableStyleId>{5C22544A-7EE6-4342-B048-85BDC9FD1C3A}</a:tableStyleId>
+              </a:tblPr>
+              <a:tblGrid>
+                <a:gridCol w="1080000"/>
+                <a:gridCol w="1080000"/>
+                <a:gridCol w="1080000"/>
+                <a:gridCol w="1080000"/>
+                <a:gridCol w="1080000"/>
+                <a:gridCol w="1080000"/>
+                <a:gridCol w="1080000"/>
+                <a:gridCol w="1080000"/>
+                <a:gridCol w="1080000"/>
+                <a:gridCol w="1080000"/>
+              </a:tblGrid>
+              <a:tr h="1080000">
+                <a:tc>
+                  <a:txBody>
+                    <a:bodyPr/>
+                    <a:lstStyle/>
+                    <a:p>
+                      <a:pPr algn="ctr" latinLnBrk="1"/>
+                      <a:r>
+                        <a:rPr lang="en-US" altLang="ko-KR" sz="4000" b="1" dirty="0" smtClean="0">
+                          <a:solidFill>
+                            <a:schemeClr val="tx1"/>
+                          </a:solidFill>
+                        </a:rPr>
+                        <a:t>1</a:t>
+                      </a:r>
+                      <a:endParaRPr lang="ko-KR" altLang="en-US" sz="4000" b="1" dirty="0">
+                        <a:solidFill>
+                          <a:schemeClr val="tx1"/>
+                        </a:solidFill>
+                      </a:endParaRPr>
+                    </a:p>
+                  </a:txBody>
+                  <a:tcPr anchor="ctr">
+                    <a:solidFill>
+                      <a:schemeClr val="bg1"/>
+                    </a:solidFill>
+                  </a:tcPr>
+                </a:tc>
+                <a:tc>
+                  <a:txBody>
+                    <a:bodyPr/>
+                    <a:lstStyle/>
+                    <a:p>
+                      <a:pPr algn="ctr" latinLnBrk="1"/>
+                      <a:r>
+                        <a:rPr lang="en-US" altLang="ko-KR" sz="4000" b="1" dirty="0" smtClean="0">
+                          <a:solidFill>
+                            <a:schemeClr val="tx1"/>
+                          </a:solidFill>
+                        </a:rPr>
+                        <a:t>2</a:t>
+                      </a:r>
+                      <a:endParaRPr lang="ko-KR" altLang="en-US" sz="4000" b="1" dirty="0">
+                        <a:solidFill>
+                          <a:schemeClr val="tx1"/>
+                        </a:solidFill>
+                      </a:endParaRPr>
+                    </a:p>
+                  </a:txBody>
+                  <a:tcPr anchor="ctr">
+                    <a:solidFill>
+                      <a:schemeClr val="bg1"/>
+                    </a:solidFill>
+                  </a:tcPr>
+                </a:tc>
+                <a:tc>
+                  <a:txBody>
+                    <a:bodyPr/>
+                    <a:lstStyle/>
+                    <a:p>
+                      <a:pPr algn="ctr" latinLnBrk="1"/>
+                      <a:r>
+                        <a:rPr lang="en-US" altLang="ko-KR" sz="4000" b="1" dirty="0" smtClean="0">
+                          <a:solidFill>
+                            <a:schemeClr val="tx1"/>
+                          </a:solidFill>
+                        </a:rPr>
+                        <a:t>3</a:t>
+                      </a:r>
+                      <a:endParaRPr lang="ko-KR" altLang="en-US" sz="4000" b="1" dirty="0">
+                        <a:solidFill>
+                          <a:schemeClr val="tx1"/>
+                        </a:solidFill>
+                      </a:endParaRPr>
+                    </a:p>
+                  </a:txBody>
+                  <a:tcPr anchor="ctr">
+                    <a:solidFill>
+                      <a:schemeClr val="bg1"/>
+                    </a:solidFill>
+                  </a:tcPr>
+                </a:tc>
+                <a:tc>
+                  <a:txBody>
+                    <a:bodyPr/>
+                    <a:lstStyle/>
+                    <a:p>
+                      <a:pPr algn="ctr" latinLnBrk="1"/>
+                      <a:r>
+                        <a:rPr lang="en-US" altLang="ko-KR" sz="4000" b="1" dirty="0" smtClean="0">
+                          <a:solidFill>
+                            <a:schemeClr val="tx1"/>
+                          </a:solidFill>
+                        </a:rPr>
+                        <a:t>4</a:t>
+                      </a:r>
+                      <a:endParaRPr lang="ko-KR" altLang="en-US" sz="4000" b="1" dirty="0">
+                        <a:solidFill>
+                          <a:schemeClr val="tx1"/>
+                        </a:solidFill>
+                      </a:endParaRPr>
+                    </a:p>
+                  </a:txBody>
+                  <a:tcPr anchor="ctr">
+                    <a:solidFill>
+                      <a:schemeClr val="bg1"/>
+                    </a:solidFill>
+                  </a:tcPr>
+                </a:tc>
+                <a:tc>
+                  <a:txBody>
+                    <a:bodyPr/>
+                    <a:lstStyle/>
+                    <a:p>
+                      <a:pPr algn="ctr" latinLnBrk="1"/>
+                      <a:r>
+                        <a:rPr lang="en-US" altLang="ko-KR" sz="4000" b="1" dirty="0" smtClean="0">
+                          <a:solidFill>
+                            <a:schemeClr val="tx1"/>
+                          </a:solidFill>
+                        </a:rPr>
+                        <a:t>5</a:t>
+                      </a:r>
+                      <a:endParaRPr lang="ko-KR" altLang="en-US" sz="4000" b="1" dirty="0">
+                        <a:solidFill>
+                          <a:schemeClr val="tx1"/>
+                        </a:solidFill>
+                      </a:endParaRPr>
+                    </a:p>
+                  </a:txBody>
+                  <a:tcPr anchor="ctr">
+                    <a:solidFill>
+                      <a:schemeClr val="bg1"/>
+                    </a:solidFill>
+                  </a:tcPr>
+                </a:tc>
+                <a:tc>
+                  <a:txBody>
+                    <a:bodyPr/>
+                    <a:lstStyle/>
+                    <a:p>
+                      <a:pPr algn="ctr" latinLnBrk="1"/>
+                      <a:r>
+                        <a:rPr lang="en-US" altLang="ko-KR" sz="4000" b="1" dirty="0" smtClean="0">
+                          <a:solidFill>
+                            <a:schemeClr val="tx1"/>
+                          </a:solidFill>
+                        </a:rPr>
+                        <a:t>6</a:t>
+                      </a:r>
+                      <a:endParaRPr lang="ko-KR" altLang="en-US" sz="4000" b="1" dirty="0">
+                        <a:solidFill>
+                          <a:schemeClr val="tx1"/>
+                        </a:solidFill>
+                      </a:endParaRPr>
+                    </a:p>
+                  </a:txBody>
+                  <a:tcPr anchor="ctr">
+                    <a:solidFill>
+                      <a:schemeClr val="bg1"/>
+                    </a:solidFill>
+                  </a:tcPr>
+                </a:tc>
+                <a:tc>
+                  <a:txBody>
+                    <a:bodyPr/>
+                    <a:lstStyle/>
+                    <a:p>
+                      <a:pPr algn="ctr" latinLnBrk="1"/>
+                      <a:r>
+                        <a:rPr lang="en-US" altLang="ko-KR" sz="4000" b="1" dirty="0" smtClean="0">
+                          <a:solidFill>
+                            <a:schemeClr val="tx1"/>
+                          </a:solidFill>
+                        </a:rPr>
+                        <a:t>7</a:t>
+                      </a:r>
+                      <a:endParaRPr lang="ko-KR" altLang="en-US" sz="4000" b="1" dirty="0">
+                        <a:solidFill>
+                          <a:schemeClr val="tx1"/>
+                        </a:solidFill>
+                      </a:endParaRPr>
+                    </a:p>
+                  </a:txBody>
+                  <a:tcPr anchor="ctr">
+                    <a:solidFill>
+                      <a:schemeClr val="bg1"/>
+                    </a:solidFill>
+                  </a:tcPr>
+                </a:tc>
+                <a:tc>
+                  <a:txBody>
+                    <a:bodyPr/>
+                    <a:lstStyle/>
+                    <a:p>
+                      <a:pPr algn="ctr" latinLnBrk="1"/>
+                      <a:r>
+                        <a:rPr lang="en-US" altLang="ko-KR" sz="4000" b="1" dirty="0" smtClean="0">
+                          <a:solidFill>
+                            <a:schemeClr val="tx1"/>
+                          </a:solidFill>
+                        </a:rPr>
+                        <a:t>8</a:t>
+                      </a:r>
+                      <a:endParaRPr lang="ko-KR" altLang="en-US" sz="4000" b="1" dirty="0">
+                        <a:solidFill>
+                          <a:schemeClr val="tx1"/>
+                        </a:solidFill>
+                      </a:endParaRPr>
+                    </a:p>
+                  </a:txBody>
+                  <a:tcPr anchor="ctr">
+                    <a:solidFill>
+                      <a:schemeClr val="bg1"/>
+                    </a:solidFill>
+                  </a:tcPr>
+                </a:tc>
+                <a:tc>
+                  <a:txBody>
+                    <a:bodyPr/>
+                    <a:lstStyle/>
+                    <a:p>
+                      <a:pPr algn="ctr" latinLnBrk="1"/>
+                      <a:r>
+                        <a:rPr lang="en-US" altLang="ko-KR" sz="4000" b="1" dirty="0" smtClean="0">
+                          <a:solidFill>
+                            <a:schemeClr val="tx1"/>
+                          </a:solidFill>
+                        </a:rPr>
+                        <a:t>9</a:t>
+                      </a:r>
+                      <a:endParaRPr lang="ko-KR" altLang="en-US" sz="4000" b="1" dirty="0">
+                        <a:solidFill>
+                          <a:schemeClr val="tx1"/>
+                        </a:solidFill>
+                      </a:endParaRPr>
+                    </a:p>
+                  </a:txBody>
+                  <a:tcPr anchor="ctr">
+                    <a:solidFill>
+                      <a:schemeClr val="bg1"/>
+                    </a:solidFill>
+                  </a:tcPr>
+                </a:tc>
+                <a:tc>
+                  <a:txBody>
+                    <a:bodyPr/>
+                    <a:lstStyle/>
+                    <a:p>
+                      <a:pPr algn="ctr" latinLnBrk="1"/>
+                      <a:r>
+                        <a:rPr lang="en-US" altLang="ko-KR" sz="4000" b="1" dirty="0" smtClean="0">
+                          <a:solidFill>
+                            <a:schemeClr val="tx1"/>
+                          </a:solidFill>
+                        </a:rPr>
+                        <a:t>10</a:t>
+                      </a:r>
+                      <a:endParaRPr lang="ko-KR" altLang="en-US" sz="4000" b="1" dirty="0">
+                        <a:solidFill>
+                          <a:schemeClr val="tx1"/>
+                        </a:solidFill>
+                      </a:endParaRPr>
+                    </a:p>
+                  </a:txBody>
+                  <a:tcPr anchor="ctr">
+                    <a:solidFill>
+                      <a:schemeClr val="bg1"/>
+                    </a:solidFill>
+                  </a:tcPr>
+                </a:tc>
+              </a:tr>
+              <a:tr h="1080000">
+                <a:tc>
+                  <a:txBody>
+                    <a:bodyPr/>
+                    <a:lstStyle/>
+                    <a:p>
+                      <a:pPr algn="ctr" latinLnBrk="1"/>
+                      <a:r>
+                        <a:rPr lang="en-US" altLang="ko-KR" sz="4000" b="1" dirty="0" smtClean="0">
+                          <a:solidFill>
+                            <a:schemeClr val="tx1"/>
+                          </a:solidFill>
+                        </a:rPr>
+                        <a:t>11</a:t>
+                      </a:r>
+                      <a:endParaRPr lang="ko-KR" altLang="en-US" sz="4000" b="1" dirty="0">
+                        <a:solidFill>
+                          <a:schemeClr val="tx1"/>
+                        </a:solidFill>
+                      </a:endParaRPr>
+                    </a:p>
+                  </a:txBody>
+                  <a:tcPr anchor="ctr">
+                    <a:solidFill>
+                      <a:schemeClr val="bg1"/>
+                    </a:solidFill>
+                  </a:tcPr>
+                </a:tc>
+                <a:tc>
+                  <a:txBody>
+                    <a:bodyPr/>
+                    <a:lstStyle/>
+                    <a:p>
+                      <a:pPr algn="ctr" latinLnBrk="1"/>
+                      <a:r>
+                        <a:rPr lang="en-US" altLang="ko-KR" sz="4000" b="1" dirty="0" smtClean="0">
+                          <a:solidFill>
+                            <a:schemeClr val="tx1"/>
+                          </a:solidFill>
+                        </a:rPr>
+                        <a:t>12</a:t>
+                      </a:r>
+                      <a:endParaRPr lang="ko-KR" altLang="en-US" sz="4000" b="1" dirty="0">
+                        <a:solidFill>
+                          <a:schemeClr val="tx1"/>
+                        </a:solidFill>
+                      </a:endParaRPr>
+                    </a:p>
+                  </a:txBody>
+                  <a:tcPr anchor="ctr">
+                    <a:solidFill>
+                      <a:schemeClr val="bg1"/>
+                    </a:solidFill>
+                  </a:tcPr>
+                </a:tc>
+                <a:tc>
+                  <a:txBody>
+                    <a:bodyPr/>
+                    <a:lstStyle/>
+                    <a:p>
+                      <a:pPr algn="ctr" latinLnBrk="1"/>
+                      <a:r>
+                        <a:rPr lang="en-US" altLang="ko-KR" sz="4000" b="1" dirty="0" smtClean="0">
+                          <a:solidFill>
+                            <a:schemeClr val="tx1"/>
+                          </a:solidFill>
+                        </a:rPr>
+                        <a:t>13</a:t>
+                      </a:r>
+                      <a:endParaRPr lang="ko-KR" altLang="en-US" sz="4000" b="1" dirty="0">
+                        <a:solidFill>
+                          <a:schemeClr val="tx1"/>
+                        </a:solidFill>
+                      </a:endParaRPr>
+                    </a:p>
+                  </a:txBody>
+                  <a:tcPr anchor="ctr">
+                    <a:solidFill>
+                      <a:schemeClr val="bg1"/>
+                    </a:solidFill>
+                  </a:tcPr>
+                </a:tc>
+                <a:tc>
+                  <a:txBody>
+                    <a:bodyPr/>
+                    <a:lstStyle/>
+                    <a:p>
+                      <a:pPr algn="ctr" latinLnBrk="1"/>
+                      <a:r>
+                        <a:rPr lang="en-US" altLang="ko-KR" sz="4000" b="1" dirty="0" smtClean="0">
+                          <a:solidFill>
+                            <a:schemeClr val="tx1"/>
+                          </a:solidFill>
+                        </a:rPr>
+                        <a:t>14</a:t>
+                      </a:r>
+                      <a:endParaRPr lang="ko-KR" altLang="en-US" sz="4000" b="1" dirty="0">
+                        <a:solidFill>
+                          <a:schemeClr val="tx1"/>
+                        </a:solidFill>
+                      </a:endParaRPr>
+                    </a:p>
+                  </a:txBody>
+                  <a:tcPr anchor="ctr">
+                    <a:solidFill>
+                      <a:schemeClr val="bg1"/>
+                    </a:solidFill>
+                  </a:tcPr>
+                </a:tc>
+                <a:tc>
+                  <a:txBody>
+                    <a:bodyPr/>
+                    <a:lstStyle/>
+                    <a:p>
+                      <a:pPr algn="ctr" latinLnBrk="1"/>
+                      <a:r>
+                        <a:rPr lang="en-US" altLang="ko-KR" sz="4000" b="1" dirty="0" smtClean="0">
+                          <a:solidFill>
+                            <a:schemeClr val="tx1"/>
+                          </a:solidFill>
+                        </a:rPr>
+                        <a:t>15</a:t>
+                      </a:r>
+                      <a:endParaRPr lang="ko-KR" altLang="en-US" sz="4000" b="1" dirty="0">
+                        <a:solidFill>
+                          <a:schemeClr val="tx1"/>
+                        </a:solidFill>
+                      </a:endParaRPr>
+                    </a:p>
+                  </a:txBody>
+                  <a:tcPr anchor="ctr">
+                    <a:solidFill>
+                      <a:schemeClr val="bg1"/>
+                    </a:solidFill>
+                  </a:tcPr>
+                </a:tc>
+                <a:tc>
+                  <a:txBody>
+                    <a:bodyPr/>
+                    <a:lstStyle/>
+                    <a:p>
+                      <a:pPr algn="ctr" latinLnBrk="1"/>
+                      <a:r>
+                        <a:rPr lang="en-US" altLang="ko-KR" sz="4000" b="1" dirty="0" smtClean="0">
+                          <a:solidFill>
+                            <a:schemeClr val="tx1"/>
+                          </a:solidFill>
+                        </a:rPr>
+                        <a:t>16</a:t>
+                      </a:r>
+                      <a:endParaRPr lang="ko-KR" altLang="en-US" sz="4000" b="1" dirty="0">
+                        <a:solidFill>
+                          <a:schemeClr val="tx1"/>
+                        </a:solidFill>
+                      </a:endParaRPr>
+                    </a:p>
+                  </a:txBody>
+                  <a:tcPr anchor="ctr">
+                    <a:solidFill>
+                      <a:schemeClr val="bg1"/>
+                    </a:solidFill>
+                  </a:tcPr>
+                </a:tc>
+                <a:tc>
+                  <a:txBody>
+                    <a:bodyPr/>
+                    <a:lstStyle/>
+                    <a:p>
+                      <a:pPr algn="ctr" latinLnBrk="1"/>
+                      <a:r>
+                        <a:rPr lang="en-US" altLang="ko-KR" sz="4000" b="1" dirty="0" smtClean="0">
+                          <a:solidFill>
+                            <a:schemeClr val="tx1"/>
+                          </a:solidFill>
+                        </a:rPr>
+                        <a:t>17</a:t>
+                      </a:r>
+                      <a:endParaRPr lang="ko-KR" altLang="en-US" sz="4000" b="1" dirty="0">
+                        <a:solidFill>
+                          <a:schemeClr val="tx1"/>
+                        </a:solidFill>
+                      </a:endParaRPr>
+                    </a:p>
+                  </a:txBody>
+                  <a:tcPr anchor="ctr">
+                    <a:solidFill>
+                      <a:schemeClr val="bg1"/>
+                    </a:solidFill>
+                  </a:tcPr>
+                </a:tc>
+                <a:tc>
+                  <a:txBody>
+                    <a:bodyPr/>
+                    <a:lstStyle/>
+                    <a:p>
+                      <a:pPr algn="ctr" latinLnBrk="1"/>
+                      <a:r>
+                        <a:rPr lang="en-US" altLang="ko-KR" sz="4000" b="1" dirty="0" smtClean="0">
+                          <a:solidFill>
+                            <a:schemeClr val="tx1"/>
+                          </a:solidFill>
+                        </a:rPr>
+                        <a:t>18</a:t>
+                      </a:r>
+                      <a:endParaRPr lang="ko-KR" altLang="en-US" sz="4000" b="1" dirty="0">
+                        <a:solidFill>
+                          <a:schemeClr val="tx1"/>
+                        </a:solidFill>
+                      </a:endParaRPr>
+                    </a:p>
+                  </a:txBody>
+                  <a:tcPr anchor="ctr">
+                    <a:solidFill>
+                      <a:schemeClr val="bg1"/>
+                    </a:solidFill>
+                  </a:tcPr>
+                </a:tc>
+                <a:tc>
+                  <a:txBody>
+                    <a:bodyPr/>
+                    <a:lstStyle/>
+                    <a:p>
+                      <a:pPr algn="ctr" latinLnBrk="1"/>
+                      <a:r>
+                        <a:rPr lang="en-US" altLang="ko-KR" sz="4000" b="1" dirty="0" smtClean="0">
+                          <a:solidFill>
+                            <a:schemeClr val="tx1"/>
+                          </a:solidFill>
+                        </a:rPr>
+                        <a:t>19</a:t>
+                      </a:r>
+                      <a:endParaRPr lang="ko-KR" altLang="en-US" sz="4000" b="1" dirty="0">
+                        <a:solidFill>
+                          <a:schemeClr val="tx1"/>
+                        </a:solidFill>
+                      </a:endParaRPr>
+                    </a:p>
+                  </a:txBody>
+                  <a:tcPr anchor="ctr">
+                    <a:solidFill>
+                      <a:schemeClr val="bg1"/>
+                    </a:solidFill>
+                  </a:tcPr>
+                </a:tc>
+                <a:tc>
+                  <a:txBody>
+                    <a:bodyPr/>
+                    <a:lstStyle/>
+                    <a:p>
+                      <a:pPr algn="ctr" latinLnBrk="1"/>
+                      <a:r>
+                        <a:rPr lang="en-US" altLang="ko-KR" sz="4000" b="1" dirty="0" smtClean="0">
+                          <a:solidFill>
+                            <a:schemeClr val="tx1"/>
+                          </a:solidFill>
+                        </a:rPr>
+                        <a:t>20</a:t>
+                      </a:r>
+                      <a:endParaRPr lang="ko-KR" altLang="en-US" sz="4000" b="1" dirty="0">
+                        <a:solidFill>
+                          <a:schemeClr val="tx1"/>
+                        </a:solidFill>
+                      </a:endParaRPr>
+                    </a:p>
+                  </a:txBody>
+                  <a:tcPr anchor="ctr">
+                    <a:solidFill>
+                      <a:schemeClr val="bg1"/>
+                    </a:solidFill>
+                  </a:tcPr>
+                </a:tc>
+              </a:tr>
+              <a:tr h="1080000">
+                <a:tc>
+                  <a:txBody>
+                    <a:bodyPr/>
+                    <a:lstStyle/>
+                    <a:p>
+                      <a:pPr algn="ctr" latinLnBrk="1"/>
+                      <a:r>
+                        <a:rPr lang="en-US" altLang="ko-KR" sz="4000" b="1" dirty="0" smtClean="0">
+                          <a:solidFill>
+                            <a:schemeClr val="tx1"/>
+                          </a:solidFill>
+                        </a:rPr>
+                        <a:t>21</a:t>
+                      </a:r>
+                      <a:endParaRPr lang="ko-KR" altLang="en-US" sz="4000" b="1" dirty="0">
+                        <a:solidFill>
+                          <a:schemeClr val="tx1"/>
+                        </a:solidFill>
+                      </a:endParaRPr>
+                    </a:p>
+                  </a:txBody>
+                  <a:tcPr anchor="ctr">
+                    <a:solidFill>
+                      <a:schemeClr val="bg1"/>
+                    </a:solidFill>
+                  </a:tcPr>
+                </a:tc>
+                <a:tc>
+                  <a:txBody>
+                    <a:bodyPr/>
+                    <a:lstStyle/>
+                    <a:p>
+                      <a:pPr algn="ctr" latinLnBrk="1"/>
+                      <a:r>
+                        <a:rPr lang="en-US" altLang="ko-KR" sz="4000" b="1" dirty="0" smtClean="0">
+                          <a:solidFill>
+                            <a:schemeClr val="tx1"/>
+                          </a:solidFill>
+                        </a:rPr>
+                        <a:t>22</a:t>
+                      </a:r>
+                      <a:endParaRPr lang="ko-KR" altLang="en-US" sz="4000" b="1" dirty="0">
+                        <a:solidFill>
+                          <a:schemeClr val="tx1"/>
+                        </a:solidFill>
+                      </a:endParaRPr>
+                    </a:p>
+                  </a:txBody>
+                  <a:tcPr anchor="ctr">
+                    <a:solidFill>
+                      <a:schemeClr val="bg1"/>
+                    </a:solidFill>
+                  </a:tcPr>
+                </a:tc>
+                <a:tc>
+                  <a:txBody>
+                    <a:bodyPr/>
+                    <a:lstStyle/>
+                    <a:p>
+                      <a:pPr algn="ctr" latinLnBrk="1"/>
+                      <a:r>
+                        <a:rPr lang="en-US" altLang="ko-KR" sz="4000" b="1" dirty="0" smtClean="0">
+                          <a:solidFill>
+                            <a:schemeClr val="tx1"/>
+                          </a:solidFill>
+                        </a:rPr>
+                        <a:t>23</a:t>
+                      </a:r>
+                      <a:endParaRPr lang="ko-KR" altLang="en-US" sz="4000" b="1" dirty="0">
+                        <a:solidFill>
+                          <a:schemeClr val="tx1"/>
+                        </a:solidFill>
+                      </a:endParaRPr>
+                    </a:p>
+                  </a:txBody>
+                  <a:tcPr anchor="ctr">
+                    <a:solidFill>
+                      <a:schemeClr val="bg1"/>
+                    </a:solidFill>
+                  </a:tcPr>
+                </a:tc>
+                <a:tc>
+                  <a:txBody>
+                    <a:bodyPr/>
+                    <a:lstStyle/>
+                    <a:p>
+                      <a:pPr algn="ctr" latinLnBrk="1"/>
+                      <a:r>
+                        <a:rPr lang="en-US" altLang="ko-KR" sz="4000" b="1" dirty="0" smtClean="0">
+                          <a:solidFill>
+                            <a:schemeClr val="tx1"/>
+                          </a:solidFill>
+                        </a:rPr>
+                        <a:t>24</a:t>
+                      </a:r>
+                      <a:endParaRPr lang="ko-KR" altLang="en-US" sz="4000" b="1" dirty="0">
+                        <a:solidFill>
+                          <a:schemeClr val="tx1"/>
+                        </a:solidFill>
+                      </a:endParaRPr>
+                    </a:p>
+                  </a:txBody>
+                  <a:tcPr anchor="ctr">
+                    <a:solidFill>
+                      <a:schemeClr val="bg1"/>
+                    </a:solidFill>
+                  </a:tcPr>
+                </a:tc>
+                <a:tc>
+                  <a:txBody>
+                    <a:bodyPr/>
+                    <a:lstStyle/>
+                    <a:p>
+                      <a:pPr algn="ctr" latinLnBrk="1"/>
+                      <a:r>
+                        <a:rPr lang="en-US" altLang="ko-KR" sz="4000" b="1" dirty="0" smtClean="0">
+                          <a:solidFill>
+                            <a:schemeClr val="tx1"/>
+                          </a:solidFill>
+                        </a:rPr>
+                        <a:t>25</a:t>
+                      </a:r>
+                      <a:endParaRPr lang="ko-KR" altLang="en-US" sz="4000" b="1" dirty="0">
+                        <a:solidFill>
+                          <a:schemeClr val="tx1"/>
+                        </a:solidFill>
+                      </a:endParaRPr>
+                    </a:p>
+                  </a:txBody>
+                  <a:tcPr anchor="ctr">
+                    <a:solidFill>
+                      <a:schemeClr val="bg1"/>
+                    </a:solidFill>
+                  </a:tcPr>
+                </a:tc>
+                <a:tc>
+                  <a:txBody>
+                    <a:bodyPr/>
+                    <a:lstStyle/>
+                    <a:p>
+                      <a:pPr algn="ctr" latinLnBrk="1"/>
+                      <a:r>
+                        <a:rPr lang="en-US" altLang="ko-KR" sz="4000" b="1" dirty="0" smtClean="0">
+                          <a:solidFill>
+                            <a:schemeClr val="tx1"/>
+                          </a:solidFill>
+                        </a:rPr>
+                        <a:t>26</a:t>
+                      </a:r>
+                      <a:endParaRPr lang="ko-KR" altLang="en-US" sz="4000" b="1" dirty="0">
+                        <a:solidFill>
+                          <a:schemeClr val="tx1"/>
+                        </a:solidFill>
+                      </a:endParaRPr>
+                    </a:p>
+                  </a:txBody>
+                  <a:tcPr anchor="ctr">
+                    <a:solidFill>
+                      <a:schemeClr val="bg1"/>
+                    </a:solidFill>
+                  </a:tcPr>
+                </a:tc>
+                <a:tc>
+                  <a:txBody>
+                    <a:bodyPr/>
+                    <a:lstStyle/>
+                    <a:p>
+                      <a:pPr algn="ctr" latinLnBrk="1"/>
+                      <a:r>
+                        <a:rPr lang="en-US" altLang="ko-KR" sz="4000" b="1" dirty="0" smtClean="0">
+                          <a:solidFill>
+                            <a:schemeClr val="tx1"/>
+                          </a:solidFill>
+                        </a:rPr>
+                        <a:t>27</a:t>
+                      </a:r>
+                      <a:endParaRPr lang="ko-KR" altLang="en-US" sz="4000" b="1" dirty="0">
+                        <a:solidFill>
+                          <a:schemeClr val="tx1"/>
+                        </a:solidFill>
+                      </a:endParaRPr>
+                    </a:p>
+                  </a:txBody>
+                  <a:tcPr anchor="ctr">
+                    <a:solidFill>
+                      <a:schemeClr val="bg1"/>
+                    </a:solidFill>
+                  </a:tcPr>
+                </a:tc>
+                <a:tc>
+                  <a:txBody>
+                    <a:bodyPr/>
+                    <a:lstStyle/>
+                    <a:p>
+                      <a:pPr algn="ctr" latinLnBrk="1"/>
+                      <a:r>
+                        <a:rPr lang="en-US" altLang="ko-KR" sz="4000" b="1" dirty="0" smtClean="0">
+                          <a:solidFill>
+                            <a:schemeClr val="tx1"/>
+                          </a:solidFill>
+                        </a:rPr>
+                        <a:t>28</a:t>
+                      </a:r>
+                      <a:endParaRPr lang="ko-KR" altLang="en-US" sz="4000" b="1" dirty="0">
+                        <a:solidFill>
+                          <a:schemeClr val="tx1"/>
+                        </a:solidFill>
+                      </a:endParaRPr>
+                    </a:p>
+                  </a:txBody>
+                  <a:tcPr anchor="ctr">
+                    <a:solidFill>
+                      <a:schemeClr val="bg1"/>
+                    </a:solidFill>
+                  </a:tcPr>
+                </a:tc>
+                <a:tc>
+                  <a:txBody>
+                    <a:bodyPr/>
+                    <a:lstStyle/>
+                    <a:p>
+                      <a:pPr algn="ctr" latinLnBrk="1"/>
+                      <a:r>
+                        <a:rPr lang="en-US" altLang="ko-KR" sz="4000" b="1" dirty="0" smtClean="0">
+                          <a:solidFill>
+                            <a:schemeClr val="tx1"/>
+                          </a:solidFill>
+                        </a:rPr>
+                        <a:t>29</a:t>
+                      </a:r>
+                      <a:endParaRPr lang="ko-KR" altLang="en-US" sz="4000" b="1" dirty="0">
+                        <a:solidFill>
+                          <a:schemeClr val="tx1"/>
+                        </a:solidFill>
+                      </a:endParaRPr>
+                    </a:p>
+                  </a:txBody>
+                  <a:tcPr anchor="ctr">
+                    <a:solidFill>
+                      <a:schemeClr val="bg1"/>
+                    </a:solidFill>
+                  </a:tcPr>
+                </a:tc>
+                <a:tc>
+                  <a:txBody>
+                    <a:bodyPr/>
+                    <a:lstStyle/>
+                    <a:p>
+                      <a:pPr algn="ctr" latinLnBrk="1"/>
+                      <a:r>
+                        <a:rPr lang="en-US" altLang="ko-KR" sz="4000" b="1" dirty="0" smtClean="0">
+                          <a:solidFill>
+                            <a:schemeClr val="tx1"/>
+                          </a:solidFill>
+                        </a:rPr>
+                        <a:t>30</a:t>
+                      </a:r>
+                      <a:endParaRPr lang="ko-KR" altLang="en-US" sz="4000" b="1" dirty="0">
+                        <a:solidFill>
+                          <a:schemeClr val="tx1"/>
+                        </a:solidFill>
+                      </a:endParaRPr>
+                    </a:p>
+                  </a:txBody>
+                  <a:tcPr anchor="ctr">
+                    <a:solidFill>
+                      <a:schemeClr val="bg1"/>
+                    </a:solidFill>
+                  </a:tcPr>
+                </a:tc>
+              </a:tr>
+            </a:tbl>
+          </a:graphicData>
+        </a:graphic>
+      </p:graphicFrame>
+    </p:spTree>
+    <p:extLst>
+      <p:ext uri="{BB962C8B-B14F-4D97-AF65-F5344CB8AC3E}">
+        <p14:creationId xmlns:p14="http://schemas.microsoft.com/office/powerpoint/2010/main" val="3012620156"/>
+      </p:ext>
+    </p:extLst>
+  </p:cSld>
+  <p:clrMapOvr>
+    <a:masterClrMapping/>
+  </p:clrMapOvr>
+  <p:timing>
+    <p:tnLst>
+      <p:par>
+        <p:cTn id="1" dur="indefinite" restart="never" nodeType="tmRoot"/>
+      </p:par>
+    </p:tnLst>
+  </p:timing>
+</p:sld>
+</file>
+
 <file path=ppt/slides/slide3.xml><?xml version="1.0" encoding="utf-8"?>
 <p:sld xmlns:a="http://schemas.openxmlformats.org/drawingml/2006/main" xmlns:r="http://schemas.openxmlformats.org/officeDocument/2006/relationships" xmlns:p="http://schemas.openxmlformats.org/presentationml/2006/main">
   <p:cSld>

</xml_diff>